<commit_message>
[ Update ] File I/O Add
</commit_message>
<xml_diff>
--- a/전공지식/C언어의 기초/C언어 기초지식.pptx
+++ b/전공지식/C언어의 기초/C언어 기초지식.pptx
@@ -27,7 +27,8 @@
     <p:sldId id="276" r:id="rId21"/>
     <p:sldId id="277" r:id="rId22"/>
     <p:sldId id="278" r:id="rId23"/>
-    <p:sldId id="279" r:id="rId24"/>
+    <p:sldId id="280" r:id="rId24"/>
+    <p:sldId id="279" r:id="rId25"/>
   </p:sldIdLst>
   <p:sldSz cx="12192000" cy="6858000"/>
   <p:notesSz cx="6858000" cy="9144000"/>
@@ -137,6 +138,7 @@
 <file path=ppt/revisionInfo.xml><?xml version="1.0" encoding="utf-8"?>
 <p1510:revInfo xmlns:a="http://schemas.openxmlformats.org/drawingml/2006/main" xmlns:r="http://schemas.openxmlformats.org/officeDocument/2006/relationships" xmlns:p1510="http://schemas.microsoft.com/office/powerpoint/2015/10/main">
   <p1510:revLst>
+    <p1510:client id="{68FA48E1-8A62-4041-A1F4-B32A27D0A544}" v="264" dt="2023-10-21T14:52:49.774"/>
     <p1510:client id="{70AA4CCD-8E10-434E-868F-5C5E0A410C2E}" v="3097" dt="2023-10-17T12:35:51.078"/>
     <p1510:client id="{773FEA85-BD00-400D-8917-366C44315C9D}" v="1719" dt="2023-10-19T11:41:03.164"/>
     <p1510:client id="{C0B17A74-5F7D-4C82-8D87-A30C0598D578}" v="167" dt="2023-10-19T10:58:23.895"/>
@@ -7100,7 +7102,7 @@
           <a:p>
             <a:fld id="{76969C88-B244-455D-A017-012B25B1ACDD}" type="datetimeFigureOut">
               <a:rPr lang="en-US" smtClean="0"/>
-              <a:t>10/19/2023</a:t>
+              <a:t>10/21/2023</a:t>
             </a:fld>
             <a:endParaRPr lang="en-US"/>
           </a:p>
@@ -7298,7 +7300,7 @@
           <a:p>
             <a:fld id="{76969C88-B244-455D-A017-012B25B1ACDD}" type="datetimeFigureOut">
               <a:rPr lang="en-US" smtClean="0"/>
-              <a:t>10/19/2023</a:t>
+              <a:t>10/21/2023</a:t>
             </a:fld>
             <a:endParaRPr lang="en-US"/>
           </a:p>
@@ -7506,7 +7508,7 @@
           <a:p>
             <a:fld id="{76969C88-B244-455D-A017-012B25B1ACDD}" type="datetimeFigureOut">
               <a:rPr lang="en-US" smtClean="0"/>
-              <a:t>10/19/2023</a:t>
+              <a:t>10/21/2023</a:t>
             </a:fld>
             <a:endParaRPr lang="en-US"/>
           </a:p>
@@ -7704,7 +7706,7 @@
           <a:p>
             <a:fld id="{76969C88-B244-455D-A017-012B25B1ACDD}" type="datetimeFigureOut">
               <a:rPr lang="en-US" smtClean="0"/>
-              <a:t>10/19/2023</a:t>
+              <a:t>10/21/2023</a:t>
             </a:fld>
             <a:endParaRPr lang="en-US"/>
           </a:p>
@@ -7979,7 +7981,7 @@
           <a:p>
             <a:fld id="{76969C88-B244-455D-A017-012B25B1ACDD}" type="datetimeFigureOut">
               <a:rPr lang="en-US" smtClean="0"/>
-              <a:t>10/19/2023</a:t>
+              <a:t>10/21/2023</a:t>
             </a:fld>
             <a:endParaRPr lang="en-US"/>
           </a:p>
@@ -8244,7 +8246,7 @@
           <a:p>
             <a:fld id="{76969C88-B244-455D-A017-012B25B1ACDD}" type="datetimeFigureOut">
               <a:rPr lang="en-US" smtClean="0"/>
-              <a:t>10/19/2023</a:t>
+              <a:t>10/21/2023</a:t>
             </a:fld>
             <a:endParaRPr lang="en-US"/>
           </a:p>
@@ -8656,7 +8658,7 @@
           <a:p>
             <a:fld id="{76969C88-B244-455D-A017-012B25B1ACDD}" type="datetimeFigureOut">
               <a:rPr lang="en-US" smtClean="0"/>
-              <a:t>10/19/2023</a:t>
+              <a:t>10/21/2023</a:t>
             </a:fld>
             <a:endParaRPr lang="en-US"/>
           </a:p>
@@ -8797,7 +8799,7 @@
           <a:p>
             <a:fld id="{76969C88-B244-455D-A017-012B25B1ACDD}" type="datetimeFigureOut">
               <a:rPr lang="en-US" smtClean="0"/>
-              <a:t>10/19/2023</a:t>
+              <a:t>10/21/2023</a:t>
             </a:fld>
             <a:endParaRPr lang="en-US"/>
           </a:p>
@@ -8910,7 +8912,7 @@
           <a:p>
             <a:fld id="{76969C88-B244-455D-A017-012B25B1ACDD}" type="datetimeFigureOut">
               <a:rPr lang="en-US" smtClean="0"/>
-              <a:t>10/19/2023</a:t>
+              <a:t>10/21/2023</a:t>
             </a:fld>
             <a:endParaRPr lang="en-US"/>
           </a:p>
@@ -9221,7 +9223,7 @@
           <a:p>
             <a:fld id="{76969C88-B244-455D-A017-012B25B1ACDD}" type="datetimeFigureOut">
               <a:rPr lang="en-US" smtClean="0"/>
-              <a:t>10/19/2023</a:t>
+              <a:t>10/21/2023</a:t>
             </a:fld>
             <a:endParaRPr lang="en-US"/>
           </a:p>
@@ -9512,7 +9514,7 @@
           <a:p>
             <a:fld id="{76969C88-B244-455D-A017-012B25B1ACDD}" type="datetimeFigureOut">
               <a:rPr lang="en-US" smtClean="0"/>
-              <a:t>10/19/2023</a:t>
+              <a:t>10/21/2023</a:t>
             </a:fld>
             <a:endParaRPr lang="en-US"/>
           </a:p>
@@ -10262,7 +10264,7 @@
             <a:fld id="{76969C88-B244-455D-A017-012B25B1ACDD}" type="datetimeFigureOut">
               <a:rPr lang="en-US" smtClean="0"/>
               <a:pPr/>
-              <a:t>10/19/2023</a:t>
+              <a:t>10/21/2023</a:t>
             </a:fld>
             <a:endParaRPr lang="en-US"/>
           </a:p>
@@ -19675,6 +19677,483 @@
           <p:cNvPr id="2" name="제목 1">
             <a:extLst>
               <a:ext uri="{FF2B5EF4-FFF2-40B4-BE49-F238E27FC236}">
+                <a16:creationId xmlns:a16="http://schemas.microsoft.com/office/drawing/2014/main" id="{B6220CCF-DDDE-4EFE-267E-7E8958E7215F}"/>
+              </a:ext>
+            </a:extLst>
+          </p:cNvPr>
+          <p:cNvSpPr>
+            <a:spLocks noGrp="1"/>
+          </p:cNvSpPr>
+          <p:nvPr>
+            <p:ph type="title"/>
+          </p:nvPr>
+        </p:nvSpPr>
+        <p:spPr/>
+        <p:txBody>
+          <a:bodyPr/>
+          <a:lstStyle/>
+          <a:p>
+            <a:r>
+              <a:rPr lang="ko-KR" altLang="en-US" dirty="0">
+                <a:ea typeface="Microsoft GothicNeo"/>
+                <a:cs typeface="Microsoft GothicNeo"/>
+              </a:rPr>
+              <a:t>&lt; </a:t>
+            </a:r>
+            <a:r>
+              <a:rPr lang="ko-KR" altLang="en-US" dirty="0" err="1">
+                <a:ea typeface="Microsoft GothicNeo"/>
+                <a:cs typeface="Microsoft GothicNeo"/>
+              </a:rPr>
+              <a:t>Fprint</a:t>
+            </a:r>
+            <a:r>
+              <a:rPr lang="ko-KR" altLang="en-US" dirty="0">
+                <a:ea typeface="Microsoft GothicNeo"/>
+                <a:cs typeface="Microsoft GothicNeo"/>
+              </a:rPr>
+              <a:t> &amp; </a:t>
+            </a:r>
+            <a:r>
+              <a:rPr lang="ko-KR" altLang="en-US" dirty="0" err="1">
+                <a:ea typeface="Microsoft GothicNeo"/>
+                <a:cs typeface="Microsoft GothicNeo"/>
+              </a:rPr>
+              <a:t>fscanf</a:t>
+            </a:r>
+            <a:r>
+              <a:rPr lang="ko-KR" altLang="en-US" dirty="0">
+                <a:ea typeface="Microsoft GothicNeo"/>
+                <a:cs typeface="Microsoft GothicNeo"/>
+              </a:rPr>
+              <a:t> &gt; 파일 입/출력</a:t>
+            </a:r>
+            <a:endParaRPr lang="ko-KR" altLang="en-US" dirty="0" err="1"/>
+          </a:p>
+        </p:txBody>
+      </p:sp>
+      <p:sp>
+        <p:nvSpPr>
+          <p:cNvPr id="3" name="내용 개체 틀 2">
+            <a:extLst>
+              <a:ext uri="{FF2B5EF4-FFF2-40B4-BE49-F238E27FC236}">
+                <a16:creationId xmlns:a16="http://schemas.microsoft.com/office/drawing/2014/main" id="{52E2E398-FE6B-A617-EB9D-A4BBB95A36AA}"/>
+              </a:ext>
+            </a:extLst>
+          </p:cNvPr>
+          <p:cNvSpPr>
+            <a:spLocks noGrp="1"/>
+          </p:cNvSpPr>
+          <p:nvPr>
+            <p:ph idx="1"/>
+          </p:nvPr>
+        </p:nvSpPr>
+        <p:spPr/>
+        <p:txBody>
+          <a:bodyPr lIns="109728" tIns="109728" rIns="109728" bIns="91440" anchor="t"/>
+          <a:lstStyle/>
+          <a:p>
+            <a:r>
+              <a:rPr lang="ko-KR" altLang="en-US" err="1">
+                <a:solidFill>
+                  <a:srgbClr val="FFFFFF">
+                    <a:alpha val="70000"/>
+                  </a:srgbClr>
+                </a:solidFill>
+                <a:ea typeface="Microsoft GothicNeo"/>
+                <a:cs typeface="Microsoft GothicNeo"/>
+              </a:rPr>
+              <a:t>Why</a:t>
+            </a:r>
+            <a:r>
+              <a:rPr lang="ko-KR" altLang="en-US">
+                <a:solidFill>
+                  <a:srgbClr val="FFFFFF">
+                    <a:alpha val="70000"/>
+                  </a:srgbClr>
+                </a:solidFill>
+                <a:ea typeface="Microsoft GothicNeo"/>
+                <a:cs typeface="Microsoft GothicNeo"/>
+              </a:rPr>
+              <a:t>_ 메모리는 프로그램이 종료되면 휘발되는 성질이 있다.</a:t>
+            </a:r>
+          </a:p>
+          <a:p>
+            <a:pPr marL="0" indent="0">
+              <a:buNone/>
+            </a:pPr>
+            <a:r>
+              <a:rPr lang="ko-KR" altLang="en-US" dirty="0">
+                <a:solidFill>
+                  <a:srgbClr val="FFFFFF">
+                    <a:alpha val="70000"/>
+                  </a:srgbClr>
+                </a:solidFill>
+                <a:ea typeface="Microsoft GothicNeo"/>
+                <a:cs typeface="Microsoft GothicNeo"/>
+              </a:rPr>
+              <a:t>데이터를 파일로 </a:t>
+            </a:r>
+            <a:r>
+              <a:rPr lang="ko-KR" altLang="en-US" dirty="0" err="1">
+                <a:solidFill>
+                  <a:srgbClr val="FFFFFF">
+                    <a:alpha val="70000"/>
+                  </a:srgbClr>
+                </a:solidFill>
+                <a:ea typeface="Microsoft GothicNeo"/>
+                <a:cs typeface="Microsoft GothicNeo"/>
+              </a:rPr>
+              <a:t>저장해야할</a:t>
+            </a:r>
+            <a:r>
+              <a:rPr lang="ko-KR" altLang="en-US" dirty="0">
+                <a:solidFill>
+                  <a:srgbClr val="FFFFFF">
+                    <a:alpha val="70000"/>
+                  </a:srgbClr>
+                </a:solidFill>
+                <a:ea typeface="Microsoft GothicNeo"/>
+                <a:cs typeface="Microsoft GothicNeo"/>
+              </a:rPr>
+              <a:t> 필요성이 존재하는데 </a:t>
+            </a:r>
+            <a:r>
+              <a:rPr lang="ko-KR" altLang="en-US" dirty="0" err="1">
+                <a:solidFill>
+                  <a:srgbClr val="FFFFFF">
+                    <a:alpha val="70000"/>
+                  </a:srgbClr>
+                </a:solidFill>
+                <a:ea typeface="Microsoft GothicNeo"/>
+                <a:cs typeface="Microsoft GothicNeo"/>
+              </a:rPr>
+              <a:t>떄문에</a:t>
+            </a:r>
+            <a:r>
+              <a:rPr lang="ko-KR" altLang="en-US" dirty="0">
+                <a:solidFill>
+                  <a:srgbClr val="FFFFFF">
+                    <a:alpha val="70000"/>
+                  </a:srgbClr>
+                </a:solidFill>
+                <a:ea typeface="Microsoft GothicNeo"/>
+                <a:cs typeface="Microsoft GothicNeo"/>
+              </a:rPr>
+              <a:t> 스트림을 만들었다.</a:t>
+            </a:r>
+          </a:p>
+          <a:p>
+            <a:pPr marL="0" indent="0">
+              <a:buNone/>
+            </a:pPr>
+            <a:r>
+              <a:rPr lang="ko-KR" altLang="en-US" dirty="0" err="1">
+                <a:solidFill>
+                  <a:srgbClr val="FFFFFF">
+                    <a:alpha val="70000"/>
+                  </a:srgbClr>
+                </a:solidFill>
+                <a:ea typeface="Microsoft GothicNeo"/>
+                <a:cs typeface="Microsoft GothicNeo"/>
+              </a:rPr>
+              <a:t>How</a:t>
+            </a:r>
+            <a:r>
+              <a:rPr lang="ko-KR" altLang="en-US" dirty="0">
+                <a:solidFill>
+                  <a:srgbClr val="FFFFFF">
+                    <a:alpha val="70000"/>
+                  </a:srgbClr>
+                </a:solidFill>
+                <a:ea typeface="Microsoft GothicNeo"/>
+                <a:cs typeface="Microsoft GothicNeo"/>
+              </a:rPr>
+              <a:t>_ 사실 </a:t>
+            </a:r>
+            <a:r>
+              <a:rPr lang="ko-KR" altLang="en-US" dirty="0" err="1">
+                <a:solidFill>
+                  <a:srgbClr val="FFFFFF">
+                    <a:alpha val="70000"/>
+                  </a:srgbClr>
+                </a:solidFill>
+                <a:ea typeface="Microsoft GothicNeo"/>
+                <a:cs typeface="Microsoft GothicNeo"/>
+              </a:rPr>
+              <a:t>Printf</a:t>
+            </a:r>
+            <a:r>
+              <a:rPr lang="ko-KR" altLang="en-US" dirty="0">
+                <a:solidFill>
+                  <a:srgbClr val="FFFFFF">
+                    <a:alpha val="70000"/>
+                  </a:srgbClr>
+                </a:solidFill>
+                <a:ea typeface="Microsoft GothicNeo"/>
+                <a:cs typeface="Microsoft GothicNeo"/>
+              </a:rPr>
+              <a:t> 든 </a:t>
+            </a:r>
+            <a:r>
+              <a:rPr lang="ko-KR" altLang="en-US" dirty="0" err="1">
+                <a:solidFill>
+                  <a:srgbClr val="FFFFFF">
+                    <a:alpha val="70000"/>
+                  </a:srgbClr>
+                </a:solidFill>
+                <a:ea typeface="Microsoft GothicNeo"/>
+                <a:cs typeface="Microsoft GothicNeo"/>
+              </a:rPr>
+              <a:t>Scanf든</a:t>
+            </a:r>
+            <a:r>
+              <a:rPr lang="ko-KR" altLang="en-US" dirty="0">
+                <a:solidFill>
+                  <a:srgbClr val="FFFFFF">
+                    <a:alpha val="70000"/>
+                  </a:srgbClr>
+                </a:solidFill>
+                <a:ea typeface="Microsoft GothicNeo"/>
+                <a:cs typeface="Microsoft GothicNeo"/>
+              </a:rPr>
+              <a:t> </a:t>
+            </a:r>
+            <a:r>
+              <a:rPr lang="ko-KR" altLang="en-US" dirty="0" err="1">
+                <a:solidFill>
+                  <a:srgbClr val="FFFFFF">
+                    <a:alpha val="70000"/>
+                  </a:srgbClr>
+                </a:solidFill>
+                <a:ea typeface="Microsoft GothicNeo"/>
+                <a:cs typeface="Microsoft GothicNeo"/>
+              </a:rPr>
+              <a:t>fprint를</a:t>
+            </a:r>
+            <a:r>
+              <a:rPr lang="ko-KR" altLang="en-US" dirty="0">
+                <a:solidFill>
+                  <a:srgbClr val="FFFFFF">
+                    <a:alpha val="70000"/>
+                  </a:srgbClr>
+                </a:solidFill>
+                <a:ea typeface="Microsoft GothicNeo"/>
+                <a:cs typeface="Microsoft GothicNeo"/>
+              </a:rPr>
+              <a:t>  내부적으로 </a:t>
+            </a:r>
+            <a:r>
+              <a:rPr lang="ko-KR" altLang="en-US" dirty="0" err="1">
+                <a:solidFill>
+                  <a:srgbClr val="FFFFFF">
+                    <a:alpha val="70000"/>
+                  </a:srgbClr>
+                </a:solidFill>
+                <a:ea typeface="Microsoft GothicNeo"/>
+                <a:cs typeface="Microsoft GothicNeo"/>
+              </a:rPr>
+              <a:t>호출하는데데</a:t>
+            </a:r>
+          </a:p>
+          <a:p>
+            <a:pPr marL="0" indent="0">
+              <a:buNone/>
+            </a:pPr>
+            <a:r>
+              <a:rPr lang="ko-KR" altLang="en-US" dirty="0">
+                <a:solidFill>
+                  <a:srgbClr val="FFFFFF">
+                    <a:alpha val="70000"/>
+                  </a:srgbClr>
+                </a:solidFill>
+                <a:ea typeface="Microsoft GothicNeo"/>
+                <a:cs typeface="Microsoft GothicNeo"/>
+              </a:rPr>
+              <a:t>이는   어셈블리어를 </a:t>
+            </a:r>
+            <a:r>
+              <a:rPr lang="ko-KR" altLang="en-US" dirty="0" err="1">
+                <a:solidFill>
+                  <a:srgbClr val="FFFFFF">
+                    <a:alpha val="70000"/>
+                  </a:srgbClr>
+                </a:solidFill>
+                <a:ea typeface="Microsoft GothicNeo"/>
+                <a:cs typeface="Microsoft GothicNeo"/>
+              </a:rPr>
+              <a:t>안쓰는</a:t>
+            </a:r>
+            <a:r>
+              <a:rPr lang="ko-KR" altLang="en-US" dirty="0">
+                <a:solidFill>
+                  <a:srgbClr val="FFFFFF">
+                    <a:alpha val="70000"/>
+                  </a:srgbClr>
+                </a:solidFill>
+                <a:ea typeface="Microsoft GothicNeo"/>
+                <a:cs typeface="Microsoft GothicNeo"/>
+              </a:rPr>
+              <a:t> 이유처럼 모든 </a:t>
+            </a:r>
+            <a:r>
+              <a:rPr lang="ko-KR" altLang="en-US" dirty="0" err="1">
+                <a:solidFill>
+                  <a:srgbClr val="FFFFFF">
+                    <a:alpha val="70000"/>
+                  </a:srgbClr>
+                </a:solidFill>
+                <a:ea typeface="Microsoft GothicNeo"/>
+                <a:cs typeface="Microsoft GothicNeo"/>
+              </a:rPr>
+              <a:t>I</a:t>
+            </a:r>
+            <a:r>
+              <a:rPr lang="ko-KR" altLang="en-US" dirty="0">
+                <a:solidFill>
+                  <a:srgbClr val="FFFFFF">
+                    <a:alpha val="70000"/>
+                  </a:srgbClr>
+                </a:solidFill>
+                <a:ea typeface="Microsoft GothicNeo"/>
+                <a:cs typeface="Microsoft GothicNeo"/>
+              </a:rPr>
+              <a:t>/</a:t>
+            </a:r>
+            <a:r>
+              <a:rPr lang="ko-KR" altLang="en-US" dirty="0" err="1">
+                <a:solidFill>
+                  <a:srgbClr val="FFFFFF">
+                    <a:alpha val="70000"/>
+                  </a:srgbClr>
+                </a:solidFill>
+                <a:ea typeface="Microsoft GothicNeo"/>
+                <a:cs typeface="Microsoft GothicNeo"/>
+              </a:rPr>
+              <a:t>O장치들이</a:t>
+            </a:r>
+            <a:r>
+              <a:rPr lang="ko-KR" altLang="en-US" dirty="0">
+                <a:solidFill>
+                  <a:srgbClr val="FFFFFF">
+                    <a:alpha val="70000"/>
+                  </a:srgbClr>
+                </a:solidFill>
+                <a:ea typeface="Microsoft GothicNeo"/>
+                <a:cs typeface="Microsoft GothicNeo"/>
+              </a:rPr>
+              <a:t> 공통적으로 사용되는 명령어가 필요하였다. </a:t>
+            </a:r>
+            <a:r>
+              <a:rPr lang="ko-KR" altLang="en-US" dirty="0" err="1">
+                <a:solidFill>
+                  <a:srgbClr val="FFFFFF">
+                    <a:alpha val="70000"/>
+                  </a:srgbClr>
+                </a:solidFill>
+                <a:ea typeface="Microsoft GothicNeo"/>
+                <a:cs typeface="Microsoft GothicNeo"/>
+              </a:rPr>
+              <a:t>Stream을</a:t>
+            </a:r>
+            <a:r>
+              <a:rPr lang="ko-KR" altLang="en-US" dirty="0">
+                <a:solidFill>
+                  <a:srgbClr val="FFFFFF">
+                    <a:alpha val="70000"/>
+                  </a:srgbClr>
+                </a:solidFill>
+                <a:ea typeface="Microsoft GothicNeo"/>
+                <a:cs typeface="Microsoft GothicNeo"/>
+              </a:rPr>
+              <a:t>  FILE 오브젝트를 반환하는 </a:t>
+            </a:r>
+            <a:r>
+              <a:rPr lang="ko-KR" altLang="en-US" dirty="0" err="1">
+                <a:solidFill>
+                  <a:srgbClr val="FFFFFF">
+                    <a:alpha val="70000"/>
+                  </a:srgbClr>
+                </a:solidFill>
+                <a:ea typeface="Microsoft GothicNeo"/>
+                <a:cs typeface="Microsoft GothicNeo"/>
+              </a:rPr>
+              <a:t>Fopen</a:t>
+            </a:r>
+            <a:r>
+              <a:rPr lang="ko-KR" altLang="en-US" dirty="0">
+                <a:solidFill>
+                  <a:srgbClr val="FFFFFF">
+                    <a:alpha val="70000"/>
+                  </a:srgbClr>
+                </a:solidFill>
+                <a:ea typeface="Microsoft GothicNeo"/>
+                <a:cs typeface="Microsoft GothicNeo"/>
+              </a:rPr>
+              <a:t>() 이용해 </a:t>
+            </a:r>
+            <a:r>
+              <a:rPr lang="ko-KR" altLang="en-US" dirty="0" err="1">
+                <a:solidFill>
+                  <a:srgbClr val="FFFFFF">
+                    <a:alpha val="70000"/>
+                  </a:srgbClr>
+                </a:solidFill>
+                <a:ea typeface="Microsoft GothicNeo"/>
+                <a:cs typeface="Microsoft GothicNeo"/>
+              </a:rPr>
+              <a:t>FILE구조체를</a:t>
+            </a:r>
+            <a:r>
+              <a:rPr lang="ko-KR" altLang="en-US" dirty="0">
+                <a:solidFill>
+                  <a:srgbClr val="FFFFFF">
+                    <a:alpha val="70000"/>
+                  </a:srgbClr>
+                </a:solidFill>
+                <a:ea typeface="Microsoft GothicNeo"/>
+                <a:cs typeface="Microsoft GothicNeo"/>
+              </a:rPr>
+              <a:t> 가져오고 파일 입/출력을 사용할 수 있다.</a:t>
+            </a:r>
+          </a:p>
+        </p:txBody>
+      </p:sp>
+    </p:spTree>
+    <p:extLst>
+      <p:ext uri="{BB962C8B-B14F-4D97-AF65-F5344CB8AC3E}">
+        <p14:creationId xmlns:p14="http://schemas.microsoft.com/office/powerpoint/2010/main" val="1122904946"/>
+      </p:ext>
+    </p:extLst>
+  </p:cSld>
+  <p:clrMapOvr>
+    <a:masterClrMapping/>
+  </p:clrMapOvr>
+</p:sld>
+</file>
+
+<file path=ppt/slides/slide24.xml><?xml version="1.0" encoding="utf-8"?>
+<p:sld xmlns:a="http://schemas.openxmlformats.org/drawingml/2006/main" xmlns:r="http://schemas.openxmlformats.org/officeDocument/2006/relationships" xmlns:p="http://schemas.openxmlformats.org/presentationml/2006/main">
+  <p:cSld>
+    <p:spTree>
+      <p:nvGrpSpPr>
+        <p:cNvPr id="1" name=""/>
+        <p:cNvGrpSpPr/>
+        <p:nvPr/>
+      </p:nvGrpSpPr>
+      <p:grpSpPr>
+        <a:xfrm>
+          <a:off x="0" y="0"/>
+          <a:ext cx="0" cy="0"/>
+          <a:chOff x="0" y="0"/>
+          <a:chExt cx="0" cy="0"/>
+        </a:xfrm>
+      </p:grpSpPr>
+      <p:sp>
+        <p:nvSpPr>
+          <p:cNvPr id="2" name="제목 1">
+            <a:extLst>
+              <a:ext uri="{FF2B5EF4-FFF2-40B4-BE49-F238E27FC236}">
                 <a16:creationId xmlns:a16="http://schemas.microsoft.com/office/drawing/2014/main" id="{C3A0C8F3-B8EF-D2DC-C4F5-2368E0DD13BA}"/>
               </a:ext>
             </a:extLst>

</xml_diff>

<commit_message>
[C++ 지식Update] Static_Cast & dynamic_Cast  & template
</commit_message>
<xml_diff>
--- a/전공지식/C언어의 기초/C언어 기초지식.pptx
+++ b/전공지식/C언어의 기초/C언어 기초지식.pptx
@@ -40,6 +40,12 @@
     <p:sldId id="289" r:id="rId34"/>
     <p:sldId id="290" r:id="rId35"/>
     <p:sldId id="291" r:id="rId36"/>
+    <p:sldId id="292" r:id="rId37"/>
+    <p:sldId id="293" r:id="rId38"/>
+    <p:sldId id="294" r:id="rId39"/>
+    <p:sldId id="295" r:id="rId40"/>
+    <p:sldId id="296" r:id="rId41"/>
+    <p:sldId id="297" r:id="rId42"/>
   </p:sldIdLst>
   <p:sldSz cx="12192000" cy="6858000"/>
   <p:notesSz cx="6858000" cy="9144000"/>
@@ -153,6 +159,7 @@
     <p1510:client id="{70AA4CCD-8E10-434E-868F-5C5E0A410C2E}" v="3097" dt="2023-10-17T12:35:51.078"/>
     <p1510:client id="{773FEA85-BD00-400D-8917-366C44315C9D}" v="1719" dt="2023-10-19T11:41:03.164"/>
     <p1510:client id="{95F9D723-334F-40E2-9BD2-493BAD9321A6}" v="1499" dt="2023-10-23T15:06:12.089"/>
+    <p1510:client id="{BF47BEEB-8673-4758-A1D2-68E9E367D2AE}" v="1785" dt="2023-10-24T08:33:50.445"/>
     <p1510:client id="{C0B17A74-5F7D-4C82-8D87-A30C0598D578}" v="167" dt="2023-10-19T10:58:23.895"/>
     <p1510:client id="{CD3A230A-4545-4B5A-8F53-A35FBDF96CF4}" v="889" dt="2023-10-15T10:18:49.371"/>
     <p1510:client id="{DBFDBAC8-DE04-484C-B94C-F71EF475F54E}" v="770" dt="2023-10-22T14:19:39.866"/>
@@ -7115,7 +7122,7 @@
           <a:p>
             <a:fld id="{76969C88-B244-455D-A017-012B25B1ACDD}" type="datetimeFigureOut">
               <a:rPr lang="en-US" smtClean="0"/>
-              <a:t>10/23/2023</a:t>
+              <a:t>10/24/2023</a:t>
             </a:fld>
             <a:endParaRPr lang="en-US"/>
           </a:p>
@@ -7313,7 +7320,7 @@
           <a:p>
             <a:fld id="{76969C88-B244-455D-A017-012B25B1ACDD}" type="datetimeFigureOut">
               <a:rPr lang="en-US" smtClean="0"/>
-              <a:t>10/23/2023</a:t>
+              <a:t>10/24/2023</a:t>
             </a:fld>
             <a:endParaRPr lang="en-US"/>
           </a:p>
@@ -7521,7 +7528,7 @@
           <a:p>
             <a:fld id="{76969C88-B244-455D-A017-012B25B1ACDD}" type="datetimeFigureOut">
               <a:rPr lang="en-US" smtClean="0"/>
-              <a:t>10/23/2023</a:t>
+              <a:t>10/24/2023</a:t>
             </a:fld>
             <a:endParaRPr lang="en-US"/>
           </a:p>
@@ -7719,7 +7726,7 @@
           <a:p>
             <a:fld id="{76969C88-B244-455D-A017-012B25B1ACDD}" type="datetimeFigureOut">
               <a:rPr lang="en-US" smtClean="0"/>
-              <a:t>10/23/2023</a:t>
+              <a:t>10/24/2023</a:t>
             </a:fld>
             <a:endParaRPr lang="en-US"/>
           </a:p>
@@ -7994,7 +8001,7 @@
           <a:p>
             <a:fld id="{76969C88-B244-455D-A017-012B25B1ACDD}" type="datetimeFigureOut">
               <a:rPr lang="en-US" smtClean="0"/>
-              <a:t>10/23/2023</a:t>
+              <a:t>10/24/2023</a:t>
             </a:fld>
             <a:endParaRPr lang="en-US"/>
           </a:p>
@@ -8259,7 +8266,7 @@
           <a:p>
             <a:fld id="{76969C88-B244-455D-A017-012B25B1ACDD}" type="datetimeFigureOut">
               <a:rPr lang="en-US" smtClean="0"/>
-              <a:t>10/23/2023</a:t>
+              <a:t>10/24/2023</a:t>
             </a:fld>
             <a:endParaRPr lang="en-US"/>
           </a:p>
@@ -8671,7 +8678,7 @@
           <a:p>
             <a:fld id="{76969C88-B244-455D-A017-012B25B1ACDD}" type="datetimeFigureOut">
               <a:rPr lang="en-US" smtClean="0"/>
-              <a:t>10/23/2023</a:t>
+              <a:t>10/24/2023</a:t>
             </a:fld>
             <a:endParaRPr lang="en-US"/>
           </a:p>
@@ -8812,7 +8819,7 @@
           <a:p>
             <a:fld id="{76969C88-B244-455D-A017-012B25B1ACDD}" type="datetimeFigureOut">
               <a:rPr lang="en-US" smtClean="0"/>
-              <a:t>10/23/2023</a:t>
+              <a:t>10/24/2023</a:t>
             </a:fld>
             <a:endParaRPr lang="en-US"/>
           </a:p>
@@ -8925,7 +8932,7 @@
           <a:p>
             <a:fld id="{76969C88-B244-455D-A017-012B25B1ACDD}" type="datetimeFigureOut">
               <a:rPr lang="en-US" smtClean="0"/>
-              <a:t>10/23/2023</a:t>
+              <a:t>10/24/2023</a:t>
             </a:fld>
             <a:endParaRPr lang="en-US"/>
           </a:p>
@@ -9236,7 +9243,7 @@
           <a:p>
             <a:fld id="{76969C88-B244-455D-A017-012B25B1ACDD}" type="datetimeFigureOut">
               <a:rPr lang="en-US" smtClean="0"/>
-              <a:t>10/23/2023</a:t>
+              <a:t>10/24/2023</a:t>
             </a:fld>
             <a:endParaRPr lang="en-US"/>
           </a:p>
@@ -9527,7 +9534,7 @@
           <a:p>
             <a:fld id="{76969C88-B244-455D-A017-012B25B1ACDD}" type="datetimeFigureOut">
               <a:rPr lang="en-US" smtClean="0"/>
-              <a:t>10/23/2023</a:t>
+              <a:t>10/24/2023</a:t>
             </a:fld>
             <a:endParaRPr lang="en-US"/>
           </a:p>
@@ -10277,7 +10284,7 @@
             <a:fld id="{76969C88-B244-455D-A017-012B25B1ACDD}" type="datetimeFigureOut">
               <a:rPr lang="en-US" smtClean="0"/>
               <a:pPr/>
-              <a:t>10/23/2023</a:t>
+              <a:t>10/24/2023</a:t>
             </a:fld>
             <a:endParaRPr lang="en-US"/>
           </a:p>
@@ -26526,6 +26533,1692 @@
 </p:sld>
 </file>
 
+<file path=ppt/slides/slide36.xml><?xml version="1.0" encoding="utf-8"?>
+<p:sld xmlns:a="http://schemas.openxmlformats.org/drawingml/2006/main" xmlns:r="http://schemas.openxmlformats.org/officeDocument/2006/relationships" xmlns:p="http://schemas.openxmlformats.org/presentationml/2006/main">
+  <p:cSld>
+    <p:spTree>
+      <p:nvGrpSpPr>
+        <p:cNvPr id="1" name=""/>
+        <p:cNvGrpSpPr/>
+        <p:nvPr/>
+      </p:nvGrpSpPr>
+      <p:grpSpPr>
+        <a:xfrm>
+          <a:off x="0" y="0"/>
+          <a:ext cx="0" cy="0"/>
+          <a:chOff x="0" y="0"/>
+          <a:chExt cx="0" cy="0"/>
+        </a:xfrm>
+      </p:grpSpPr>
+      <p:sp>
+        <p:nvSpPr>
+          <p:cNvPr id="2" name="제목 1">
+            <a:extLst>
+              <a:ext uri="{FF2B5EF4-FFF2-40B4-BE49-F238E27FC236}">
+                <a16:creationId xmlns:a16="http://schemas.microsoft.com/office/drawing/2014/main" id="{28E5C763-E405-F455-74FB-742E7A4C52A5}"/>
+              </a:ext>
+            </a:extLst>
+          </p:cNvPr>
+          <p:cNvSpPr>
+            <a:spLocks noGrp="1"/>
+          </p:cNvSpPr>
+          <p:nvPr>
+            <p:ph type="title"/>
+          </p:nvPr>
+        </p:nvSpPr>
+        <p:spPr/>
+        <p:txBody>
+          <a:bodyPr/>
+          <a:lstStyle/>
+          <a:p>
+            <a:r>
+              <a:rPr lang="ko-KR" altLang="en-US" dirty="0">
+                <a:ea typeface="Microsoft GothicNeo"/>
+                <a:cs typeface="Microsoft GothicNeo"/>
+              </a:rPr>
+              <a:t>&lt;</a:t>
+            </a:r>
+            <a:r>
+              <a:rPr lang="ko-KR" altLang="en-US" dirty="0" err="1">
+                <a:ea typeface="Microsoft GothicNeo"/>
+                <a:cs typeface="Microsoft GothicNeo"/>
+              </a:rPr>
+              <a:t>static_Cast</a:t>
+            </a:r>
+            <a:r>
+              <a:rPr lang="ko-KR" altLang="en-US" dirty="0">
+                <a:ea typeface="Microsoft GothicNeo"/>
+                <a:cs typeface="Microsoft GothicNeo"/>
+              </a:rPr>
+              <a:t> &amp; </a:t>
+            </a:r>
+            <a:r>
+              <a:rPr lang="ko-KR" altLang="en-US" dirty="0" err="1">
+                <a:ea typeface="Microsoft GothicNeo"/>
+                <a:cs typeface="Microsoft GothicNeo"/>
+              </a:rPr>
+              <a:t>dynamic_Cast</a:t>
+            </a:r>
+            <a:r>
+              <a:rPr lang="ko-KR" altLang="en-US" dirty="0">
+                <a:ea typeface="Microsoft GothicNeo"/>
+                <a:cs typeface="Microsoft GothicNeo"/>
+              </a:rPr>
+              <a:t>&gt; 이유</a:t>
+            </a:r>
+            <a:endParaRPr lang="ko-KR" altLang="en-US" dirty="0"/>
+          </a:p>
+        </p:txBody>
+      </p:sp>
+      <p:sp>
+        <p:nvSpPr>
+          <p:cNvPr id="3" name="내용 개체 틀 2">
+            <a:extLst>
+              <a:ext uri="{FF2B5EF4-FFF2-40B4-BE49-F238E27FC236}">
+                <a16:creationId xmlns:a16="http://schemas.microsoft.com/office/drawing/2014/main" id="{EB351E36-5995-95F8-DAEC-54A86317B2A3}"/>
+              </a:ext>
+            </a:extLst>
+          </p:cNvPr>
+          <p:cNvSpPr>
+            <a:spLocks noGrp="1"/>
+          </p:cNvSpPr>
+          <p:nvPr>
+            <p:ph idx="1"/>
+          </p:nvPr>
+        </p:nvSpPr>
+        <p:spPr/>
+        <p:txBody>
+          <a:bodyPr lIns="109728" tIns="109728" rIns="109728" bIns="91440" anchor="t"/>
+          <a:lstStyle/>
+          <a:p>
+            <a:r>
+              <a:rPr lang="ko-KR" altLang="en-US" dirty="0" err="1">
+                <a:solidFill>
+                  <a:srgbClr val="FFFFFF">
+                    <a:alpha val="70000"/>
+                  </a:srgbClr>
+                </a:solidFill>
+                <a:ea typeface="Microsoft GothicNeo"/>
+                <a:cs typeface="Microsoft GothicNeo"/>
+              </a:rPr>
+              <a:t>c언어</a:t>
+            </a:r>
+            <a:r>
+              <a:rPr lang="ko-KR" altLang="en-US" dirty="0">
+                <a:solidFill>
+                  <a:srgbClr val="FFFFFF">
+                    <a:alpha val="70000"/>
+                  </a:srgbClr>
+                </a:solidFill>
+                <a:ea typeface="Microsoft GothicNeo"/>
+                <a:cs typeface="Microsoft GothicNeo"/>
+              </a:rPr>
+              <a:t> 에서는 </a:t>
+            </a:r>
+            <a:r>
+              <a:rPr lang="ko-KR" altLang="en-US" dirty="0" err="1">
+                <a:solidFill>
+                  <a:srgbClr val="FFFFFF">
+                    <a:alpha val="70000"/>
+                  </a:srgbClr>
+                </a:solidFill>
+                <a:ea typeface="Microsoft GothicNeo"/>
+                <a:cs typeface="Microsoft GothicNeo"/>
+              </a:rPr>
+              <a:t>Cast</a:t>
+            </a:r>
+            <a:r>
+              <a:rPr lang="ko-KR" altLang="en-US" dirty="0">
+                <a:solidFill>
+                  <a:srgbClr val="FFFFFF">
+                    <a:alpha val="70000"/>
+                  </a:srgbClr>
+                </a:solidFill>
+                <a:ea typeface="Microsoft GothicNeo"/>
+                <a:cs typeface="Microsoft GothicNeo"/>
+              </a:rPr>
+              <a:t> </a:t>
+            </a:r>
+            <a:r>
+              <a:rPr lang="ko-KR" altLang="en-US" dirty="0" err="1">
+                <a:solidFill>
+                  <a:srgbClr val="FFFFFF">
+                    <a:alpha val="70000"/>
+                  </a:srgbClr>
+                </a:solidFill>
+                <a:ea typeface="Microsoft GothicNeo"/>
+                <a:cs typeface="Microsoft GothicNeo"/>
+              </a:rPr>
+              <a:t>연산자에대해</a:t>
+            </a:r>
+            <a:r>
+              <a:rPr lang="ko-KR" altLang="en-US" dirty="0">
+                <a:solidFill>
+                  <a:srgbClr val="FFFFFF">
+                    <a:alpha val="70000"/>
+                  </a:srgbClr>
+                </a:solidFill>
+                <a:ea typeface="Microsoft GothicNeo"/>
+                <a:cs typeface="Microsoft GothicNeo"/>
+              </a:rPr>
+              <a:t> 관대했다.</a:t>
+            </a:r>
+          </a:p>
+          <a:p>
+            <a:r>
+              <a:rPr lang="ko-KR" altLang="en-US" dirty="0">
+                <a:solidFill>
+                  <a:srgbClr val="FFFFFF">
+                    <a:alpha val="70000"/>
+                  </a:srgbClr>
+                </a:solidFill>
+                <a:ea typeface="Microsoft GothicNeo"/>
+                <a:cs typeface="Microsoft GothicNeo"/>
+              </a:rPr>
+              <a:t>C++로 넘어오면서 데이터 타입에 엄격해지자는 </a:t>
+            </a:r>
+            <a:r>
+              <a:rPr lang="ko-KR" altLang="en-US" dirty="0" err="1">
+                <a:solidFill>
+                  <a:srgbClr val="FFFFFF">
+                    <a:alpha val="70000"/>
+                  </a:srgbClr>
+                </a:solidFill>
+                <a:ea typeface="Microsoft GothicNeo"/>
+                <a:cs typeface="Microsoft GothicNeo"/>
+              </a:rPr>
+              <a:t>목표가있었는데</a:t>
+            </a:r>
+            <a:r>
+              <a:rPr lang="ko-KR" altLang="en-US" dirty="0">
+                <a:solidFill>
+                  <a:srgbClr val="FFFFFF">
+                    <a:alpha val="70000"/>
+                  </a:srgbClr>
+                </a:solidFill>
+                <a:ea typeface="Microsoft GothicNeo"/>
+                <a:cs typeface="Microsoft GothicNeo"/>
+              </a:rPr>
+              <a:t> 그 중하나이다.</a:t>
+            </a:r>
+          </a:p>
+          <a:p>
+            <a:pPr marL="0" indent="0">
+              <a:buNone/>
+            </a:pPr>
+            <a:r>
+              <a:rPr lang="ko-KR" altLang="en-US" dirty="0" err="1">
+                <a:solidFill>
+                  <a:srgbClr val="FFFFFF">
+                    <a:alpha val="70000"/>
+                  </a:srgbClr>
+                </a:solidFill>
+                <a:ea typeface="Microsoft GothicNeo"/>
+                <a:cs typeface="Microsoft GothicNeo"/>
+              </a:rPr>
+              <a:t>C언어의</a:t>
+            </a:r>
+            <a:r>
+              <a:rPr lang="ko-KR" altLang="en-US" dirty="0">
+                <a:solidFill>
+                  <a:srgbClr val="FFFFFF">
+                    <a:alpha val="70000"/>
+                  </a:srgbClr>
+                </a:solidFill>
+                <a:ea typeface="Microsoft GothicNeo"/>
+                <a:cs typeface="Microsoft GothicNeo"/>
+              </a:rPr>
+              <a:t> 문제점 예시 =&gt; </a:t>
+            </a:r>
+            <a:r>
+              <a:rPr lang="ko-KR" altLang="en-US" dirty="0" err="1">
+                <a:solidFill>
+                  <a:srgbClr val="FFFFFF">
+                    <a:alpha val="70000"/>
+                  </a:srgbClr>
+                </a:solidFill>
+                <a:ea typeface="Microsoft GothicNeo"/>
+                <a:cs typeface="Microsoft GothicNeo"/>
+              </a:rPr>
+              <a:t>int</a:t>
+            </a:r>
+            <a:r>
+              <a:rPr lang="ko-KR" altLang="en-US" dirty="0">
+                <a:solidFill>
+                  <a:srgbClr val="FFFFFF">
+                    <a:alpha val="70000"/>
+                  </a:srgbClr>
+                </a:solidFill>
+                <a:ea typeface="Microsoft GothicNeo"/>
+                <a:cs typeface="Microsoft GothicNeo"/>
+              </a:rPr>
+              <a:t>* </a:t>
+            </a:r>
+            <a:r>
+              <a:rPr lang="ko-KR" altLang="en-US" dirty="0" err="1">
+                <a:solidFill>
+                  <a:srgbClr val="FFFFFF">
+                    <a:alpha val="70000"/>
+                  </a:srgbClr>
+                </a:solidFill>
+                <a:ea typeface="Microsoft GothicNeo"/>
+                <a:cs typeface="Microsoft GothicNeo"/>
+              </a:rPr>
+              <a:t>ip</a:t>
+            </a:r>
+            <a:r>
+              <a:rPr lang="ko-KR" altLang="en-US" dirty="0">
+                <a:solidFill>
+                  <a:srgbClr val="FFFFFF">
+                    <a:alpha val="70000"/>
+                  </a:srgbClr>
+                </a:solidFill>
+                <a:ea typeface="Microsoft GothicNeo"/>
+                <a:cs typeface="Microsoft GothicNeo"/>
+              </a:rPr>
+              <a:t>;  </a:t>
+            </a:r>
+            <a:r>
+              <a:rPr lang="ko-KR" altLang="en-US" dirty="0" err="1">
+                <a:solidFill>
+                  <a:srgbClr val="FFFFFF">
+                    <a:alpha val="70000"/>
+                  </a:srgbClr>
+                </a:solidFill>
+                <a:ea typeface="Microsoft GothicNeo"/>
+                <a:cs typeface="Microsoft GothicNeo"/>
+              </a:rPr>
+              <a:t>double</a:t>
+            </a:r>
+            <a:r>
+              <a:rPr lang="ko-KR" altLang="en-US" dirty="0">
+                <a:solidFill>
+                  <a:srgbClr val="FFFFFF">
+                    <a:alpha val="70000"/>
+                  </a:srgbClr>
+                </a:solidFill>
+                <a:ea typeface="Microsoft GothicNeo"/>
+                <a:cs typeface="Microsoft GothicNeo"/>
+              </a:rPr>
+              <a:t>* </a:t>
+            </a:r>
+            <a:r>
+              <a:rPr lang="ko-KR" altLang="en-US" dirty="0" err="1">
+                <a:solidFill>
+                  <a:srgbClr val="FFFFFF">
+                    <a:alpha val="70000"/>
+                  </a:srgbClr>
+                </a:solidFill>
+                <a:ea typeface="Microsoft GothicNeo"/>
+                <a:cs typeface="Microsoft GothicNeo"/>
+              </a:rPr>
+              <a:t>dp</a:t>
+            </a:r>
+            <a:r>
+              <a:rPr lang="ko-KR" altLang="en-US" dirty="0">
+                <a:solidFill>
+                  <a:srgbClr val="FFFFFF">
+                    <a:alpha val="70000"/>
+                  </a:srgbClr>
+                </a:solidFill>
+                <a:ea typeface="Microsoft GothicNeo"/>
+                <a:cs typeface="Microsoft GothicNeo"/>
+              </a:rPr>
+              <a:t> = (</a:t>
+            </a:r>
+            <a:r>
+              <a:rPr lang="ko-KR" altLang="en-US" dirty="0" err="1">
+                <a:solidFill>
+                  <a:srgbClr val="FFFFFF">
+                    <a:alpha val="70000"/>
+                  </a:srgbClr>
+                </a:solidFill>
+                <a:ea typeface="Microsoft GothicNeo"/>
+                <a:cs typeface="Microsoft GothicNeo"/>
+              </a:rPr>
+              <a:t>double</a:t>
+            </a:r>
+            <a:r>
+              <a:rPr lang="ko-KR" altLang="en-US" dirty="0">
+                <a:solidFill>
+                  <a:srgbClr val="FFFFFF">
+                    <a:alpha val="70000"/>
+                  </a:srgbClr>
+                </a:solidFill>
+                <a:ea typeface="Microsoft GothicNeo"/>
+                <a:cs typeface="Microsoft GothicNeo"/>
+              </a:rPr>
+              <a:t>*) </a:t>
+            </a:r>
+            <a:r>
+              <a:rPr lang="ko-KR" altLang="en-US" dirty="0" err="1">
+                <a:solidFill>
+                  <a:srgbClr val="FFFFFF">
+                    <a:alpha val="70000"/>
+                  </a:srgbClr>
+                </a:solidFill>
+                <a:ea typeface="Microsoft GothicNeo"/>
+                <a:cs typeface="Microsoft GothicNeo"/>
+              </a:rPr>
+              <a:t>ip</a:t>
+            </a:r>
+            <a:r>
+              <a:rPr lang="ko-KR" altLang="en-US" dirty="0">
+                <a:solidFill>
+                  <a:srgbClr val="FFFFFF">
+                    <a:alpha val="70000"/>
+                  </a:srgbClr>
+                </a:solidFill>
+                <a:ea typeface="Microsoft GothicNeo"/>
+                <a:cs typeface="Microsoft GothicNeo"/>
+              </a:rPr>
+              <a:t>; //에러가 </a:t>
+            </a:r>
+            <a:r>
+              <a:rPr lang="ko-KR" altLang="en-US" dirty="0" err="1">
+                <a:solidFill>
+                  <a:srgbClr val="FFFFFF">
+                    <a:alpha val="70000"/>
+                  </a:srgbClr>
+                </a:solidFill>
+                <a:ea typeface="Microsoft GothicNeo"/>
+                <a:cs typeface="Microsoft GothicNeo"/>
+              </a:rPr>
+              <a:t>안났음</a:t>
+            </a:r>
+            <a:r>
+              <a:rPr lang="ko-KR" altLang="en-US" dirty="0">
+                <a:solidFill>
+                  <a:srgbClr val="FFFFFF">
+                    <a:alpha val="70000"/>
+                  </a:srgbClr>
+                </a:solidFill>
+                <a:ea typeface="Microsoft GothicNeo"/>
+                <a:cs typeface="Microsoft GothicNeo"/>
+              </a:rPr>
+              <a:t>.</a:t>
+            </a:r>
+          </a:p>
+          <a:p>
+            <a:pPr marL="0" indent="0">
+              <a:buNone/>
+            </a:pPr>
+            <a:r>
+              <a:rPr lang="ko-KR" altLang="en-US" dirty="0" err="1">
+                <a:solidFill>
+                  <a:srgbClr val="FFFFFF">
+                    <a:alpha val="70000"/>
+                  </a:srgbClr>
+                </a:solidFill>
+                <a:ea typeface="Microsoft GothicNeo"/>
+                <a:cs typeface="Microsoft GothicNeo"/>
+              </a:rPr>
+              <a:t>Int와</a:t>
+            </a:r>
+            <a:r>
+              <a:rPr lang="ko-KR" altLang="en-US" dirty="0">
+                <a:solidFill>
+                  <a:srgbClr val="FFFFFF">
+                    <a:alpha val="70000"/>
+                  </a:srgbClr>
+                </a:solidFill>
+                <a:ea typeface="Microsoft GothicNeo"/>
+                <a:cs typeface="Microsoft GothicNeo"/>
+              </a:rPr>
+              <a:t> </a:t>
+            </a:r>
+            <a:r>
+              <a:rPr lang="ko-KR" altLang="en-US" dirty="0" err="1">
+                <a:solidFill>
+                  <a:srgbClr val="FFFFFF">
+                    <a:alpha val="70000"/>
+                  </a:srgbClr>
+                </a:solidFill>
+                <a:ea typeface="Microsoft GothicNeo"/>
+                <a:cs typeface="Microsoft GothicNeo"/>
+              </a:rPr>
+              <a:t>double은</a:t>
+            </a:r>
+            <a:r>
+              <a:rPr lang="ko-KR" altLang="en-US" dirty="0">
+                <a:solidFill>
+                  <a:srgbClr val="FFFFFF">
+                    <a:alpha val="70000"/>
+                  </a:srgbClr>
+                </a:solidFill>
+                <a:ea typeface="Microsoft GothicNeo"/>
+                <a:cs typeface="Microsoft GothicNeo"/>
+              </a:rPr>
+              <a:t> 데이터표현이 다르기 때문에 값이 이상해짐</a:t>
+            </a:r>
+          </a:p>
+        </p:txBody>
+      </p:sp>
+    </p:spTree>
+    <p:extLst>
+      <p:ext uri="{BB962C8B-B14F-4D97-AF65-F5344CB8AC3E}">
+        <p14:creationId xmlns:p14="http://schemas.microsoft.com/office/powerpoint/2010/main" val="3867472867"/>
+      </p:ext>
+    </p:extLst>
+  </p:cSld>
+  <p:clrMapOvr>
+    <a:masterClrMapping/>
+  </p:clrMapOvr>
+</p:sld>
+</file>
+
+<file path=ppt/slides/slide37.xml><?xml version="1.0" encoding="utf-8"?>
+<p:sld xmlns:a="http://schemas.openxmlformats.org/drawingml/2006/main" xmlns:r="http://schemas.openxmlformats.org/officeDocument/2006/relationships" xmlns:p="http://schemas.openxmlformats.org/presentationml/2006/main">
+  <p:cSld>
+    <p:spTree>
+      <p:nvGrpSpPr>
+        <p:cNvPr id="1" name=""/>
+        <p:cNvGrpSpPr/>
+        <p:nvPr/>
+      </p:nvGrpSpPr>
+      <p:grpSpPr>
+        <a:xfrm>
+          <a:off x="0" y="0"/>
+          <a:ext cx="0" cy="0"/>
+          <a:chOff x="0" y="0"/>
+          <a:chExt cx="0" cy="0"/>
+        </a:xfrm>
+      </p:grpSpPr>
+      <p:sp>
+        <p:nvSpPr>
+          <p:cNvPr id="2" name="제목 1">
+            <a:extLst>
+              <a:ext uri="{FF2B5EF4-FFF2-40B4-BE49-F238E27FC236}">
+                <a16:creationId xmlns:a16="http://schemas.microsoft.com/office/drawing/2014/main" id="{F3BB575E-898F-202E-F812-033D75C4182A}"/>
+              </a:ext>
+            </a:extLst>
+          </p:cNvPr>
+          <p:cNvSpPr>
+            <a:spLocks noGrp="1"/>
+          </p:cNvSpPr>
+          <p:nvPr>
+            <p:ph type="title"/>
+          </p:nvPr>
+        </p:nvSpPr>
+        <p:spPr/>
+        <p:txBody>
+          <a:bodyPr/>
+          <a:lstStyle/>
+          <a:p>
+            <a:r>
+              <a:rPr lang="en-US" altLang="ko-KR" dirty="0">
+                <a:ea typeface="+mj-lt"/>
+                <a:cs typeface="+mj-lt"/>
+              </a:rPr>
+              <a:t>&lt;</a:t>
+            </a:r>
+            <a:r>
+              <a:rPr lang="ko-KR" altLang="en-US" dirty="0">
+                <a:ea typeface="+mj-lt"/>
+                <a:cs typeface="+mj-lt"/>
+              </a:rPr>
+              <a:t> </a:t>
+            </a:r>
+            <a:r>
+              <a:rPr lang="ko-KR" dirty="0" err="1">
+                <a:ea typeface="+mj-lt"/>
+                <a:cs typeface="+mj-lt"/>
+              </a:rPr>
+              <a:t>static_Cast</a:t>
+            </a:r>
+            <a:r>
+              <a:rPr lang="ko-KR" altLang="en-US">
+                <a:ea typeface="+mj-lt"/>
+                <a:cs typeface="+mj-lt"/>
+              </a:rPr>
+              <a:t> </a:t>
+            </a:r>
+            <a:r>
+              <a:rPr lang="en-US" altLang="ko-KR">
+                <a:ea typeface="+mj-lt"/>
+                <a:cs typeface="+mj-lt"/>
+              </a:rPr>
+              <a:t>&gt;</a:t>
+            </a:r>
+            <a:endParaRPr lang="ko-KR"/>
+          </a:p>
+        </p:txBody>
+      </p:sp>
+      <p:sp>
+        <p:nvSpPr>
+          <p:cNvPr id="3" name="내용 개체 틀 2">
+            <a:extLst>
+              <a:ext uri="{FF2B5EF4-FFF2-40B4-BE49-F238E27FC236}">
+                <a16:creationId xmlns:a16="http://schemas.microsoft.com/office/drawing/2014/main" id="{B5BA2561-B58E-D379-D96D-8DFC8105A352}"/>
+              </a:ext>
+            </a:extLst>
+          </p:cNvPr>
+          <p:cNvSpPr>
+            <a:spLocks noGrp="1"/>
+          </p:cNvSpPr>
+          <p:nvPr>
+            <p:ph idx="1"/>
+          </p:nvPr>
+        </p:nvSpPr>
+        <p:spPr/>
+        <p:txBody>
+          <a:bodyPr lIns="109728" tIns="109728" rIns="109728" bIns="91440" anchor="t"/>
+          <a:lstStyle/>
+          <a:p>
+            <a:r>
+              <a:rPr lang="ko-KR" altLang="en-US" dirty="0" err="1">
+                <a:solidFill>
+                  <a:srgbClr val="FFFFFF">
+                    <a:alpha val="70000"/>
+                  </a:srgbClr>
+                </a:solidFill>
+                <a:ea typeface="Microsoft GothicNeo"/>
+                <a:cs typeface="Microsoft GothicNeo"/>
+              </a:rPr>
+              <a:t>Int</a:t>
+            </a:r>
+            <a:r>
+              <a:rPr lang="ko-KR" altLang="en-US" dirty="0">
+                <a:solidFill>
+                  <a:srgbClr val="FFFFFF">
+                    <a:alpha val="70000"/>
+                  </a:srgbClr>
+                </a:solidFill>
+                <a:ea typeface="Microsoft GothicNeo"/>
+                <a:cs typeface="Microsoft GothicNeo"/>
+              </a:rPr>
+              <a:t> </a:t>
+            </a:r>
+            <a:r>
+              <a:rPr lang="ko-KR" altLang="en-US" dirty="0" err="1">
+                <a:solidFill>
+                  <a:srgbClr val="FFFFFF">
+                    <a:alpha val="70000"/>
+                  </a:srgbClr>
+                </a:solidFill>
+                <a:ea typeface="Microsoft GothicNeo"/>
+                <a:cs typeface="Microsoft GothicNeo"/>
+              </a:rPr>
+              <a:t>i_num</a:t>
+            </a:r>
+            <a:r>
+              <a:rPr lang="ko-KR" altLang="en-US" dirty="0">
+                <a:solidFill>
+                  <a:srgbClr val="FFFFFF">
+                    <a:alpha val="70000"/>
+                  </a:srgbClr>
+                </a:solidFill>
+                <a:ea typeface="Microsoft GothicNeo"/>
+                <a:cs typeface="Microsoft GothicNeo"/>
+              </a:rPr>
+              <a:t> = </a:t>
+            </a:r>
+            <a:r>
+              <a:rPr lang="ko-KR" altLang="en-US" dirty="0" err="1">
+                <a:solidFill>
+                  <a:srgbClr val="FFFFFF">
+                    <a:alpha val="70000"/>
+                  </a:srgbClr>
+                </a:solidFill>
+                <a:ea typeface="Microsoft GothicNeo"/>
+                <a:cs typeface="Microsoft GothicNeo"/>
+              </a:rPr>
+              <a:t>Static_cast</a:t>
+            </a:r>
+            <a:r>
+              <a:rPr lang="ko-KR" altLang="en-US" dirty="0">
+                <a:solidFill>
+                  <a:srgbClr val="FFFFFF">
+                    <a:alpha val="70000"/>
+                  </a:srgbClr>
+                </a:solidFill>
+                <a:ea typeface="Microsoft GothicNeo"/>
+                <a:cs typeface="Microsoft GothicNeo"/>
+              </a:rPr>
+              <a:t>&lt;</a:t>
+            </a:r>
+            <a:r>
+              <a:rPr lang="ko-KR" altLang="en-US" dirty="0" err="1">
+                <a:solidFill>
+                  <a:srgbClr val="FFFFFF">
+                    <a:alpha val="70000"/>
+                  </a:srgbClr>
+                </a:solidFill>
+                <a:ea typeface="Microsoft GothicNeo"/>
+                <a:cs typeface="Microsoft GothicNeo"/>
+              </a:rPr>
+              <a:t>int</a:t>
+            </a:r>
+            <a:r>
+              <a:rPr lang="ko-KR" altLang="en-US" dirty="0">
+                <a:solidFill>
+                  <a:srgbClr val="FFFFFF">
+                    <a:alpha val="70000"/>
+                  </a:srgbClr>
+                </a:solidFill>
+                <a:ea typeface="Microsoft GothicNeo"/>
+                <a:cs typeface="Microsoft GothicNeo"/>
+              </a:rPr>
+              <a:t>&gt;(</a:t>
+            </a:r>
+            <a:r>
+              <a:rPr lang="ko-KR" altLang="en-US" dirty="0" err="1">
+                <a:solidFill>
+                  <a:srgbClr val="FFFFFF">
+                    <a:alpha val="70000"/>
+                  </a:srgbClr>
+                </a:solidFill>
+                <a:ea typeface="Microsoft GothicNeo"/>
+                <a:cs typeface="Microsoft GothicNeo"/>
+              </a:rPr>
+              <a:t>d_num</a:t>
+            </a:r>
+            <a:r>
+              <a:rPr lang="ko-KR" altLang="en-US" dirty="0">
+                <a:solidFill>
+                  <a:srgbClr val="FFFFFF">
+                    <a:alpha val="70000"/>
+                  </a:srgbClr>
+                </a:solidFill>
+                <a:ea typeface="Microsoft GothicNeo"/>
+                <a:cs typeface="Microsoft GothicNeo"/>
+              </a:rPr>
+              <a:t>); </a:t>
+            </a:r>
+            <a:r>
+              <a:rPr lang="ko-KR" altLang="en-US" dirty="0" err="1">
+                <a:solidFill>
+                  <a:srgbClr val="FFFFFF">
+                    <a:alpha val="70000"/>
+                  </a:srgbClr>
+                </a:solidFill>
+                <a:ea typeface="Microsoft GothicNeo"/>
+                <a:cs typeface="Microsoft GothicNeo"/>
+              </a:rPr>
+              <a:t>를</a:t>
+            </a:r>
+            <a:r>
+              <a:rPr lang="ko-KR" altLang="en-US" dirty="0">
+                <a:solidFill>
+                  <a:srgbClr val="FFFFFF">
+                    <a:alpha val="70000"/>
+                  </a:srgbClr>
+                </a:solidFill>
+                <a:ea typeface="Microsoft GothicNeo"/>
+                <a:cs typeface="Microsoft GothicNeo"/>
+              </a:rPr>
+              <a:t> 하면 데이터 타입을 검사하며 변환을 해준다.</a:t>
+            </a:r>
+          </a:p>
+          <a:p>
+            <a:pPr marL="0" indent="0">
+              <a:buNone/>
+            </a:pPr>
+            <a:r>
+              <a:rPr lang="ko-KR" altLang="en-US" dirty="0">
+                <a:solidFill>
+                  <a:srgbClr val="FFFFFF">
+                    <a:alpha val="70000"/>
+                  </a:srgbClr>
+                </a:solidFill>
+                <a:ea typeface="Microsoft GothicNeo"/>
+                <a:cs typeface="Microsoft GothicNeo"/>
+              </a:rPr>
+              <a:t>업 캐스팅 , 다운캐스팅 </a:t>
+            </a:r>
+            <a:r>
+              <a:rPr lang="ko-KR" altLang="en-US" dirty="0" err="1">
+                <a:solidFill>
+                  <a:srgbClr val="FFFFFF">
+                    <a:alpha val="70000"/>
+                  </a:srgbClr>
+                </a:solidFill>
+                <a:ea typeface="Microsoft GothicNeo"/>
+                <a:cs typeface="Microsoft GothicNeo"/>
+              </a:rPr>
+              <a:t>처럼</a:t>
+            </a:r>
+            <a:r>
+              <a:rPr lang="ko-KR" altLang="en-US" dirty="0">
+                <a:solidFill>
+                  <a:srgbClr val="FFFFFF">
+                    <a:alpha val="70000"/>
+                  </a:srgbClr>
+                </a:solidFill>
+                <a:ea typeface="Microsoft GothicNeo"/>
+                <a:cs typeface="Microsoft GothicNeo"/>
+              </a:rPr>
+              <a:t> 객체를 대상으로 </a:t>
+            </a:r>
+            <a:r>
+              <a:rPr lang="ko-KR" altLang="en-US" dirty="0" err="1">
+                <a:solidFill>
+                  <a:srgbClr val="FFFFFF">
+                    <a:alpha val="70000"/>
+                  </a:srgbClr>
+                </a:solidFill>
+                <a:ea typeface="Microsoft GothicNeo"/>
+                <a:cs typeface="Microsoft GothicNeo"/>
+              </a:rPr>
+              <a:t>사용할수도있다</a:t>
+            </a:r>
+            <a:r>
+              <a:rPr lang="ko-KR" altLang="en-US" dirty="0">
+                <a:solidFill>
+                  <a:srgbClr val="FFFFFF">
+                    <a:alpha val="70000"/>
+                  </a:srgbClr>
+                </a:solidFill>
+                <a:ea typeface="Microsoft GothicNeo"/>
+                <a:cs typeface="Microsoft GothicNeo"/>
+              </a:rPr>
+              <a:t>.</a:t>
+            </a:r>
+          </a:p>
+          <a:p>
+            <a:pPr marL="0" indent="0">
+              <a:buNone/>
+            </a:pPr>
+            <a:r>
+              <a:rPr lang="ko-KR" altLang="en-US" dirty="0">
+                <a:solidFill>
+                  <a:srgbClr val="FFFFFF">
+                    <a:alpha val="70000"/>
+                  </a:srgbClr>
+                </a:solidFill>
+                <a:ea typeface="Microsoft GothicNeo"/>
+                <a:cs typeface="Microsoft GothicNeo"/>
+              </a:rPr>
+              <a:t>문제점 : 객체로 넘어오면서 다운캐스팅 시에 문제가 </a:t>
+            </a:r>
+            <a:r>
+              <a:rPr lang="ko-KR" altLang="en-US" dirty="0" err="1">
+                <a:solidFill>
+                  <a:srgbClr val="FFFFFF">
+                    <a:alpha val="70000"/>
+                  </a:srgbClr>
+                </a:solidFill>
+                <a:ea typeface="Microsoft GothicNeo"/>
+                <a:cs typeface="Microsoft GothicNeo"/>
+              </a:rPr>
+              <a:t>있을수있는데</a:t>
+            </a:r>
+            <a:r>
+              <a:rPr lang="ko-KR" altLang="en-US" dirty="0">
+                <a:solidFill>
+                  <a:srgbClr val="FFFFFF">
+                    <a:alpha val="70000"/>
+                  </a:srgbClr>
+                </a:solidFill>
+                <a:ea typeface="Microsoft GothicNeo"/>
+                <a:cs typeface="Microsoft GothicNeo"/>
+              </a:rPr>
+              <a:t>.</a:t>
+            </a:r>
+          </a:p>
+          <a:p>
+            <a:pPr marL="0" indent="0">
+              <a:buNone/>
+            </a:pPr>
+            <a:r>
+              <a:rPr lang="ko-KR" altLang="en-US" dirty="0">
+                <a:solidFill>
+                  <a:srgbClr val="FFFFFF">
+                    <a:alpha val="70000"/>
+                  </a:srgbClr>
+                </a:solidFill>
+                <a:ea typeface="Microsoft GothicNeo"/>
+                <a:cs typeface="Microsoft GothicNeo"/>
+              </a:rPr>
+              <a:t>예시 : </a:t>
+            </a:r>
+            <a:r>
+              <a:rPr lang="ko-KR" altLang="en-US" dirty="0" err="1">
+                <a:solidFill>
+                  <a:srgbClr val="FFFFFF">
+                    <a:alpha val="70000"/>
+                  </a:srgbClr>
+                </a:solidFill>
+                <a:ea typeface="Microsoft GothicNeo"/>
+                <a:cs typeface="Microsoft GothicNeo"/>
+              </a:rPr>
+              <a:t>Static_cast</a:t>
+            </a:r>
+            <a:r>
+              <a:rPr lang="ko-KR" altLang="en-US" dirty="0">
+                <a:solidFill>
+                  <a:srgbClr val="FFFFFF">
+                    <a:alpha val="70000"/>
+                  </a:srgbClr>
+                </a:solidFill>
+                <a:ea typeface="Microsoft GothicNeo"/>
+                <a:cs typeface="Microsoft GothicNeo"/>
+              </a:rPr>
+              <a:t>&lt;</a:t>
+            </a:r>
+            <a:r>
+              <a:rPr lang="ko-KR" altLang="en-US" dirty="0" err="1">
+                <a:solidFill>
+                  <a:srgbClr val="FFFFFF">
+                    <a:alpha val="70000"/>
+                  </a:srgbClr>
+                </a:solidFill>
+                <a:ea typeface="Microsoft GothicNeo"/>
+                <a:cs typeface="Microsoft GothicNeo"/>
+              </a:rPr>
+              <a:t>Dog</a:t>
+            </a:r>
+            <a:r>
+              <a:rPr lang="ko-KR" altLang="en-US" dirty="0">
+                <a:solidFill>
+                  <a:srgbClr val="FFFFFF">
+                    <a:alpha val="70000"/>
+                  </a:srgbClr>
+                </a:solidFill>
+                <a:ea typeface="Microsoft GothicNeo"/>
+                <a:cs typeface="Microsoft GothicNeo"/>
+              </a:rPr>
+              <a:t>&gt; (</a:t>
+            </a:r>
+            <a:r>
+              <a:rPr lang="ko-KR" altLang="en-US" dirty="0" err="1">
+                <a:solidFill>
+                  <a:srgbClr val="FFFFFF">
+                    <a:alpha val="70000"/>
+                  </a:srgbClr>
+                </a:solidFill>
+                <a:ea typeface="Microsoft GothicNeo"/>
+                <a:cs typeface="Microsoft GothicNeo"/>
+              </a:rPr>
+              <a:t>animal</a:t>
+            </a:r>
+            <a:r>
+              <a:rPr lang="ko-KR" altLang="en-US" dirty="0">
+                <a:solidFill>
+                  <a:srgbClr val="FFFFFF">
+                    <a:alpha val="70000"/>
+                  </a:srgbClr>
+                </a:solidFill>
+                <a:ea typeface="Microsoft GothicNeo"/>
+                <a:cs typeface="Microsoft GothicNeo"/>
+              </a:rPr>
+              <a:t>); // </a:t>
+            </a:r>
+            <a:r>
+              <a:rPr lang="ko-KR" altLang="en-US" dirty="0" err="1">
+                <a:solidFill>
+                  <a:srgbClr val="FFFFFF">
+                    <a:alpha val="70000"/>
+                  </a:srgbClr>
+                </a:solidFill>
+                <a:ea typeface="Microsoft GothicNeo"/>
+                <a:cs typeface="Microsoft GothicNeo"/>
+              </a:rPr>
+              <a:t>처럼</a:t>
+            </a:r>
+            <a:r>
+              <a:rPr lang="ko-KR" altLang="en-US" dirty="0">
+                <a:solidFill>
+                  <a:srgbClr val="FFFFFF">
+                    <a:alpha val="70000"/>
+                  </a:srgbClr>
+                </a:solidFill>
+                <a:ea typeface="Microsoft GothicNeo"/>
+                <a:cs typeface="Microsoft GothicNeo"/>
+              </a:rPr>
+              <a:t> 변환에 실패하는 경우가 존재한다.</a:t>
+            </a:r>
+          </a:p>
+          <a:p>
+            <a:pPr marL="0" indent="0">
+              <a:buNone/>
+            </a:pPr>
+            <a:r>
+              <a:rPr lang="ko-KR" altLang="en-US" dirty="0">
+                <a:solidFill>
+                  <a:srgbClr val="FFFFFF">
+                    <a:alpha val="70000"/>
+                  </a:srgbClr>
+                </a:solidFill>
+                <a:ea typeface="Microsoft GothicNeo"/>
+                <a:cs typeface="Microsoft GothicNeo"/>
+              </a:rPr>
+              <a:t>다운 </a:t>
+            </a:r>
+            <a:r>
+              <a:rPr lang="ko-KR" altLang="en-US" dirty="0" err="1">
+                <a:solidFill>
+                  <a:srgbClr val="FFFFFF">
+                    <a:alpha val="70000"/>
+                  </a:srgbClr>
+                </a:solidFill>
+                <a:ea typeface="Microsoft GothicNeo"/>
+                <a:cs typeface="Microsoft GothicNeo"/>
+              </a:rPr>
+              <a:t>캐스팅에대해</a:t>
+            </a:r>
+            <a:r>
+              <a:rPr lang="ko-KR" altLang="en-US" dirty="0">
+                <a:solidFill>
+                  <a:srgbClr val="FFFFFF">
+                    <a:alpha val="70000"/>
+                  </a:srgbClr>
+                </a:solidFill>
+                <a:ea typeface="Microsoft GothicNeo"/>
+                <a:cs typeface="Microsoft GothicNeo"/>
+              </a:rPr>
+              <a:t> 검사를 </a:t>
+            </a:r>
+            <a:r>
+              <a:rPr lang="ko-KR" altLang="en-US" dirty="0" err="1">
+                <a:solidFill>
+                  <a:srgbClr val="FFFFFF">
+                    <a:alpha val="70000"/>
+                  </a:srgbClr>
+                </a:solidFill>
+                <a:ea typeface="Microsoft GothicNeo"/>
+                <a:cs typeface="Microsoft GothicNeo"/>
+              </a:rPr>
+              <a:t>하여야하는데</a:t>
+            </a:r>
+            <a:r>
+              <a:rPr lang="ko-KR" altLang="en-US" dirty="0">
+                <a:solidFill>
+                  <a:srgbClr val="FFFFFF">
+                    <a:alpha val="70000"/>
+                  </a:srgbClr>
+                </a:solidFill>
+                <a:ea typeface="Microsoft GothicNeo"/>
+                <a:cs typeface="Microsoft GothicNeo"/>
+              </a:rPr>
+              <a:t> </a:t>
+            </a:r>
+            <a:r>
+              <a:rPr lang="ko-KR" altLang="en-US" dirty="0" err="1">
+                <a:solidFill>
+                  <a:srgbClr val="FFFFFF">
+                    <a:alpha val="70000"/>
+                  </a:srgbClr>
+                </a:solidFill>
+                <a:ea typeface="Microsoft GothicNeo"/>
+                <a:cs typeface="Microsoft GothicNeo"/>
+              </a:rPr>
+              <a:t>Static같은</a:t>
+            </a:r>
+            <a:r>
+              <a:rPr lang="ko-KR" altLang="en-US" dirty="0">
+                <a:solidFill>
+                  <a:srgbClr val="FFFFFF">
+                    <a:alpha val="70000"/>
+                  </a:srgbClr>
+                </a:solidFill>
+                <a:ea typeface="Microsoft GothicNeo"/>
+                <a:cs typeface="Microsoft GothicNeo"/>
+              </a:rPr>
+              <a:t> 경우 검사를 </a:t>
+            </a:r>
+            <a:r>
+              <a:rPr lang="ko-KR" altLang="en-US" dirty="0" err="1">
+                <a:solidFill>
+                  <a:srgbClr val="FFFFFF">
+                    <a:alpha val="70000"/>
+                  </a:srgbClr>
+                </a:solidFill>
+                <a:ea typeface="Microsoft GothicNeo"/>
+                <a:cs typeface="Microsoft GothicNeo"/>
+              </a:rPr>
+              <a:t>하지않는다</a:t>
+            </a:r>
+            <a:r>
+              <a:rPr lang="ko-KR" altLang="en-US" dirty="0">
+                <a:solidFill>
+                  <a:srgbClr val="FFFFFF">
+                    <a:alpha val="70000"/>
+                  </a:srgbClr>
+                </a:solidFill>
+                <a:ea typeface="Microsoft GothicNeo"/>
+                <a:cs typeface="Microsoft GothicNeo"/>
+              </a:rPr>
+              <a:t>.</a:t>
+            </a:r>
+          </a:p>
+        </p:txBody>
+      </p:sp>
+    </p:spTree>
+    <p:extLst>
+      <p:ext uri="{BB962C8B-B14F-4D97-AF65-F5344CB8AC3E}">
+        <p14:creationId xmlns:p14="http://schemas.microsoft.com/office/powerpoint/2010/main" val="4191441778"/>
+      </p:ext>
+    </p:extLst>
+  </p:cSld>
+  <p:clrMapOvr>
+    <a:masterClrMapping/>
+  </p:clrMapOvr>
+</p:sld>
+</file>
+
+<file path=ppt/slides/slide38.xml><?xml version="1.0" encoding="utf-8"?>
+<p:sld xmlns:a="http://schemas.openxmlformats.org/drawingml/2006/main" xmlns:r="http://schemas.openxmlformats.org/officeDocument/2006/relationships" xmlns:p="http://schemas.openxmlformats.org/presentationml/2006/main">
+  <p:cSld>
+    <p:spTree>
+      <p:nvGrpSpPr>
+        <p:cNvPr id="1" name=""/>
+        <p:cNvGrpSpPr/>
+        <p:nvPr/>
+      </p:nvGrpSpPr>
+      <p:grpSpPr>
+        <a:xfrm>
+          <a:off x="0" y="0"/>
+          <a:ext cx="0" cy="0"/>
+          <a:chOff x="0" y="0"/>
+          <a:chExt cx="0" cy="0"/>
+        </a:xfrm>
+      </p:grpSpPr>
+      <p:sp>
+        <p:nvSpPr>
+          <p:cNvPr id="2" name="제목 1">
+            <a:extLst>
+              <a:ext uri="{FF2B5EF4-FFF2-40B4-BE49-F238E27FC236}">
+                <a16:creationId xmlns:a16="http://schemas.microsoft.com/office/drawing/2014/main" id="{F99DD5B0-8FA9-E48D-660D-DFAA806414DC}"/>
+              </a:ext>
+            </a:extLst>
+          </p:cNvPr>
+          <p:cNvSpPr>
+            <a:spLocks noGrp="1"/>
+          </p:cNvSpPr>
+          <p:nvPr>
+            <p:ph type="title"/>
+          </p:nvPr>
+        </p:nvSpPr>
+        <p:spPr/>
+        <p:txBody>
+          <a:bodyPr/>
+          <a:lstStyle/>
+          <a:p>
+            <a:r>
+              <a:rPr lang="ko-KR" altLang="en-US" dirty="0">
+                <a:ea typeface="Microsoft GothicNeo"/>
+                <a:cs typeface="Microsoft GothicNeo"/>
+              </a:rPr>
+              <a:t>&lt;</a:t>
+            </a:r>
+            <a:r>
+              <a:rPr lang="ko-KR" altLang="en-US" dirty="0" err="1">
+                <a:ea typeface="Microsoft GothicNeo"/>
+                <a:cs typeface="Microsoft GothicNeo"/>
+              </a:rPr>
+              <a:t>dynamic_Cast</a:t>
+            </a:r>
+            <a:r>
+              <a:rPr lang="ko-KR" altLang="en-US" dirty="0">
+                <a:ea typeface="Microsoft GothicNeo"/>
+                <a:cs typeface="Microsoft GothicNeo"/>
+              </a:rPr>
+              <a:t>&gt;</a:t>
+            </a:r>
+            <a:endParaRPr lang="ko-KR" altLang="en-US" dirty="0"/>
+          </a:p>
+        </p:txBody>
+      </p:sp>
+      <p:sp>
+        <p:nvSpPr>
+          <p:cNvPr id="3" name="내용 개체 틀 2">
+            <a:extLst>
+              <a:ext uri="{FF2B5EF4-FFF2-40B4-BE49-F238E27FC236}">
+                <a16:creationId xmlns:a16="http://schemas.microsoft.com/office/drawing/2014/main" id="{4FD6700A-7693-9F64-AFC0-A230F8417396}"/>
+              </a:ext>
+            </a:extLst>
+          </p:cNvPr>
+          <p:cNvSpPr>
+            <a:spLocks noGrp="1"/>
+          </p:cNvSpPr>
+          <p:nvPr>
+            <p:ph idx="1"/>
+          </p:nvPr>
+        </p:nvSpPr>
+        <p:spPr/>
+        <p:txBody>
+          <a:bodyPr lIns="109728" tIns="109728" rIns="109728" bIns="91440" anchor="t"/>
+          <a:lstStyle/>
+          <a:p>
+            <a:r>
+              <a:rPr lang="ko-KR" altLang="en-US" dirty="0">
+                <a:solidFill>
+                  <a:srgbClr val="FFFFFF">
+                    <a:alpha val="70000"/>
+                  </a:srgbClr>
+                </a:solidFill>
+                <a:ea typeface="Microsoft GothicNeo"/>
+                <a:cs typeface="Microsoft GothicNeo"/>
+              </a:rPr>
+              <a:t>매번 안전한 객체가 들어가면 </a:t>
+            </a:r>
+            <a:r>
+              <a:rPr lang="ko-KR" altLang="en-US" dirty="0" err="1">
+                <a:solidFill>
+                  <a:srgbClr val="FFFFFF">
+                    <a:alpha val="70000"/>
+                  </a:srgbClr>
+                </a:solidFill>
+                <a:ea typeface="Microsoft GothicNeo"/>
+                <a:cs typeface="Microsoft GothicNeo"/>
+              </a:rPr>
+              <a:t>상관이없겠지만</a:t>
+            </a:r>
+            <a:r>
+              <a:rPr lang="ko-KR" altLang="en-US" dirty="0">
+                <a:solidFill>
+                  <a:srgbClr val="FFFFFF">
+                    <a:alpha val="70000"/>
+                  </a:srgbClr>
+                </a:solidFill>
+                <a:ea typeface="Microsoft GothicNeo"/>
+                <a:cs typeface="Microsoft GothicNeo"/>
+              </a:rPr>
+              <a:t> 검사하는 </a:t>
+            </a:r>
+            <a:r>
+              <a:rPr lang="ko-KR" altLang="en-US" dirty="0" err="1">
+                <a:solidFill>
+                  <a:srgbClr val="FFFFFF">
+                    <a:alpha val="70000"/>
+                  </a:srgbClr>
+                </a:solidFill>
+                <a:ea typeface="Microsoft GothicNeo"/>
+                <a:cs typeface="Microsoft GothicNeo"/>
+              </a:rPr>
+              <a:t>cast연산자가</a:t>
+            </a:r>
+            <a:r>
+              <a:rPr lang="ko-KR" altLang="en-US" dirty="0">
+                <a:solidFill>
+                  <a:srgbClr val="FFFFFF">
+                    <a:alpha val="70000"/>
+                  </a:srgbClr>
+                </a:solidFill>
+                <a:ea typeface="Microsoft GothicNeo"/>
+                <a:cs typeface="Microsoft GothicNeo"/>
+              </a:rPr>
+              <a:t> 있으면 편하니 등장했다.</a:t>
+            </a:r>
+          </a:p>
+          <a:p>
+            <a:r>
+              <a:rPr lang="ko-KR" altLang="en-US" err="1">
+                <a:solidFill>
+                  <a:srgbClr val="FFFFFF">
+                    <a:alpha val="70000"/>
+                  </a:srgbClr>
+                </a:solidFill>
+                <a:ea typeface="Microsoft GothicNeo"/>
+                <a:cs typeface="Microsoft GothicNeo"/>
+              </a:rPr>
+              <a:t>Dynamic_cast는</a:t>
+            </a:r>
+            <a:r>
+              <a:rPr lang="ko-KR" altLang="en-US">
+                <a:solidFill>
+                  <a:srgbClr val="FFFFFF">
+                    <a:alpha val="70000"/>
+                  </a:srgbClr>
+                </a:solidFill>
+                <a:ea typeface="Microsoft GothicNeo"/>
+                <a:cs typeface="Microsoft GothicNeo"/>
+              </a:rPr>
+              <a:t> 다운캐스팅은 무조건 실패로 나오는데.</a:t>
+            </a:r>
+          </a:p>
+          <a:p>
+            <a:r>
+              <a:rPr lang="ko-KR" altLang="en-US" dirty="0">
+                <a:solidFill>
+                  <a:srgbClr val="FFFFFF">
+                    <a:alpha val="70000"/>
+                  </a:srgbClr>
+                </a:solidFill>
+                <a:ea typeface="Microsoft GothicNeo"/>
+                <a:cs typeface="Microsoft GothicNeo"/>
+              </a:rPr>
+              <a:t>부모 객체에 </a:t>
+            </a:r>
+            <a:r>
+              <a:rPr lang="ko-KR" altLang="en-US" dirty="0" err="1">
+                <a:solidFill>
+                  <a:srgbClr val="FFFFFF">
+                    <a:alpha val="70000"/>
+                  </a:srgbClr>
+                </a:solidFill>
+                <a:ea typeface="Microsoft GothicNeo"/>
+                <a:cs typeface="Microsoft GothicNeo"/>
+              </a:rPr>
+              <a:t>virtual</a:t>
+            </a:r>
+            <a:r>
+              <a:rPr lang="ko-KR" altLang="en-US" dirty="0">
+                <a:solidFill>
+                  <a:srgbClr val="FFFFFF">
+                    <a:alpha val="70000"/>
+                  </a:srgbClr>
+                </a:solidFill>
+                <a:ea typeface="Microsoft GothicNeo"/>
+                <a:cs typeface="Microsoft GothicNeo"/>
+              </a:rPr>
+              <a:t> 가상함수가 있다면 가상테이블로 다운캐스팅이 가능한지</a:t>
+            </a:r>
+          </a:p>
+          <a:p>
+            <a:r>
+              <a:rPr lang="ko-KR" altLang="en-US" dirty="0" err="1">
+                <a:solidFill>
+                  <a:srgbClr val="FFFFFF">
+                    <a:alpha val="70000"/>
+                  </a:srgbClr>
+                </a:solidFill>
+                <a:ea typeface="Microsoft GothicNeo"/>
+                <a:cs typeface="Microsoft GothicNeo"/>
+              </a:rPr>
+              <a:t>검사할수</a:t>
+            </a:r>
+            <a:r>
+              <a:rPr lang="ko-KR" altLang="en-US" dirty="0">
+                <a:solidFill>
+                  <a:srgbClr val="FFFFFF">
+                    <a:alpha val="70000"/>
+                  </a:srgbClr>
+                </a:solidFill>
+                <a:ea typeface="Microsoft GothicNeo"/>
+                <a:cs typeface="Microsoft GothicNeo"/>
+              </a:rPr>
+              <a:t> 있다.</a:t>
+            </a:r>
+          </a:p>
+          <a:p>
+            <a:r>
+              <a:rPr lang="ko-KR" altLang="en-US" dirty="0">
+                <a:solidFill>
+                  <a:srgbClr val="FFFFFF">
+                    <a:alpha val="70000"/>
+                  </a:srgbClr>
+                </a:solidFill>
+                <a:ea typeface="Microsoft GothicNeo"/>
+                <a:cs typeface="Microsoft GothicNeo"/>
+              </a:rPr>
+              <a:t>만일 변환에 실패한다면 아스키코드 '0' </a:t>
+            </a:r>
+            <a:r>
+              <a:rPr lang="ko-KR" altLang="en-US" dirty="0" err="1">
+                <a:solidFill>
+                  <a:srgbClr val="FFFFFF">
+                    <a:alpha val="70000"/>
+                  </a:srgbClr>
+                </a:solidFill>
+                <a:ea typeface="Microsoft GothicNeo"/>
+                <a:cs typeface="Microsoft GothicNeo"/>
+              </a:rPr>
+              <a:t>nullptr을</a:t>
+            </a:r>
+            <a:r>
+              <a:rPr lang="ko-KR" altLang="en-US" dirty="0">
+                <a:solidFill>
+                  <a:srgbClr val="FFFFFF">
+                    <a:alpha val="70000"/>
+                  </a:srgbClr>
+                </a:solidFill>
+                <a:ea typeface="Microsoft GothicNeo"/>
+                <a:cs typeface="Microsoft GothicNeo"/>
+              </a:rPr>
+              <a:t> </a:t>
+            </a:r>
+            <a:r>
+              <a:rPr lang="ko-KR" altLang="en-US" dirty="0" err="1">
+                <a:solidFill>
+                  <a:srgbClr val="FFFFFF">
+                    <a:alpha val="70000"/>
+                  </a:srgbClr>
+                </a:solidFill>
+                <a:ea typeface="Microsoft GothicNeo"/>
+                <a:cs typeface="Microsoft GothicNeo"/>
+              </a:rPr>
+              <a:t>가리키기떄문에</a:t>
+            </a:r>
+            <a:r>
+              <a:rPr lang="ko-KR" altLang="en-US" dirty="0">
+                <a:solidFill>
+                  <a:srgbClr val="FFFFFF">
+                    <a:alpha val="70000"/>
+                  </a:srgbClr>
+                </a:solidFill>
+                <a:ea typeface="Microsoft GothicNeo"/>
+                <a:cs typeface="Microsoft GothicNeo"/>
+              </a:rPr>
+              <a:t> 변환실패도 </a:t>
+            </a:r>
+            <a:r>
+              <a:rPr lang="ko-KR" altLang="en-US" dirty="0" err="1">
+                <a:solidFill>
+                  <a:srgbClr val="FFFFFF">
+                    <a:alpha val="70000"/>
+                  </a:srgbClr>
+                </a:solidFill>
+                <a:ea typeface="Microsoft GothicNeo"/>
+                <a:cs typeface="Microsoft GothicNeo"/>
+              </a:rPr>
+              <a:t>검사할수있다</a:t>
+            </a:r>
+            <a:r>
+              <a:rPr lang="ko-KR" altLang="en-US" dirty="0">
+                <a:solidFill>
+                  <a:srgbClr val="FFFFFF">
+                    <a:alpha val="70000"/>
+                  </a:srgbClr>
+                </a:solidFill>
+                <a:ea typeface="Microsoft GothicNeo"/>
+                <a:cs typeface="Microsoft GothicNeo"/>
+              </a:rPr>
+              <a:t>.</a:t>
+            </a:r>
+          </a:p>
+        </p:txBody>
+      </p:sp>
+    </p:spTree>
+    <p:extLst>
+      <p:ext uri="{BB962C8B-B14F-4D97-AF65-F5344CB8AC3E}">
+        <p14:creationId xmlns:p14="http://schemas.microsoft.com/office/powerpoint/2010/main" val="1027787148"/>
+      </p:ext>
+    </p:extLst>
+  </p:cSld>
+  <p:clrMapOvr>
+    <a:masterClrMapping/>
+  </p:clrMapOvr>
+</p:sld>
+</file>
+
+<file path=ppt/slides/slide39.xml><?xml version="1.0" encoding="utf-8"?>
+<p:sld xmlns:a="http://schemas.openxmlformats.org/drawingml/2006/main" xmlns:r="http://schemas.openxmlformats.org/officeDocument/2006/relationships" xmlns:p="http://schemas.openxmlformats.org/presentationml/2006/main">
+  <p:cSld>
+    <p:spTree>
+      <p:nvGrpSpPr>
+        <p:cNvPr id="1" name=""/>
+        <p:cNvGrpSpPr/>
+        <p:nvPr/>
+      </p:nvGrpSpPr>
+      <p:grpSpPr>
+        <a:xfrm>
+          <a:off x="0" y="0"/>
+          <a:ext cx="0" cy="0"/>
+          <a:chOff x="0" y="0"/>
+          <a:chExt cx="0" cy="0"/>
+        </a:xfrm>
+      </p:grpSpPr>
+      <p:sp>
+        <p:nvSpPr>
+          <p:cNvPr id="2" name="제목 1">
+            <a:extLst>
+              <a:ext uri="{FF2B5EF4-FFF2-40B4-BE49-F238E27FC236}">
+                <a16:creationId xmlns:a16="http://schemas.microsoft.com/office/drawing/2014/main" id="{AA95DA2E-D4AB-2A68-389C-1369C7093D4F}"/>
+              </a:ext>
+            </a:extLst>
+          </p:cNvPr>
+          <p:cNvSpPr>
+            <a:spLocks noGrp="1"/>
+          </p:cNvSpPr>
+          <p:nvPr>
+            <p:ph type="title"/>
+          </p:nvPr>
+        </p:nvSpPr>
+        <p:spPr/>
+        <p:txBody>
+          <a:bodyPr/>
+          <a:lstStyle/>
+          <a:p>
+            <a:r>
+              <a:rPr lang="ko-KR" altLang="en-US" dirty="0">
+                <a:ea typeface="Microsoft GothicNeo"/>
+                <a:cs typeface="Microsoft GothicNeo"/>
+              </a:rPr>
+              <a:t>&lt; 일반화 코딩의 핵심 템플릿&gt;</a:t>
+            </a:r>
+            <a:endParaRPr lang="ko-KR" altLang="en-US" dirty="0"/>
+          </a:p>
+        </p:txBody>
+      </p:sp>
+      <p:sp>
+        <p:nvSpPr>
+          <p:cNvPr id="3" name="내용 개체 틀 2">
+            <a:extLst>
+              <a:ext uri="{FF2B5EF4-FFF2-40B4-BE49-F238E27FC236}">
+                <a16:creationId xmlns:a16="http://schemas.microsoft.com/office/drawing/2014/main" id="{2342D41C-C6BE-2ED8-E626-31FE585F7137}"/>
+              </a:ext>
+            </a:extLst>
+          </p:cNvPr>
+          <p:cNvSpPr>
+            <a:spLocks noGrp="1"/>
+          </p:cNvSpPr>
+          <p:nvPr>
+            <p:ph idx="1"/>
+          </p:nvPr>
+        </p:nvSpPr>
+        <p:spPr/>
+        <p:txBody>
+          <a:bodyPr lIns="109728" tIns="109728" rIns="109728" bIns="91440" anchor="t"/>
+          <a:lstStyle/>
+          <a:p>
+            <a:r>
+              <a:rPr lang="ko-KR" altLang="en-US" dirty="0" err="1">
+                <a:solidFill>
+                  <a:srgbClr val="FFFFFF">
+                    <a:alpha val="70000"/>
+                  </a:srgbClr>
+                </a:solidFill>
+                <a:ea typeface="Microsoft GothicNeo"/>
+                <a:cs typeface="Microsoft GothicNeo"/>
+              </a:rPr>
+              <a:t>제너릭</a:t>
+            </a:r>
+            <a:r>
+              <a:rPr lang="ko-KR" altLang="en-US" dirty="0">
+                <a:solidFill>
+                  <a:srgbClr val="FFFFFF">
+                    <a:alpha val="70000"/>
+                  </a:srgbClr>
+                </a:solidFill>
+                <a:ea typeface="Microsoft GothicNeo"/>
+                <a:cs typeface="Microsoft GothicNeo"/>
+              </a:rPr>
+              <a:t> 코딩은 코드의 중복을 </a:t>
+            </a:r>
+            <a:r>
+              <a:rPr lang="ko-KR" altLang="en-US" dirty="0" err="1">
+                <a:solidFill>
+                  <a:srgbClr val="FFFFFF">
+                    <a:alpha val="70000"/>
+                  </a:srgbClr>
+                </a:solidFill>
+                <a:ea typeface="Microsoft GothicNeo"/>
+                <a:cs typeface="Microsoft GothicNeo"/>
+              </a:rPr>
+              <a:t>막아줄수있고</a:t>
+            </a:r>
+            <a:r>
+              <a:rPr lang="ko-KR" altLang="en-US" dirty="0">
+                <a:solidFill>
+                  <a:srgbClr val="FFFFFF">
+                    <a:alpha val="70000"/>
+                  </a:srgbClr>
+                </a:solidFill>
+                <a:ea typeface="Microsoft GothicNeo"/>
+                <a:cs typeface="Microsoft GothicNeo"/>
+              </a:rPr>
+              <a:t> 코드의 크기를 줄이는데 도움이 </a:t>
+            </a:r>
+            <a:r>
+              <a:rPr lang="ko-KR" altLang="en-US" dirty="0" err="1">
+                <a:solidFill>
+                  <a:srgbClr val="FFFFFF">
+                    <a:alpha val="70000"/>
+                  </a:srgbClr>
+                </a:solidFill>
+                <a:ea typeface="Microsoft GothicNeo"/>
+                <a:cs typeface="Microsoft GothicNeo"/>
+              </a:rPr>
+              <a:t>많이된다</a:t>
+            </a:r>
+            <a:r>
+              <a:rPr lang="ko-KR" altLang="en-US" dirty="0">
+                <a:solidFill>
+                  <a:srgbClr val="FFFFFF">
+                    <a:alpha val="70000"/>
+                  </a:srgbClr>
+                </a:solidFill>
+                <a:ea typeface="Microsoft GothicNeo"/>
+                <a:cs typeface="Microsoft GothicNeo"/>
+              </a:rPr>
+              <a:t>.</a:t>
+            </a:r>
+          </a:p>
+          <a:p>
+            <a:r>
+              <a:rPr lang="ko-KR" altLang="en-US" dirty="0">
+                <a:solidFill>
+                  <a:srgbClr val="FFFFFF">
+                    <a:alpha val="70000"/>
+                  </a:srgbClr>
+                </a:solidFill>
+                <a:ea typeface="Microsoft GothicNeo"/>
+                <a:cs typeface="Microsoft GothicNeo"/>
+              </a:rPr>
+              <a:t>만일 모든 데이터 타입에 대응해서 작성을 </a:t>
+            </a:r>
+            <a:r>
+              <a:rPr lang="ko-KR" altLang="en-US" dirty="0" err="1">
+                <a:solidFill>
+                  <a:srgbClr val="FFFFFF">
+                    <a:alpha val="70000"/>
+                  </a:srgbClr>
+                </a:solidFill>
+                <a:ea typeface="Microsoft GothicNeo"/>
+                <a:cs typeface="Microsoft GothicNeo"/>
+              </a:rPr>
+              <a:t>해야한다면</a:t>
+            </a:r>
+            <a:r>
+              <a:rPr lang="ko-KR" altLang="en-US" dirty="0">
+                <a:solidFill>
+                  <a:srgbClr val="FFFFFF">
+                    <a:alpha val="70000"/>
+                  </a:srgbClr>
+                </a:solidFill>
+                <a:ea typeface="Microsoft GothicNeo"/>
+                <a:cs typeface="Microsoft GothicNeo"/>
+              </a:rPr>
+              <a:t> 오버로딩을 통한 코드 중복이 많이 </a:t>
+            </a:r>
+            <a:r>
+              <a:rPr lang="ko-KR" altLang="en-US" dirty="0" err="1">
+                <a:solidFill>
+                  <a:srgbClr val="FFFFFF">
+                    <a:alpha val="70000"/>
+                  </a:srgbClr>
+                </a:solidFill>
+                <a:ea typeface="Microsoft GothicNeo"/>
+                <a:cs typeface="Microsoft GothicNeo"/>
+              </a:rPr>
+              <a:t>일어날것이다</a:t>
+            </a:r>
+            <a:r>
+              <a:rPr lang="ko-KR" altLang="en-US" dirty="0">
+                <a:solidFill>
+                  <a:srgbClr val="FFFFFF">
+                    <a:alpha val="70000"/>
+                  </a:srgbClr>
+                </a:solidFill>
+                <a:ea typeface="Microsoft GothicNeo"/>
+                <a:cs typeface="Microsoft GothicNeo"/>
+              </a:rPr>
+              <a:t>.</a:t>
+            </a:r>
+          </a:p>
+          <a:p>
+            <a:r>
+              <a:rPr lang="ko-KR" altLang="en-US" dirty="0">
+                <a:solidFill>
+                  <a:srgbClr val="FFFFFF">
+                    <a:alpha val="70000"/>
+                  </a:srgbClr>
+                </a:solidFill>
+                <a:ea typeface="Microsoft GothicNeo"/>
+                <a:cs typeface="Microsoft GothicNeo"/>
+              </a:rPr>
+              <a:t>이를 없애기 위해 등장한 것이 템플릿 인데 템플릿으로 작성할 경우</a:t>
+            </a:r>
+          </a:p>
+          <a:p>
+            <a:r>
+              <a:rPr lang="ko-KR" altLang="en-US" dirty="0">
+                <a:solidFill>
+                  <a:srgbClr val="FFFFFF">
+                    <a:alpha val="70000"/>
+                  </a:srgbClr>
+                </a:solidFill>
+                <a:ea typeface="Microsoft GothicNeo"/>
+                <a:cs typeface="Microsoft GothicNeo"/>
+              </a:rPr>
+              <a:t>해당 매개변수의 타입에 해당하는 템플릿 함수만 코드에 </a:t>
+            </a:r>
+            <a:r>
+              <a:rPr lang="ko-KR" altLang="en-US" dirty="0" err="1">
+                <a:solidFill>
+                  <a:srgbClr val="FFFFFF">
+                    <a:alpha val="70000"/>
+                  </a:srgbClr>
+                </a:solidFill>
+                <a:ea typeface="Microsoft GothicNeo"/>
+                <a:cs typeface="Microsoft GothicNeo"/>
+              </a:rPr>
+              <a:t>작성되기떄문에</a:t>
+            </a:r>
+            <a:r>
+              <a:rPr lang="ko-KR" altLang="en-US" dirty="0">
+                <a:solidFill>
+                  <a:srgbClr val="FFFFFF">
+                    <a:alpha val="70000"/>
+                  </a:srgbClr>
+                </a:solidFill>
+                <a:ea typeface="Microsoft GothicNeo"/>
+                <a:cs typeface="Microsoft GothicNeo"/>
+              </a:rPr>
+              <a:t> </a:t>
+            </a:r>
+          </a:p>
+          <a:p>
+            <a:r>
+              <a:rPr lang="ko-KR" altLang="en-US" dirty="0">
+                <a:solidFill>
+                  <a:srgbClr val="FFFFFF">
+                    <a:alpha val="70000"/>
+                  </a:srgbClr>
+                </a:solidFill>
+                <a:ea typeface="Microsoft GothicNeo"/>
+                <a:cs typeface="Microsoft GothicNeo"/>
+              </a:rPr>
+              <a:t>코드의 크기가 줄어드는 효과를 가져온다.</a:t>
+            </a:r>
+          </a:p>
+        </p:txBody>
+      </p:sp>
+    </p:spTree>
+    <p:extLst>
+      <p:ext uri="{BB962C8B-B14F-4D97-AF65-F5344CB8AC3E}">
+        <p14:creationId xmlns:p14="http://schemas.microsoft.com/office/powerpoint/2010/main" val="1800863745"/>
+      </p:ext>
+    </p:extLst>
+  </p:cSld>
+  <p:clrMapOvr>
+    <a:masterClrMapping/>
+  </p:clrMapOvr>
+</p:sld>
+</file>
+
 <file path=ppt/slides/slide4.xml><?xml version="1.0" encoding="utf-8"?>
 <p:sld xmlns:a="http://schemas.openxmlformats.org/drawingml/2006/main" xmlns:r="http://schemas.openxmlformats.org/officeDocument/2006/relationships" xmlns:p="http://schemas.openxmlformats.org/presentationml/2006/main">
   <p:cSld>
@@ -27154,6 +28847,1417 @@
     <p:extLst>
       <p:ext uri="{BB962C8B-B14F-4D97-AF65-F5344CB8AC3E}">
         <p14:creationId xmlns:p14="http://schemas.microsoft.com/office/powerpoint/2010/main" val="2818269565"/>
+      </p:ext>
+    </p:extLst>
+  </p:cSld>
+  <p:clrMapOvr>
+    <a:masterClrMapping/>
+  </p:clrMapOvr>
+</p:sld>
+</file>
+
+<file path=ppt/slides/slide40.xml><?xml version="1.0" encoding="utf-8"?>
+<p:sld xmlns:a="http://schemas.openxmlformats.org/drawingml/2006/main" xmlns:r="http://schemas.openxmlformats.org/officeDocument/2006/relationships" xmlns:p="http://schemas.openxmlformats.org/presentationml/2006/main">
+  <p:cSld>
+    <p:spTree>
+      <p:nvGrpSpPr>
+        <p:cNvPr id="1" name=""/>
+        <p:cNvGrpSpPr/>
+        <p:nvPr/>
+      </p:nvGrpSpPr>
+      <p:grpSpPr>
+        <a:xfrm>
+          <a:off x="0" y="0"/>
+          <a:ext cx="0" cy="0"/>
+          <a:chOff x="0" y="0"/>
+          <a:chExt cx="0" cy="0"/>
+        </a:xfrm>
+      </p:grpSpPr>
+      <p:sp>
+        <p:nvSpPr>
+          <p:cNvPr id="2" name="제목 1">
+            <a:extLst>
+              <a:ext uri="{FF2B5EF4-FFF2-40B4-BE49-F238E27FC236}">
+                <a16:creationId xmlns:a16="http://schemas.microsoft.com/office/drawing/2014/main" id="{13506341-BD1E-9CDE-E37B-891084BC28F2}"/>
+              </a:ext>
+            </a:extLst>
+          </p:cNvPr>
+          <p:cNvSpPr>
+            <a:spLocks noGrp="1"/>
+          </p:cNvSpPr>
+          <p:nvPr>
+            <p:ph type="title"/>
+          </p:nvPr>
+        </p:nvSpPr>
+        <p:spPr/>
+        <p:txBody>
+          <a:bodyPr/>
+          <a:lstStyle/>
+          <a:p>
+            <a:r>
+              <a:rPr lang="ko-KR" altLang="en-US" dirty="0">
+                <a:ea typeface="Microsoft GothicNeo"/>
+                <a:cs typeface="Microsoft GothicNeo"/>
+              </a:rPr>
+              <a:t>&lt;템플릿 사용방법&gt;</a:t>
+            </a:r>
+          </a:p>
+        </p:txBody>
+      </p:sp>
+      <p:sp>
+        <p:nvSpPr>
+          <p:cNvPr id="3" name="내용 개체 틀 2">
+            <a:extLst>
+              <a:ext uri="{FF2B5EF4-FFF2-40B4-BE49-F238E27FC236}">
+                <a16:creationId xmlns:a16="http://schemas.microsoft.com/office/drawing/2014/main" id="{DF54C689-BA67-91A7-131E-ADD5452D569D}"/>
+              </a:ext>
+            </a:extLst>
+          </p:cNvPr>
+          <p:cNvSpPr>
+            <a:spLocks noGrp="1"/>
+          </p:cNvSpPr>
+          <p:nvPr>
+            <p:ph idx="1"/>
+          </p:nvPr>
+        </p:nvSpPr>
+        <p:spPr/>
+        <p:txBody>
+          <a:bodyPr lIns="109728" tIns="109728" rIns="109728" bIns="91440" anchor="t"/>
+          <a:lstStyle/>
+          <a:p>
+            <a:pPr marL="0" indent="0">
+              <a:buNone/>
+            </a:pPr>
+            <a:r>
+              <a:rPr lang="ko-KR" altLang="en-US" dirty="0" err="1">
+                <a:solidFill>
+                  <a:srgbClr val="FFFFFF">
+                    <a:alpha val="70000"/>
+                  </a:srgbClr>
+                </a:solidFill>
+                <a:ea typeface="Microsoft GothicNeo"/>
+                <a:cs typeface="Microsoft GothicNeo"/>
+              </a:rPr>
+              <a:t>Template</a:t>
+            </a:r>
+            <a:r>
+              <a:rPr lang="ko-KR" altLang="en-US" dirty="0">
+                <a:solidFill>
+                  <a:srgbClr val="FFFFFF">
+                    <a:alpha val="70000"/>
+                  </a:srgbClr>
+                </a:solidFill>
+                <a:ea typeface="Microsoft GothicNeo"/>
+                <a:cs typeface="Microsoft GothicNeo"/>
+              </a:rPr>
+              <a:t> &lt;</a:t>
+            </a:r>
+            <a:r>
+              <a:rPr lang="ko-KR" altLang="en-US" dirty="0" err="1">
+                <a:solidFill>
+                  <a:srgbClr val="FFFFFF">
+                    <a:alpha val="70000"/>
+                  </a:srgbClr>
+                </a:solidFill>
+                <a:ea typeface="Microsoft GothicNeo"/>
+                <a:cs typeface="Microsoft GothicNeo"/>
+              </a:rPr>
+              <a:t>typename</a:t>
+            </a:r>
+            <a:r>
+              <a:rPr lang="ko-KR" altLang="en-US" dirty="0">
+                <a:solidFill>
+                  <a:srgbClr val="FFFFFF">
+                    <a:alpha val="70000"/>
+                  </a:srgbClr>
+                </a:solidFill>
+                <a:ea typeface="Microsoft GothicNeo"/>
+                <a:cs typeface="Microsoft GothicNeo"/>
+              </a:rPr>
+              <a:t> </a:t>
+            </a:r>
+            <a:r>
+              <a:rPr lang="ko-KR" altLang="en-US" dirty="0" err="1">
+                <a:solidFill>
+                  <a:srgbClr val="FFFFFF">
+                    <a:alpha val="70000"/>
+                  </a:srgbClr>
+                </a:solidFill>
+                <a:ea typeface="Microsoft GothicNeo"/>
+                <a:cs typeface="Microsoft GothicNeo"/>
+              </a:rPr>
+              <a:t>T</a:t>
+            </a:r>
+            <a:r>
+              <a:rPr lang="ko-KR" altLang="en-US" dirty="0">
+                <a:solidFill>
+                  <a:srgbClr val="FFFFFF">
+                    <a:alpha val="70000"/>
+                  </a:srgbClr>
+                </a:solidFill>
+                <a:ea typeface="Microsoft GothicNeo"/>
+                <a:cs typeface="Microsoft GothicNeo"/>
+              </a:rPr>
+              <a:t>&gt; //컴파일러에게 먼저 템플릿 사용을 </a:t>
+            </a:r>
+            <a:r>
+              <a:rPr lang="ko-KR" altLang="en-US" dirty="0" err="1">
+                <a:solidFill>
+                  <a:srgbClr val="FFFFFF">
+                    <a:alpha val="70000"/>
+                  </a:srgbClr>
+                </a:solidFill>
+                <a:ea typeface="Microsoft GothicNeo"/>
+                <a:cs typeface="Microsoft GothicNeo"/>
+              </a:rPr>
+              <a:t>알린후</a:t>
+            </a:r>
+          </a:p>
+          <a:p>
+            <a:pPr marL="0" indent="0">
+              <a:buNone/>
+            </a:pPr>
+            <a:r>
+              <a:rPr lang="ko-KR" altLang="en-US" dirty="0" err="1">
+                <a:solidFill>
+                  <a:srgbClr val="FFFFFF">
+                    <a:alpha val="70000"/>
+                  </a:srgbClr>
+                </a:solidFill>
+                <a:ea typeface="Microsoft GothicNeo"/>
+                <a:cs typeface="Microsoft GothicNeo"/>
+              </a:rPr>
+              <a:t>T</a:t>
+            </a:r>
+            <a:r>
+              <a:rPr lang="ko-KR" altLang="en-US" dirty="0">
+                <a:solidFill>
+                  <a:srgbClr val="FFFFFF">
+                    <a:alpha val="70000"/>
+                  </a:srgbClr>
+                </a:solidFill>
+                <a:ea typeface="Microsoft GothicNeo"/>
+                <a:cs typeface="Microsoft GothicNeo"/>
+              </a:rPr>
+              <a:t> </a:t>
+            </a:r>
+            <a:r>
+              <a:rPr lang="ko-KR" altLang="en-US" dirty="0" err="1">
+                <a:solidFill>
+                  <a:srgbClr val="FFFFFF">
+                    <a:alpha val="70000"/>
+                  </a:srgbClr>
+                </a:solidFill>
+                <a:ea typeface="Microsoft GothicNeo"/>
+                <a:cs typeface="Microsoft GothicNeo"/>
+              </a:rPr>
+              <a:t>Get_Max</a:t>
+            </a:r>
+            <a:r>
+              <a:rPr lang="ko-KR" altLang="en-US" dirty="0">
+                <a:solidFill>
+                  <a:srgbClr val="FFFFFF">
+                    <a:alpha val="70000"/>
+                  </a:srgbClr>
+                </a:solidFill>
+                <a:ea typeface="Microsoft GothicNeo"/>
+                <a:cs typeface="Microsoft GothicNeo"/>
+              </a:rPr>
+              <a:t>(</a:t>
+            </a:r>
+            <a:r>
+              <a:rPr lang="ko-KR" altLang="en-US" dirty="0" err="1">
+                <a:solidFill>
+                  <a:srgbClr val="FFFFFF">
+                    <a:alpha val="70000"/>
+                  </a:srgbClr>
+                </a:solidFill>
+                <a:ea typeface="Microsoft GothicNeo"/>
+                <a:cs typeface="Microsoft GothicNeo"/>
+              </a:rPr>
+              <a:t>T</a:t>
+            </a:r>
+            <a:r>
+              <a:rPr lang="ko-KR" altLang="en-US" dirty="0">
+                <a:solidFill>
+                  <a:srgbClr val="FFFFFF">
+                    <a:alpha val="70000"/>
+                  </a:srgbClr>
+                </a:solidFill>
+                <a:ea typeface="Microsoft GothicNeo"/>
+                <a:cs typeface="Microsoft GothicNeo"/>
+              </a:rPr>
+              <a:t> </a:t>
+            </a:r>
+            <a:r>
+              <a:rPr lang="ko-KR" altLang="en-US" dirty="0" err="1">
+                <a:solidFill>
+                  <a:srgbClr val="FFFFFF">
+                    <a:alpha val="70000"/>
+                  </a:srgbClr>
+                </a:solidFill>
+                <a:ea typeface="Microsoft GothicNeo"/>
+                <a:cs typeface="Microsoft GothicNeo"/>
+              </a:rPr>
+              <a:t>a</a:t>
+            </a:r>
+            <a:r>
+              <a:rPr lang="ko-KR" altLang="en-US" dirty="0">
+                <a:solidFill>
+                  <a:srgbClr val="FFFFFF">
+                    <a:alpha val="70000"/>
+                  </a:srgbClr>
+                </a:solidFill>
+                <a:ea typeface="Microsoft GothicNeo"/>
+                <a:cs typeface="Microsoft GothicNeo"/>
+              </a:rPr>
+              <a:t> ,</a:t>
+            </a:r>
+            <a:r>
+              <a:rPr lang="ko-KR" altLang="en-US" dirty="0" err="1">
+                <a:solidFill>
+                  <a:srgbClr val="FFFFFF">
+                    <a:alpha val="70000"/>
+                  </a:srgbClr>
+                </a:solidFill>
+                <a:ea typeface="Microsoft GothicNeo"/>
+                <a:cs typeface="Microsoft GothicNeo"/>
+              </a:rPr>
+              <a:t>T</a:t>
+            </a:r>
+            <a:r>
+              <a:rPr lang="ko-KR" altLang="en-US" dirty="0">
+                <a:solidFill>
+                  <a:srgbClr val="FFFFFF">
+                    <a:alpha val="70000"/>
+                  </a:srgbClr>
+                </a:solidFill>
+                <a:ea typeface="Microsoft GothicNeo"/>
+                <a:cs typeface="Microsoft GothicNeo"/>
+              </a:rPr>
+              <a:t> </a:t>
+            </a:r>
+            <a:r>
+              <a:rPr lang="ko-KR" altLang="en-US" dirty="0" err="1">
+                <a:solidFill>
+                  <a:srgbClr val="FFFFFF">
+                    <a:alpha val="70000"/>
+                  </a:srgbClr>
+                </a:solidFill>
+                <a:ea typeface="Microsoft GothicNeo"/>
+                <a:cs typeface="Microsoft GothicNeo"/>
+              </a:rPr>
+              <a:t>b</a:t>
+            </a:r>
+            <a:r>
+              <a:rPr lang="ko-KR" altLang="en-US" dirty="0">
+                <a:solidFill>
+                  <a:srgbClr val="FFFFFF">
+                    <a:alpha val="70000"/>
+                  </a:srgbClr>
+                </a:solidFill>
+                <a:ea typeface="Microsoft GothicNeo"/>
+                <a:cs typeface="Microsoft GothicNeo"/>
+              </a:rPr>
+              <a:t>){}</a:t>
+            </a:r>
+          </a:p>
+          <a:p>
+            <a:pPr marL="0" indent="0">
+              <a:buNone/>
+            </a:pPr>
+            <a:r>
+              <a:rPr lang="ko-KR" altLang="en-US" dirty="0">
+                <a:solidFill>
+                  <a:srgbClr val="FFFFFF">
+                    <a:alpha val="70000"/>
+                  </a:srgbClr>
+                </a:solidFill>
+                <a:ea typeface="Microsoft GothicNeo"/>
+                <a:cs typeface="Microsoft GothicNeo"/>
+              </a:rPr>
+              <a:t>//  매개변수의 타입이 다른 경우</a:t>
+            </a:r>
+          </a:p>
+          <a:p>
+            <a:pPr marL="0" indent="0">
+              <a:buNone/>
+            </a:pPr>
+            <a:r>
+              <a:rPr lang="ko-KR" altLang="en-US" err="1">
+                <a:solidFill>
+                  <a:srgbClr val="FFFFFF">
+                    <a:alpha val="70000"/>
+                  </a:srgbClr>
+                </a:solidFill>
+                <a:ea typeface="Microsoft GothicNeo"/>
+                <a:cs typeface="Microsoft GothicNeo"/>
+              </a:rPr>
+              <a:t>Template</a:t>
+            </a:r>
+            <a:r>
+              <a:rPr lang="ko-KR" altLang="en-US" dirty="0">
+                <a:solidFill>
+                  <a:srgbClr val="FFFFFF">
+                    <a:alpha val="70000"/>
+                  </a:srgbClr>
+                </a:solidFill>
+                <a:ea typeface="Microsoft GothicNeo"/>
+                <a:cs typeface="Microsoft GothicNeo"/>
+              </a:rPr>
+              <a:t> &lt;</a:t>
+            </a:r>
+            <a:r>
+              <a:rPr lang="ko-KR" altLang="en-US" err="1">
+                <a:solidFill>
+                  <a:srgbClr val="FFFFFF">
+                    <a:alpha val="70000"/>
+                  </a:srgbClr>
+                </a:solidFill>
+                <a:ea typeface="Microsoft GothicNeo"/>
+                <a:cs typeface="Microsoft GothicNeo"/>
+              </a:rPr>
+              <a:t>typename</a:t>
+            </a:r>
+            <a:r>
+              <a:rPr lang="ko-KR" altLang="en-US">
+                <a:solidFill>
+                  <a:srgbClr val="FFFFFF">
+                    <a:alpha val="70000"/>
+                  </a:srgbClr>
+                </a:solidFill>
+                <a:ea typeface="Microsoft GothicNeo"/>
+                <a:cs typeface="Microsoft GothicNeo"/>
+              </a:rPr>
+              <a:t> T1,typename T2&gt;</a:t>
+            </a:r>
+            <a:endParaRPr lang="ko-KR" altLang="en-US" dirty="0">
+              <a:solidFill>
+                <a:srgbClr val="FFFFFF">
+                  <a:alpha val="70000"/>
+                </a:srgbClr>
+              </a:solidFill>
+              <a:ea typeface="Microsoft GothicNeo"/>
+              <a:cs typeface="Microsoft GothicNeo"/>
+            </a:endParaRPr>
+          </a:p>
+          <a:p>
+            <a:pPr marL="0" indent="0">
+              <a:buNone/>
+            </a:pPr>
+            <a:r>
+              <a:rPr lang="ko-KR" altLang="en-US" dirty="0" err="1">
+                <a:solidFill>
+                  <a:srgbClr val="FFFFFF">
+                    <a:alpha val="70000"/>
+                  </a:srgbClr>
+                </a:solidFill>
+                <a:ea typeface="Microsoft GothicNeo"/>
+                <a:cs typeface="Microsoft GothicNeo"/>
+              </a:rPr>
+              <a:t>T</a:t>
+            </a:r>
+            <a:r>
+              <a:rPr lang="ko-KR" altLang="en-US" dirty="0">
+                <a:solidFill>
+                  <a:srgbClr val="FFFFFF">
+                    <a:alpha val="70000"/>
+                  </a:srgbClr>
+                </a:solidFill>
+                <a:ea typeface="Microsoft GothicNeo"/>
+                <a:cs typeface="Microsoft GothicNeo"/>
+              </a:rPr>
+              <a:t> </a:t>
+            </a:r>
+            <a:r>
+              <a:rPr lang="ko-KR" altLang="en-US" dirty="0" err="1">
+                <a:solidFill>
+                  <a:srgbClr val="FFFFFF">
+                    <a:alpha val="70000"/>
+                  </a:srgbClr>
+                </a:solidFill>
+                <a:ea typeface="Microsoft GothicNeo"/>
+                <a:cs typeface="Microsoft GothicNeo"/>
+              </a:rPr>
+              <a:t>Get_Max</a:t>
+            </a:r>
+            <a:r>
+              <a:rPr lang="ko-KR" altLang="en-US" dirty="0">
+                <a:solidFill>
+                  <a:srgbClr val="FFFFFF">
+                    <a:alpha val="70000"/>
+                  </a:srgbClr>
+                </a:solidFill>
+                <a:ea typeface="Microsoft GothicNeo"/>
+                <a:cs typeface="Microsoft GothicNeo"/>
+              </a:rPr>
+              <a:t>(T1 </a:t>
+            </a:r>
+            <a:r>
+              <a:rPr lang="ko-KR" altLang="en-US" dirty="0" err="1">
+                <a:solidFill>
+                  <a:srgbClr val="FFFFFF">
+                    <a:alpha val="70000"/>
+                  </a:srgbClr>
+                </a:solidFill>
+                <a:ea typeface="Microsoft GothicNeo"/>
+                <a:cs typeface="Microsoft GothicNeo"/>
+              </a:rPr>
+              <a:t>a</a:t>
+            </a:r>
+            <a:r>
+              <a:rPr lang="ko-KR" altLang="en-US" dirty="0">
+                <a:solidFill>
+                  <a:srgbClr val="FFFFFF">
+                    <a:alpha val="70000"/>
+                  </a:srgbClr>
+                </a:solidFill>
+                <a:ea typeface="Microsoft GothicNeo"/>
+                <a:cs typeface="Microsoft GothicNeo"/>
+              </a:rPr>
+              <a:t>, T2 </a:t>
+            </a:r>
+            <a:r>
+              <a:rPr lang="ko-KR" altLang="en-US" dirty="0" err="1">
+                <a:solidFill>
+                  <a:srgbClr val="FFFFFF">
+                    <a:alpha val="70000"/>
+                  </a:srgbClr>
+                </a:solidFill>
+                <a:ea typeface="Microsoft GothicNeo"/>
+                <a:cs typeface="Microsoft GothicNeo"/>
+              </a:rPr>
+              <a:t>b</a:t>
+            </a:r>
+            <a:r>
+              <a:rPr lang="ko-KR" altLang="en-US" dirty="0">
+                <a:solidFill>
+                  <a:srgbClr val="FFFFFF">
+                    <a:alpha val="70000"/>
+                  </a:srgbClr>
+                </a:solidFill>
+                <a:ea typeface="Microsoft GothicNeo"/>
+                <a:cs typeface="Microsoft GothicNeo"/>
+              </a:rPr>
+              <a:t>){}</a:t>
+            </a:r>
+          </a:p>
+          <a:p>
+            <a:pPr marL="0" indent="0">
+              <a:buNone/>
+            </a:pPr>
+            <a:r>
+              <a:rPr lang="ko-KR" altLang="en-US" dirty="0">
+                <a:solidFill>
+                  <a:srgbClr val="FFFFFF">
+                    <a:alpha val="70000"/>
+                  </a:srgbClr>
+                </a:solidFill>
+                <a:ea typeface="Microsoft GothicNeo"/>
+                <a:cs typeface="Microsoft GothicNeo"/>
+              </a:rPr>
+              <a:t>// 매개변수로 배열이 전해졌을 경우</a:t>
+            </a:r>
+          </a:p>
+          <a:p>
+            <a:pPr marL="0" indent="0">
+              <a:buNone/>
+            </a:pPr>
+            <a:r>
+              <a:rPr lang="ko-KR" altLang="en-US" dirty="0" err="1">
+                <a:solidFill>
+                  <a:srgbClr val="FFFFFF">
+                    <a:alpha val="70000"/>
+                  </a:srgbClr>
+                </a:solidFill>
+                <a:ea typeface="Microsoft GothicNeo"/>
+                <a:cs typeface="Microsoft GothicNeo"/>
+              </a:rPr>
+              <a:t>T</a:t>
+            </a:r>
+            <a:r>
+              <a:rPr lang="ko-KR" altLang="en-US" dirty="0">
+                <a:solidFill>
+                  <a:srgbClr val="FFFFFF">
+                    <a:alpha val="70000"/>
+                  </a:srgbClr>
+                </a:solidFill>
+                <a:ea typeface="Microsoft GothicNeo"/>
+                <a:cs typeface="Microsoft GothicNeo"/>
+              </a:rPr>
+              <a:t> </a:t>
+            </a:r>
+            <a:r>
+              <a:rPr lang="ko-KR" altLang="en-US" dirty="0" err="1">
+                <a:solidFill>
+                  <a:srgbClr val="FFFFFF">
+                    <a:alpha val="70000"/>
+                  </a:srgbClr>
+                </a:solidFill>
+                <a:ea typeface="Microsoft GothicNeo"/>
+                <a:cs typeface="Microsoft GothicNeo"/>
+              </a:rPr>
+              <a:t>Get_Max</a:t>
+            </a:r>
+            <a:r>
+              <a:rPr lang="ko-KR" altLang="en-US" dirty="0">
+                <a:solidFill>
+                  <a:srgbClr val="FFFFFF">
+                    <a:alpha val="70000"/>
+                  </a:srgbClr>
+                </a:solidFill>
+                <a:ea typeface="Microsoft GothicNeo"/>
+                <a:cs typeface="Microsoft GothicNeo"/>
+              </a:rPr>
+              <a:t>(</a:t>
+            </a:r>
+            <a:r>
+              <a:rPr lang="ko-KR" altLang="en-US" dirty="0" err="1">
+                <a:solidFill>
+                  <a:srgbClr val="FFFFFF">
+                    <a:alpha val="70000"/>
+                  </a:srgbClr>
+                </a:solidFill>
+                <a:ea typeface="Microsoft GothicNeo"/>
+                <a:cs typeface="Microsoft GothicNeo"/>
+              </a:rPr>
+              <a:t>int</a:t>
+            </a:r>
+            <a:r>
+              <a:rPr lang="ko-KR" altLang="en-US" dirty="0">
+                <a:solidFill>
+                  <a:srgbClr val="FFFFFF">
+                    <a:alpha val="70000"/>
+                  </a:srgbClr>
+                </a:solidFill>
+                <a:ea typeface="Microsoft GothicNeo"/>
+                <a:cs typeface="Microsoft GothicNeo"/>
+              </a:rPr>
+              <a:t> </a:t>
+            </a:r>
+            <a:r>
+              <a:rPr lang="ko-KR" altLang="en-US" dirty="0" err="1">
+                <a:solidFill>
+                  <a:srgbClr val="FFFFFF">
+                    <a:alpha val="70000"/>
+                  </a:srgbClr>
+                </a:solidFill>
+                <a:ea typeface="Microsoft GothicNeo"/>
+                <a:cs typeface="Microsoft GothicNeo"/>
+              </a:rPr>
+              <a:t>arr</a:t>
+            </a:r>
+            <a:r>
+              <a:rPr lang="ko-KR" altLang="en-US" dirty="0">
+                <a:solidFill>
+                  <a:srgbClr val="FFFFFF">
+                    <a:alpha val="70000"/>
+                  </a:srgbClr>
+                </a:solidFill>
+                <a:ea typeface="Microsoft GothicNeo"/>
+                <a:cs typeface="Microsoft GothicNeo"/>
+              </a:rPr>
+              <a:t>[], </a:t>
+            </a:r>
+            <a:r>
+              <a:rPr lang="ko-KR" altLang="en-US" dirty="0" err="1">
+                <a:solidFill>
+                  <a:srgbClr val="FFFFFF">
+                    <a:alpha val="70000"/>
+                  </a:srgbClr>
+                </a:solidFill>
+                <a:ea typeface="Microsoft GothicNeo"/>
+                <a:cs typeface="Microsoft GothicNeo"/>
+              </a:rPr>
+              <a:t>int</a:t>
+            </a:r>
+            <a:r>
+              <a:rPr lang="ko-KR" altLang="en-US" dirty="0">
+                <a:solidFill>
+                  <a:srgbClr val="FFFFFF">
+                    <a:alpha val="70000"/>
+                  </a:srgbClr>
+                </a:solidFill>
+                <a:ea typeface="Microsoft GothicNeo"/>
+                <a:cs typeface="Microsoft GothicNeo"/>
+              </a:rPr>
+              <a:t> arr2[]){};// 매개변수를 명시하여 오버로딩 가능</a:t>
+            </a:r>
+          </a:p>
+        </p:txBody>
+      </p:sp>
+    </p:spTree>
+    <p:extLst>
+      <p:ext uri="{BB962C8B-B14F-4D97-AF65-F5344CB8AC3E}">
+        <p14:creationId xmlns:p14="http://schemas.microsoft.com/office/powerpoint/2010/main" val="3517820391"/>
+      </p:ext>
+    </p:extLst>
+  </p:cSld>
+  <p:clrMapOvr>
+    <a:masterClrMapping/>
+  </p:clrMapOvr>
+</p:sld>
+</file>
+
+<file path=ppt/slides/slide41.xml><?xml version="1.0" encoding="utf-8"?>
+<p:sld xmlns:a="http://schemas.openxmlformats.org/drawingml/2006/main" xmlns:r="http://schemas.openxmlformats.org/officeDocument/2006/relationships" xmlns:p="http://schemas.openxmlformats.org/presentationml/2006/main">
+  <p:cSld>
+    <p:spTree>
+      <p:nvGrpSpPr>
+        <p:cNvPr id="1" name=""/>
+        <p:cNvGrpSpPr/>
+        <p:nvPr/>
+      </p:nvGrpSpPr>
+      <p:grpSpPr>
+        <a:xfrm>
+          <a:off x="0" y="0"/>
+          <a:ext cx="0" cy="0"/>
+          <a:chOff x="0" y="0"/>
+          <a:chExt cx="0" cy="0"/>
+        </a:xfrm>
+      </p:grpSpPr>
+      <p:sp>
+        <p:nvSpPr>
+          <p:cNvPr id="2" name="제목 1">
+            <a:extLst>
+              <a:ext uri="{FF2B5EF4-FFF2-40B4-BE49-F238E27FC236}">
+                <a16:creationId xmlns:a16="http://schemas.microsoft.com/office/drawing/2014/main" id="{019A1A1F-8A9A-D5C0-90C8-B383BB307596}"/>
+              </a:ext>
+            </a:extLst>
+          </p:cNvPr>
+          <p:cNvSpPr>
+            <a:spLocks noGrp="1"/>
+          </p:cNvSpPr>
+          <p:nvPr>
+            <p:ph type="title"/>
+          </p:nvPr>
+        </p:nvSpPr>
+        <p:spPr/>
+        <p:txBody>
+          <a:bodyPr/>
+          <a:lstStyle/>
+          <a:p>
+            <a:r>
+              <a:rPr lang="ko-KR" altLang="en-US" dirty="0">
+                <a:ea typeface="Microsoft GothicNeo"/>
+                <a:cs typeface="Microsoft GothicNeo"/>
+              </a:rPr>
+              <a:t>&lt;템플릿 클래스&gt;</a:t>
+            </a:r>
+            <a:endParaRPr lang="ko-KR" altLang="en-US" dirty="0"/>
+          </a:p>
+        </p:txBody>
+      </p:sp>
+      <p:sp>
+        <p:nvSpPr>
+          <p:cNvPr id="3" name="내용 개체 틀 2">
+            <a:extLst>
+              <a:ext uri="{FF2B5EF4-FFF2-40B4-BE49-F238E27FC236}">
+                <a16:creationId xmlns:a16="http://schemas.microsoft.com/office/drawing/2014/main" id="{E792BA4F-0FE1-A1CE-B14C-3B2E530ADC34}"/>
+              </a:ext>
+            </a:extLst>
+          </p:cNvPr>
+          <p:cNvSpPr>
+            <a:spLocks noGrp="1"/>
+          </p:cNvSpPr>
+          <p:nvPr>
+            <p:ph idx="1"/>
+          </p:nvPr>
+        </p:nvSpPr>
+        <p:spPr/>
+        <p:txBody>
+          <a:bodyPr lIns="109728" tIns="109728" rIns="109728" bIns="91440" anchor="t"/>
+          <a:lstStyle/>
+          <a:p>
+            <a:pPr marL="0" indent="0">
+              <a:buNone/>
+            </a:pPr>
+            <a:r>
+              <a:rPr lang="ko-KR" altLang="en-US" dirty="0" err="1">
+                <a:solidFill>
+                  <a:srgbClr val="FFFFFF">
+                    <a:alpha val="70000"/>
+                  </a:srgbClr>
+                </a:solidFill>
+                <a:ea typeface="Microsoft GothicNeo"/>
+                <a:cs typeface="Microsoft GothicNeo"/>
+              </a:rPr>
+              <a:t>Template</a:t>
+            </a:r>
+            <a:r>
+              <a:rPr lang="ko-KR" altLang="en-US" dirty="0">
+                <a:solidFill>
+                  <a:srgbClr val="FFFFFF">
+                    <a:alpha val="70000"/>
+                  </a:srgbClr>
+                </a:solidFill>
+                <a:ea typeface="Microsoft GothicNeo"/>
+                <a:cs typeface="Microsoft GothicNeo"/>
+              </a:rPr>
+              <a:t> &lt;</a:t>
+            </a:r>
+            <a:r>
+              <a:rPr lang="ko-KR" altLang="en-US" dirty="0" err="1">
+                <a:solidFill>
+                  <a:srgbClr val="FFFFFF">
+                    <a:alpha val="70000"/>
+                  </a:srgbClr>
+                </a:solidFill>
+                <a:ea typeface="Microsoft GothicNeo"/>
+                <a:cs typeface="Microsoft GothicNeo"/>
+              </a:rPr>
+              <a:t>typename</a:t>
+            </a:r>
+            <a:r>
+              <a:rPr lang="ko-KR" altLang="en-US" dirty="0">
+                <a:solidFill>
+                  <a:srgbClr val="FFFFFF">
+                    <a:alpha val="70000"/>
+                  </a:srgbClr>
+                </a:solidFill>
+                <a:ea typeface="Microsoft GothicNeo"/>
+                <a:cs typeface="Microsoft GothicNeo"/>
+              </a:rPr>
+              <a:t> </a:t>
+            </a:r>
+            <a:r>
+              <a:rPr lang="ko-KR" altLang="en-US" dirty="0" err="1">
+                <a:solidFill>
+                  <a:srgbClr val="FFFFFF">
+                    <a:alpha val="70000"/>
+                  </a:srgbClr>
+                </a:solidFill>
+                <a:ea typeface="Microsoft GothicNeo"/>
+                <a:cs typeface="Microsoft GothicNeo"/>
+              </a:rPr>
+              <a:t>T</a:t>
+            </a:r>
+            <a:r>
+              <a:rPr lang="ko-KR" altLang="en-US" dirty="0">
+                <a:solidFill>
+                  <a:srgbClr val="FFFFFF">
+                    <a:alpha val="70000"/>
+                  </a:srgbClr>
+                </a:solidFill>
+                <a:ea typeface="Microsoft GothicNeo"/>
+                <a:cs typeface="Microsoft GothicNeo"/>
+              </a:rPr>
+              <a:t>&gt;</a:t>
+            </a:r>
+          </a:p>
+          <a:p>
+            <a:pPr marL="0" indent="0">
+              <a:buNone/>
+            </a:pPr>
+            <a:r>
+              <a:rPr lang="ko-KR" altLang="en-US" dirty="0" err="1">
+                <a:solidFill>
+                  <a:srgbClr val="FFFFFF">
+                    <a:alpha val="70000"/>
+                  </a:srgbClr>
+                </a:solidFill>
+                <a:ea typeface="Microsoft GothicNeo"/>
+                <a:cs typeface="Microsoft GothicNeo"/>
+              </a:rPr>
+              <a:t>Class</a:t>
+            </a:r>
+            <a:r>
+              <a:rPr lang="ko-KR" altLang="en-US" dirty="0">
+                <a:solidFill>
+                  <a:srgbClr val="FFFFFF">
+                    <a:alpha val="70000"/>
+                  </a:srgbClr>
+                </a:solidFill>
+                <a:ea typeface="Microsoft GothicNeo"/>
+                <a:cs typeface="Microsoft GothicNeo"/>
+              </a:rPr>
+              <a:t> </a:t>
+            </a:r>
+            <a:r>
+              <a:rPr lang="ko-KR" altLang="en-US" dirty="0" err="1">
+                <a:solidFill>
+                  <a:srgbClr val="FFFFFF">
+                    <a:alpha val="70000"/>
+                  </a:srgbClr>
+                </a:solidFill>
+                <a:ea typeface="Microsoft GothicNeo"/>
+                <a:cs typeface="Microsoft GothicNeo"/>
+              </a:rPr>
+              <a:t>Box</a:t>
+            </a:r>
+            <a:r>
+              <a:rPr lang="ko-KR" altLang="en-US" dirty="0">
+                <a:solidFill>
+                  <a:srgbClr val="FFFFFF">
+                    <a:alpha val="70000"/>
+                  </a:srgbClr>
+                </a:solidFill>
+                <a:ea typeface="Microsoft GothicNeo"/>
+                <a:cs typeface="Microsoft GothicNeo"/>
+              </a:rPr>
+              <a:t>{</a:t>
+            </a:r>
+          </a:p>
+          <a:p>
+            <a:pPr marL="0" indent="0">
+              <a:buNone/>
+            </a:pPr>
+            <a:r>
+              <a:rPr lang="ko-KR" altLang="en-US" dirty="0">
+                <a:solidFill>
+                  <a:srgbClr val="FFFFFF">
+                    <a:alpha val="70000"/>
+                  </a:srgbClr>
+                </a:solidFill>
+                <a:ea typeface="Microsoft GothicNeo"/>
+                <a:cs typeface="Microsoft GothicNeo"/>
+              </a:rPr>
+              <a:t>   </a:t>
+            </a:r>
+            <a:r>
+              <a:rPr lang="ko-KR" altLang="en-US" err="1">
+                <a:solidFill>
+                  <a:srgbClr val="FFFFFF">
+                    <a:alpha val="70000"/>
+                  </a:srgbClr>
+                </a:solidFill>
+                <a:ea typeface="Microsoft GothicNeo"/>
+                <a:cs typeface="Microsoft GothicNeo"/>
+              </a:rPr>
+              <a:t>Private</a:t>
+            </a:r>
+            <a:r>
+              <a:rPr lang="ko-KR" altLang="en-US">
+                <a:solidFill>
+                  <a:srgbClr val="FFFFFF">
+                    <a:alpha val="70000"/>
+                  </a:srgbClr>
+                </a:solidFill>
+                <a:ea typeface="Microsoft GothicNeo"/>
+                <a:cs typeface="Microsoft GothicNeo"/>
+              </a:rPr>
+              <a:t>:</a:t>
+            </a:r>
+            <a:endParaRPr lang="ko-KR" altLang="en-US" dirty="0">
+              <a:solidFill>
+                <a:srgbClr val="FFFFFF">
+                  <a:alpha val="70000"/>
+                </a:srgbClr>
+              </a:solidFill>
+              <a:ea typeface="Microsoft GothicNeo"/>
+              <a:cs typeface="Microsoft GothicNeo"/>
+            </a:endParaRPr>
+          </a:p>
+          <a:p>
+            <a:pPr marL="0" indent="0">
+              <a:buNone/>
+            </a:pPr>
+            <a:r>
+              <a:rPr lang="ko-KR" altLang="en-US" dirty="0">
+                <a:solidFill>
+                  <a:srgbClr val="FFFFFF">
+                    <a:alpha val="70000"/>
+                  </a:srgbClr>
+                </a:solidFill>
+                <a:ea typeface="Microsoft GothicNeo"/>
+                <a:cs typeface="Microsoft GothicNeo"/>
+              </a:rPr>
+              <a:t>        </a:t>
+            </a:r>
+            <a:r>
+              <a:rPr lang="ko-KR" altLang="en-US" dirty="0" err="1">
+                <a:solidFill>
+                  <a:srgbClr val="FFFFFF">
+                    <a:alpha val="70000"/>
+                  </a:srgbClr>
+                </a:solidFill>
+                <a:ea typeface="Microsoft GothicNeo"/>
+                <a:cs typeface="Microsoft GothicNeo"/>
+              </a:rPr>
+              <a:t>T</a:t>
+            </a:r>
+            <a:r>
+              <a:rPr lang="ko-KR" altLang="en-US" dirty="0">
+                <a:solidFill>
+                  <a:srgbClr val="FFFFFF">
+                    <a:alpha val="70000"/>
+                  </a:srgbClr>
+                </a:solidFill>
+                <a:ea typeface="Microsoft GothicNeo"/>
+                <a:cs typeface="Microsoft GothicNeo"/>
+              </a:rPr>
+              <a:t> </a:t>
+            </a:r>
+            <a:r>
+              <a:rPr lang="ko-KR" altLang="en-US" dirty="0" err="1">
+                <a:solidFill>
+                  <a:srgbClr val="FFFFFF">
+                    <a:alpha val="70000"/>
+                  </a:srgbClr>
+                </a:solidFill>
+                <a:ea typeface="Microsoft GothicNeo"/>
+                <a:cs typeface="Microsoft GothicNeo"/>
+              </a:rPr>
+              <a:t>data</a:t>
+            </a:r>
+            <a:r>
+              <a:rPr lang="ko-KR" altLang="en-US" dirty="0">
+                <a:solidFill>
+                  <a:srgbClr val="FFFFFF">
+                    <a:alpha val="70000"/>
+                  </a:srgbClr>
+                </a:solidFill>
+                <a:ea typeface="Microsoft GothicNeo"/>
+                <a:cs typeface="Microsoft GothicNeo"/>
+              </a:rPr>
+              <a:t>;</a:t>
+            </a:r>
+          </a:p>
+          <a:p>
+            <a:pPr marL="0" indent="0">
+              <a:buNone/>
+            </a:pPr>
+            <a:r>
+              <a:rPr lang="ko-KR" altLang="en-US" dirty="0">
+                <a:solidFill>
+                  <a:srgbClr val="FFFFFF">
+                    <a:alpha val="70000"/>
+                  </a:srgbClr>
+                </a:solidFill>
+                <a:ea typeface="Microsoft GothicNeo"/>
+                <a:cs typeface="Microsoft GothicNeo"/>
+              </a:rPr>
+              <a:t>   Public :  </a:t>
+            </a:r>
+            <a:r>
+              <a:rPr lang="ko-KR" altLang="en-US" dirty="0" err="1">
+                <a:solidFill>
+                  <a:srgbClr val="FFFFFF">
+                    <a:alpha val="70000"/>
+                  </a:srgbClr>
+                </a:solidFill>
+                <a:ea typeface="Microsoft GothicNeo"/>
+                <a:cs typeface="Microsoft GothicNeo"/>
+              </a:rPr>
+              <a:t>Box</a:t>
+            </a:r>
+            <a:r>
+              <a:rPr lang="ko-KR" altLang="en-US" dirty="0">
+                <a:solidFill>
+                  <a:srgbClr val="FFFFFF">
+                    <a:alpha val="70000"/>
+                  </a:srgbClr>
+                </a:solidFill>
+                <a:ea typeface="Microsoft GothicNeo"/>
+                <a:cs typeface="Microsoft GothicNeo"/>
+              </a:rPr>
+              <a:t>();</a:t>
+            </a:r>
+          </a:p>
+          <a:p>
+            <a:pPr marL="0" indent="0">
+              <a:buNone/>
+            </a:pPr>
+            <a:r>
+              <a:rPr lang="ko-KR" altLang="en-US" dirty="0">
+                <a:solidFill>
+                  <a:srgbClr val="FFFFFF">
+                    <a:alpha val="70000"/>
+                  </a:srgbClr>
+                </a:solidFill>
+                <a:ea typeface="Microsoft GothicNeo"/>
+                <a:cs typeface="Microsoft GothicNeo"/>
+              </a:rPr>
+              <a:t>};</a:t>
+            </a:r>
+          </a:p>
+          <a:p>
+            <a:pPr marL="0" indent="0">
+              <a:buNone/>
+            </a:pPr>
+            <a:r>
+              <a:rPr lang="ko-KR" altLang="en-US" dirty="0" err="1">
+                <a:solidFill>
+                  <a:srgbClr val="FFFFFF">
+                    <a:alpha val="70000"/>
+                  </a:srgbClr>
+                </a:solidFill>
+                <a:ea typeface="Microsoft GothicNeo"/>
+                <a:cs typeface="Microsoft GothicNeo"/>
+              </a:rPr>
+              <a:t>Box</a:t>
+            </a:r>
+            <a:r>
+              <a:rPr lang="ko-KR" altLang="en-US" dirty="0">
+                <a:solidFill>
+                  <a:srgbClr val="FFFFFF">
+                    <a:alpha val="70000"/>
+                  </a:srgbClr>
+                </a:solidFill>
+                <a:ea typeface="Microsoft GothicNeo"/>
+                <a:cs typeface="Microsoft GothicNeo"/>
+              </a:rPr>
+              <a:t>&lt;</a:t>
+            </a:r>
+            <a:r>
+              <a:rPr lang="ko-KR" altLang="en-US" dirty="0" err="1">
+                <a:solidFill>
+                  <a:srgbClr val="FFFFFF">
+                    <a:alpha val="70000"/>
+                  </a:srgbClr>
+                </a:solidFill>
+                <a:ea typeface="Microsoft GothicNeo"/>
+                <a:cs typeface="Microsoft GothicNeo"/>
+              </a:rPr>
+              <a:t>T</a:t>
+            </a:r>
+            <a:r>
+              <a:rPr lang="ko-KR" altLang="en-US" dirty="0">
+                <a:solidFill>
+                  <a:srgbClr val="FFFFFF">
+                    <a:alpha val="70000"/>
+                  </a:srgbClr>
+                </a:solidFill>
+                <a:ea typeface="Microsoft GothicNeo"/>
+                <a:cs typeface="Microsoft GothicNeo"/>
+              </a:rPr>
+              <a:t>&gt;::</a:t>
+            </a:r>
+            <a:r>
+              <a:rPr lang="ko-KR" altLang="en-US" dirty="0" err="1">
+                <a:solidFill>
+                  <a:srgbClr val="FFFFFF">
+                    <a:alpha val="70000"/>
+                  </a:srgbClr>
+                </a:solidFill>
+                <a:ea typeface="Microsoft GothicNeo"/>
+                <a:cs typeface="Microsoft GothicNeo"/>
+              </a:rPr>
+              <a:t>Box</a:t>
+            </a:r>
+            <a:r>
+              <a:rPr lang="ko-KR" altLang="en-US" dirty="0">
+                <a:solidFill>
+                  <a:srgbClr val="FFFFFF">
+                    <a:alpha val="70000"/>
+                  </a:srgbClr>
+                </a:solidFill>
+                <a:ea typeface="Microsoft GothicNeo"/>
+                <a:cs typeface="Microsoft GothicNeo"/>
+              </a:rPr>
+              <a:t>(){...}// &lt;</a:t>
+            </a:r>
+            <a:r>
+              <a:rPr lang="ko-KR" altLang="en-US" dirty="0" err="1">
+                <a:solidFill>
+                  <a:srgbClr val="FFFFFF">
+                    <a:alpha val="70000"/>
+                  </a:srgbClr>
+                </a:solidFill>
+                <a:ea typeface="Microsoft GothicNeo"/>
+                <a:cs typeface="Microsoft GothicNeo"/>
+              </a:rPr>
+              <a:t>T</a:t>
+            </a:r>
+            <a:r>
+              <a:rPr lang="ko-KR" altLang="en-US" dirty="0">
+                <a:solidFill>
+                  <a:srgbClr val="FFFFFF">
+                    <a:alpha val="70000"/>
+                  </a:srgbClr>
+                </a:solidFill>
+                <a:ea typeface="Microsoft GothicNeo"/>
+                <a:cs typeface="Microsoft GothicNeo"/>
+              </a:rPr>
+              <a:t>&gt;</a:t>
+            </a:r>
+            <a:r>
+              <a:rPr lang="ko-KR" altLang="en-US" dirty="0" err="1">
+                <a:solidFill>
+                  <a:srgbClr val="FFFFFF">
+                    <a:alpha val="70000"/>
+                  </a:srgbClr>
+                </a:solidFill>
+                <a:ea typeface="Microsoft GothicNeo"/>
+                <a:cs typeface="Microsoft GothicNeo"/>
+              </a:rPr>
+              <a:t>를</a:t>
+            </a:r>
+            <a:r>
+              <a:rPr lang="ko-KR" altLang="en-US" dirty="0">
+                <a:solidFill>
+                  <a:srgbClr val="FFFFFF">
+                    <a:alpha val="70000"/>
+                  </a:srgbClr>
+                </a:solidFill>
+                <a:ea typeface="Microsoft GothicNeo"/>
+                <a:cs typeface="Microsoft GothicNeo"/>
+              </a:rPr>
+              <a:t> </a:t>
+            </a:r>
+            <a:r>
+              <a:rPr lang="ko-KR" altLang="en-US" dirty="0" err="1">
+                <a:solidFill>
+                  <a:srgbClr val="FFFFFF">
+                    <a:alpha val="70000"/>
+                  </a:srgbClr>
+                </a:solidFill>
+                <a:ea typeface="Microsoft GothicNeo"/>
+                <a:cs typeface="Microsoft GothicNeo"/>
+              </a:rPr>
+              <a:t>사용하여야함</a:t>
+            </a:r>
+            <a:r>
+              <a:rPr lang="ko-KR" altLang="en-US" dirty="0">
+                <a:solidFill>
+                  <a:srgbClr val="FFFFFF">
+                    <a:alpha val="70000"/>
+                  </a:srgbClr>
+                </a:solidFill>
+                <a:ea typeface="Microsoft GothicNeo"/>
+                <a:cs typeface="Microsoft GothicNeo"/>
+              </a:rPr>
+              <a:t>.</a:t>
+            </a:r>
+          </a:p>
+          <a:p>
+            <a:pPr marL="0" indent="0">
+              <a:buNone/>
+            </a:pPr>
+            <a:r>
+              <a:rPr lang="ko-KR" altLang="en-US" dirty="0">
+                <a:solidFill>
+                  <a:srgbClr val="FFFFFF">
+                    <a:alpha val="70000"/>
+                  </a:srgbClr>
+                </a:solidFill>
+                <a:ea typeface="Microsoft GothicNeo"/>
+                <a:cs typeface="Microsoft GothicNeo"/>
+              </a:rPr>
+              <a:t>   </a:t>
+            </a:r>
+          </a:p>
+          <a:p>
+            <a:pPr marL="0" indent="0">
+              <a:buNone/>
+            </a:pPr>
+            <a:r>
+              <a:rPr lang="ko-KR" altLang="en-US" dirty="0">
+                <a:solidFill>
+                  <a:srgbClr val="FFFFFF">
+                    <a:alpha val="70000"/>
+                  </a:srgbClr>
+                </a:solidFill>
+                <a:ea typeface="Microsoft GothicNeo"/>
+                <a:cs typeface="Microsoft GothicNeo"/>
+              </a:rPr>
+              <a:t>    </a:t>
+            </a:r>
+          </a:p>
+        </p:txBody>
+      </p:sp>
+      <p:sp>
+        <p:nvSpPr>
+          <p:cNvPr id="4" name="TextBox 3">
+            <a:extLst>
+              <a:ext uri="{FF2B5EF4-FFF2-40B4-BE49-F238E27FC236}">
+                <a16:creationId xmlns:a16="http://schemas.microsoft.com/office/drawing/2014/main" id="{90802B04-6980-E03A-B8BD-FFFFE175915D}"/>
+              </a:ext>
+            </a:extLst>
+          </p:cNvPr>
+          <p:cNvSpPr txBox="1"/>
+          <p:nvPr/>
+        </p:nvSpPr>
+        <p:spPr>
+          <a:xfrm>
+            <a:off x="6619164" y="2763671"/>
+            <a:ext cx="4594746" cy="1200329"/>
+          </a:xfrm>
+          <a:prstGeom prst="rect">
+            <a:avLst/>
+          </a:prstGeom>
+          <a:noFill/>
+        </p:spPr>
+        <p:txBody>
+          <a:bodyPr rot="0" spcFirstLastPara="0" vertOverflow="overflow" horzOverflow="overflow" vert="horz" wrap="square" lIns="91440" tIns="45720" rIns="91440" bIns="45720" numCol="1" spcCol="0" rtlCol="0" fromWordArt="0" anchor="t" anchorCtr="0" forceAA="0" compatLnSpc="1">
+            <a:prstTxWarp prst="textNoShape">
+              <a:avLst/>
+            </a:prstTxWarp>
+            <a:spAutoFit/>
+          </a:bodyPr>
+          <a:lstStyle/>
+          <a:p>
+            <a:r>
+              <a:rPr lang="ko-KR" altLang="en-US" dirty="0" err="1">
+                <a:ea typeface="Microsoft GothicNeo"/>
+                <a:cs typeface="Microsoft GothicNeo"/>
+              </a:rPr>
+              <a:t>typedef</a:t>
+            </a:r>
+            <a:r>
+              <a:rPr lang="ko-KR" altLang="en-US" dirty="0">
+                <a:ea typeface="Microsoft GothicNeo"/>
+                <a:cs typeface="Microsoft GothicNeo"/>
+              </a:rPr>
+              <a:t> </a:t>
+            </a:r>
+            <a:r>
+              <a:rPr lang="ko-KR" altLang="en-US" dirty="0" err="1">
+                <a:ea typeface="Microsoft GothicNeo"/>
+                <a:cs typeface="Microsoft GothicNeo"/>
+              </a:rPr>
+              <a:t>Box</a:t>
+            </a:r>
+            <a:r>
+              <a:rPr lang="ko-KR" altLang="en-US" dirty="0">
+                <a:ea typeface="Microsoft GothicNeo"/>
+                <a:cs typeface="Microsoft GothicNeo"/>
+              </a:rPr>
+              <a:t>&lt;</a:t>
+            </a:r>
+            <a:r>
+              <a:rPr lang="ko-KR" altLang="en-US" dirty="0" err="1">
+                <a:ea typeface="Microsoft GothicNeo"/>
+                <a:cs typeface="Microsoft GothicNeo"/>
+              </a:rPr>
+              <a:t>int</a:t>
+            </a:r>
+            <a:r>
+              <a:rPr lang="ko-KR" altLang="en-US" dirty="0">
+                <a:ea typeface="Microsoft GothicNeo"/>
+                <a:cs typeface="Microsoft GothicNeo"/>
+              </a:rPr>
+              <a:t>&gt; </a:t>
+            </a:r>
+            <a:r>
+              <a:rPr lang="ko-KR" altLang="en-US" dirty="0" err="1">
+                <a:ea typeface="Microsoft GothicNeo"/>
+                <a:cs typeface="Microsoft GothicNeo"/>
+              </a:rPr>
+              <a:t>ibox</a:t>
+            </a:r>
+            <a:r>
+              <a:rPr lang="ko-KR" altLang="en-US" dirty="0">
+                <a:ea typeface="Microsoft GothicNeo"/>
+                <a:cs typeface="Microsoft GothicNeo"/>
+              </a:rPr>
+              <a:t>;//</a:t>
+            </a:r>
+            <a:r>
+              <a:rPr lang="ko-KR" altLang="en-US" dirty="0" err="1">
+                <a:ea typeface="Microsoft GothicNeo"/>
+                <a:cs typeface="Microsoft GothicNeo"/>
+              </a:rPr>
+              <a:t>를</a:t>
+            </a:r>
+            <a:r>
+              <a:rPr lang="ko-KR" altLang="en-US" dirty="0">
+                <a:ea typeface="Microsoft GothicNeo"/>
+                <a:cs typeface="Microsoft GothicNeo"/>
+              </a:rPr>
+              <a:t> 선언한후</a:t>
+            </a:r>
+          </a:p>
+          <a:p>
+            <a:r>
+              <a:rPr lang="ko-KR" altLang="en-US" dirty="0" err="1">
+                <a:ea typeface="Microsoft GothicNeo"/>
+                <a:cs typeface="Microsoft GothicNeo"/>
+              </a:rPr>
+              <a:t>Ibox</a:t>
+            </a:r>
+            <a:r>
+              <a:rPr lang="ko-KR" altLang="en-US" dirty="0">
+                <a:ea typeface="Microsoft GothicNeo"/>
+                <a:cs typeface="Microsoft GothicNeo"/>
+              </a:rPr>
+              <a:t> </a:t>
+            </a:r>
+            <a:r>
+              <a:rPr lang="ko-KR" altLang="en-US" dirty="0" err="1">
+                <a:ea typeface="Microsoft GothicNeo"/>
+                <a:cs typeface="Microsoft GothicNeo"/>
+              </a:rPr>
+              <a:t>box</a:t>
+            </a:r>
+            <a:r>
+              <a:rPr lang="ko-KR" altLang="en-US" dirty="0">
+                <a:ea typeface="Microsoft GothicNeo"/>
+                <a:cs typeface="Microsoft GothicNeo"/>
+              </a:rPr>
+              <a:t>; 로 사용가능.</a:t>
+            </a:r>
+          </a:p>
+          <a:p>
+            <a:r>
+              <a:rPr lang="ko-KR" altLang="en-US" dirty="0">
+                <a:ea typeface="Microsoft GothicNeo"/>
+                <a:cs typeface="Microsoft GothicNeo"/>
+              </a:rPr>
+              <a:t>// 하지 않는다면</a:t>
+            </a:r>
+          </a:p>
+          <a:p>
+            <a:r>
+              <a:rPr lang="ko-KR" altLang="en-US" dirty="0" err="1">
+                <a:ea typeface="Microsoft GothicNeo"/>
+                <a:cs typeface="Microsoft GothicNeo"/>
+              </a:rPr>
+              <a:t>Box</a:t>
+            </a:r>
+            <a:r>
+              <a:rPr lang="ko-KR" altLang="en-US" dirty="0">
+                <a:ea typeface="Microsoft GothicNeo"/>
+                <a:cs typeface="Microsoft GothicNeo"/>
+              </a:rPr>
+              <a:t>&lt;</a:t>
+            </a:r>
+            <a:r>
+              <a:rPr lang="ko-KR" altLang="en-US" dirty="0" err="1">
+                <a:ea typeface="Microsoft GothicNeo"/>
+                <a:cs typeface="Microsoft GothicNeo"/>
+              </a:rPr>
+              <a:t>int</a:t>
+            </a:r>
+            <a:r>
+              <a:rPr lang="ko-KR" altLang="en-US" dirty="0">
+                <a:ea typeface="Microsoft GothicNeo"/>
+                <a:cs typeface="Microsoft GothicNeo"/>
+              </a:rPr>
+              <a:t>&gt; </a:t>
+            </a:r>
+            <a:r>
+              <a:rPr lang="ko-KR" altLang="en-US" dirty="0" err="1">
+                <a:ea typeface="Microsoft GothicNeo"/>
+                <a:cs typeface="Microsoft GothicNeo"/>
+              </a:rPr>
+              <a:t>box</a:t>
+            </a:r>
+            <a:r>
+              <a:rPr lang="ko-KR" altLang="en-US" dirty="0">
+                <a:ea typeface="Microsoft GothicNeo"/>
+                <a:cs typeface="Microsoft GothicNeo"/>
+              </a:rPr>
+              <a:t>; 로 </a:t>
+            </a:r>
+            <a:r>
+              <a:rPr lang="ko-KR" altLang="en-US" dirty="0" err="1">
+                <a:ea typeface="Microsoft GothicNeo"/>
+                <a:cs typeface="Microsoft GothicNeo"/>
+              </a:rPr>
+              <a:t>사용해야함</a:t>
+            </a:r>
+            <a:endParaRPr lang="ko-KR" altLang="en-US" dirty="0">
+              <a:ea typeface="Microsoft GothicNeo"/>
+              <a:cs typeface="Microsoft GothicNeo"/>
+            </a:endParaRPr>
+          </a:p>
+        </p:txBody>
+      </p:sp>
+    </p:spTree>
+    <p:extLst>
+      <p:ext uri="{BB962C8B-B14F-4D97-AF65-F5344CB8AC3E}">
+        <p14:creationId xmlns:p14="http://schemas.microsoft.com/office/powerpoint/2010/main" val="1358021042"/>
       </p:ext>
     </p:extLst>
   </p:cSld>

</xml_diff>

<commit_message>
[C++ 지식 ] Algorithm Header using func des
</commit_message>
<xml_diff>
--- a/전공지식/C언어의 기초/C언어 기초지식.pptx
+++ b/전공지식/C언어의 기초/C언어 기초지식.pptx
@@ -53,6 +53,11 @@
     <p:sldId id="302" r:id="rId47"/>
     <p:sldId id="303" r:id="rId48"/>
     <p:sldId id="304" r:id="rId49"/>
+    <p:sldId id="305" r:id="rId50"/>
+    <p:sldId id="306" r:id="rId51"/>
+    <p:sldId id="307" r:id="rId52"/>
+    <p:sldId id="308" r:id="rId53"/>
+    <p:sldId id="309" r:id="rId54"/>
   </p:sldIdLst>
   <p:sldSz cx="12192000" cy="6858000"/>
   <p:notesSz cx="6858000" cy="9144000"/>
@@ -164,6 +169,7 @@
   <p1510:revLst>
     <p1510:client id="{68FA48E1-8A62-4041-A1F4-B32A27D0A544}" v="264" dt="2023-10-21T14:52:49.774"/>
     <p1510:client id="{70AA4CCD-8E10-434E-868F-5C5E0A410C2E}" v="3097" dt="2023-10-17T12:35:51.078"/>
+    <p1510:client id="{7714E316-76DC-4FA9-834C-D956377333FE}" v="746" dt="2023-10-24T17:17:00.856"/>
     <p1510:client id="{773FEA85-BD00-400D-8917-366C44315C9D}" v="1719" dt="2023-10-19T11:41:03.164"/>
     <p1510:client id="{95F9D723-334F-40E2-9BD2-493BAD9321A6}" v="1499" dt="2023-10-23T15:06:12.089"/>
     <p1510:client id="{B9D2BD16-586F-47BD-8BBE-467168D151DF}" v="1667" dt="2023-10-24T14:46:02.688"/>
@@ -33795,6 +33801,366 @@
 </p:sld>
 </file>
 
+<file path=ppt/slides/slide49.xml><?xml version="1.0" encoding="utf-8"?>
+<p:sld xmlns:a="http://schemas.openxmlformats.org/drawingml/2006/main" xmlns:r="http://schemas.openxmlformats.org/officeDocument/2006/relationships" xmlns:p="http://schemas.openxmlformats.org/presentationml/2006/main">
+  <p:cSld>
+    <p:spTree>
+      <p:nvGrpSpPr>
+        <p:cNvPr id="1" name=""/>
+        <p:cNvGrpSpPr/>
+        <p:nvPr/>
+      </p:nvGrpSpPr>
+      <p:grpSpPr>
+        <a:xfrm>
+          <a:off x="0" y="0"/>
+          <a:ext cx="0" cy="0"/>
+          <a:chOff x="0" y="0"/>
+          <a:chExt cx="0" cy="0"/>
+        </a:xfrm>
+      </p:grpSpPr>
+      <p:sp>
+        <p:nvSpPr>
+          <p:cNvPr id="2" name="제목 1">
+            <a:extLst>
+              <a:ext uri="{FF2B5EF4-FFF2-40B4-BE49-F238E27FC236}">
+                <a16:creationId xmlns:a16="http://schemas.microsoft.com/office/drawing/2014/main" id="{499AF511-CBFA-A508-C1A9-F58FBB4338F4}"/>
+              </a:ext>
+            </a:extLst>
+          </p:cNvPr>
+          <p:cNvSpPr>
+            <a:spLocks noGrp="1"/>
+          </p:cNvSpPr>
+          <p:nvPr>
+            <p:ph type="title"/>
+          </p:nvPr>
+        </p:nvSpPr>
+        <p:spPr/>
+        <p:txBody>
+          <a:bodyPr/>
+          <a:lstStyle/>
+          <a:p>
+            <a:r>
+              <a:rPr lang="ko-KR" altLang="en-US" dirty="0">
+                <a:ea typeface="Microsoft GothicNeo"/>
+                <a:cs typeface="Microsoft GothicNeo"/>
+              </a:rPr>
+              <a:t>&lt;컨테이너 </a:t>
+            </a:r>
+            <a:r>
+              <a:rPr lang="ko-KR" altLang="en-US" dirty="0" err="1">
+                <a:ea typeface="Microsoft GothicNeo"/>
+                <a:cs typeface="Microsoft GothicNeo"/>
+              </a:rPr>
+              <a:t>어뎁터</a:t>
+            </a:r>
+            <a:r>
+              <a:rPr lang="ko-KR" altLang="en-US" dirty="0">
+                <a:ea typeface="Microsoft GothicNeo"/>
+                <a:cs typeface="Microsoft GothicNeo"/>
+              </a:rPr>
+              <a:t> &gt; // </a:t>
+            </a:r>
+            <a:r>
+              <a:rPr lang="ko-KR" altLang="en-US" dirty="0" err="1">
+                <a:ea typeface="Microsoft GothicNeo"/>
+                <a:cs typeface="Microsoft GothicNeo"/>
+              </a:rPr>
+              <a:t>stack</a:t>
+            </a:r>
+            <a:r>
+              <a:rPr lang="ko-KR" altLang="en-US" dirty="0">
+                <a:ea typeface="Microsoft GothicNeo"/>
+                <a:cs typeface="Microsoft GothicNeo"/>
+              </a:rPr>
+              <a:t> &amp; </a:t>
+            </a:r>
+            <a:r>
+              <a:rPr lang="ko-KR" altLang="en-US" dirty="0" err="1">
+                <a:ea typeface="Microsoft GothicNeo"/>
+                <a:cs typeface="Microsoft GothicNeo"/>
+              </a:rPr>
+              <a:t>queue</a:t>
+            </a:r>
+            <a:endParaRPr lang="ko-KR" altLang="en-US" dirty="0" err="1"/>
+          </a:p>
+        </p:txBody>
+      </p:sp>
+      <p:sp>
+        <p:nvSpPr>
+          <p:cNvPr id="3" name="내용 개체 틀 2">
+            <a:extLst>
+              <a:ext uri="{FF2B5EF4-FFF2-40B4-BE49-F238E27FC236}">
+                <a16:creationId xmlns:a16="http://schemas.microsoft.com/office/drawing/2014/main" id="{7567D0A5-DE26-1C26-6793-1BF5EFC0C66E}"/>
+              </a:ext>
+            </a:extLst>
+          </p:cNvPr>
+          <p:cNvSpPr>
+            <a:spLocks noGrp="1"/>
+          </p:cNvSpPr>
+          <p:nvPr>
+            <p:ph idx="1"/>
+          </p:nvPr>
+        </p:nvSpPr>
+        <p:spPr/>
+        <p:txBody>
+          <a:bodyPr lIns="109728" tIns="109728" rIns="109728" bIns="91440" anchor="t"/>
+          <a:lstStyle/>
+          <a:p>
+            <a:r>
+              <a:rPr lang="ko-KR" altLang="en-US" dirty="0">
+                <a:solidFill>
+                  <a:srgbClr val="FFFFFF">
+                    <a:alpha val="70000"/>
+                  </a:srgbClr>
+                </a:solidFill>
+                <a:ea typeface="Microsoft GothicNeo"/>
+                <a:cs typeface="Microsoft GothicNeo"/>
+              </a:rPr>
+              <a:t>이미 존재하는 컨테이너로 새로운 기능을 제공하기위해 만들어짐</a:t>
+            </a:r>
+          </a:p>
+          <a:p>
+            <a:r>
+              <a:rPr lang="ko-KR" altLang="en-US" dirty="0" err="1">
+                <a:solidFill>
+                  <a:srgbClr val="FFFFFF">
+                    <a:alpha val="70000"/>
+                  </a:srgbClr>
+                </a:solidFill>
+                <a:ea typeface="Microsoft GothicNeo"/>
+                <a:cs typeface="Microsoft GothicNeo"/>
+              </a:rPr>
+              <a:t>Stack</a:t>
+            </a:r>
+            <a:r>
+              <a:rPr lang="ko-KR" altLang="en-US" dirty="0">
+                <a:solidFill>
+                  <a:srgbClr val="FFFFFF">
+                    <a:alpha val="70000"/>
+                  </a:srgbClr>
+                </a:solidFill>
+                <a:ea typeface="Microsoft GothicNeo"/>
+                <a:cs typeface="Microsoft GothicNeo"/>
+              </a:rPr>
+              <a:t> 은 </a:t>
+            </a:r>
+            <a:r>
+              <a:rPr lang="ko-KR" altLang="en-US" dirty="0" err="1">
+                <a:solidFill>
+                  <a:srgbClr val="FFFFFF">
+                    <a:alpha val="70000"/>
+                  </a:srgbClr>
+                </a:solidFill>
+                <a:ea typeface="Microsoft GothicNeo"/>
+                <a:cs typeface="Microsoft GothicNeo"/>
+              </a:rPr>
+              <a:t>회문을</a:t>
+            </a:r>
+            <a:r>
+              <a:rPr lang="ko-KR" altLang="en-US" dirty="0">
+                <a:solidFill>
+                  <a:srgbClr val="FFFFFF">
+                    <a:alpha val="70000"/>
+                  </a:srgbClr>
+                </a:solidFill>
+                <a:ea typeface="Microsoft GothicNeo"/>
+                <a:cs typeface="Microsoft GothicNeo"/>
+              </a:rPr>
+              <a:t> 검사하거나 자료형을 입력과 출력을 거꾸로 </a:t>
+            </a:r>
+            <a:r>
+              <a:rPr lang="ko-KR" altLang="en-US" dirty="0" err="1">
+                <a:solidFill>
+                  <a:srgbClr val="FFFFFF">
+                    <a:alpha val="70000"/>
+                  </a:srgbClr>
+                </a:solidFill>
+                <a:ea typeface="Microsoft GothicNeo"/>
+                <a:cs typeface="Microsoft GothicNeo"/>
+              </a:rPr>
+              <a:t>하고싶을떄</a:t>
+            </a:r>
+            <a:r>
+              <a:rPr lang="ko-KR" altLang="en-US" dirty="0">
+                <a:solidFill>
+                  <a:srgbClr val="FFFFFF">
+                    <a:alpha val="70000"/>
+                  </a:srgbClr>
+                </a:solidFill>
+                <a:ea typeface="Microsoft GothicNeo"/>
+                <a:cs typeface="Microsoft GothicNeo"/>
+              </a:rPr>
+              <a:t> 사용함.</a:t>
+            </a:r>
+          </a:p>
+          <a:p>
+            <a:r>
+              <a:rPr lang="ko-KR" altLang="en-US" dirty="0" err="1">
+                <a:solidFill>
+                  <a:srgbClr val="FFFFFF">
+                    <a:alpha val="70000"/>
+                  </a:srgbClr>
+                </a:solidFill>
+                <a:ea typeface="Microsoft GothicNeo"/>
+                <a:cs typeface="Microsoft GothicNeo"/>
+              </a:rPr>
+              <a:t>Queue는</a:t>
+            </a:r>
+            <a:r>
+              <a:rPr lang="ko-KR" altLang="en-US" dirty="0">
+                <a:solidFill>
+                  <a:srgbClr val="FFFFFF">
+                    <a:alpha val="70000"/>
+                  </a:srgbClr>
+                </a:solidFill>
+                <a:ea typeface="Microsoft GothicNeo"/>
+                <a:cs typeface="Microsoft GothicNeo"/>
+              </a:rPr>
+              <a:t> </a:t>
+            </a:r>
+            <a:r>
+              <a:rPr lang="ko-KR" altLang="en-US" dirty="0" err="1">
+                <a:solidFill>
+                  <a:srgbClr val="FFFFFF">
+                    <a:alpha val="70000"/>
+                  </a:srgbClr>
+                </a:solidFill>
+                <a:ea typeface="Microsoft GothicNeo"/>
+                <a:cs typeface="Microsoft GothicNeo"/>
+              </a:rPr>
+              <a:t>BFS에서</a:t>
+            </a:r>
+            <a:r>
+              <a:rPr lang="ko-KR" altLang="en-US" dirty="0">
+                <a:solidFill>
+                  <a:srgbClr val="FFFFFF">
+                    <a:alpha val="70000"/>
+                  </a:srgbClr>
+                </a:solidFill>
+                <a:ea typeface="Microsoft GothicNeo"/>
+                <a:cs typeface="Microsoft GothicNeo"/>
+              </a:rPr>
+              <a:t> 사용용</a:t>
+            </a:r>
+          </a:p>
+          <a:p>
+            <a:r>
+              <a:rPr lang="ko-KR" altLang="en-US" dirty="0">
+                <a:solidFill>
+                  <a:srgbClr val="FFFFFF">
+                    <a:alpha val="70000"/>
+                  </a:srgbClr>
+                </a:solidFill>
+                <a:ea typeface="Microsoft GothicNeo"/>
+                <a:cs typeface="Microsoft GothicNeo"/>
+              </a:rPr>
+              <a:t>우선순위 큐는 </a:t>
+            </a:r>
+            <a:r>
+              <a:rPr lang="ko-KR" altLang="en-US" dirty="0" err="1">
+                <a:solidFill>
+                  <a:srgbClr val="FFFFFF">
+                    <a:alpha val="70000"/>
+                  </a:srgbClr>
+                </a:solidFill>
+                <a:ea typeface="Microsoft GothicNeo"/>
+                <a:cs typeface="Microsoft GothicNeo"/>
+              </a:rPr>
+              <a:t>탐색할떄</a:t>
+            </a:r>
+            <a:r>
+              <a:rPr lang="ko-KR" altLang="en-US" dirty="0">
+                <a:solidFill>
+                  <a:srgbClr val="FFFFFF">
+                    <a:alpha val="70000"/>
+                  </a:srgbClr>
+                </a:solidFill>
+                <a:ea typeface="Microsoft GothicNeo"/>
+                <a:cs typeface="Microsoft GothicNeo"/>
+              </a:rPr>
+              <a:t> </a:t>
+            </a:r>
+            <a:r>
+              <a:rPr lang="ko-KR" altLang="en-US" dirty="0" err="1">
+                <a:solidFill>
+                  <a:srgbClr val="FFFFFF">
+                    <a:alpha val="70000"/>
+                  </a:srgbClr>
+                </a:solidFill>
+                <a:ea typeface="Microsoft GothicNeo"/>
+                <a:cs typeface="Microsoft GothicNeo"/>
+              </a:rPr>
+              <a:t>최소힙</a:t>
+            </a:r>
+            <a:r>
+              <a:rPr lang="ko-KR" altLang="en-US" dirty="0">
+                <a:solidFill>
+                  <a:srgbClr val="FFFFFF">
+                    <a:alpha val="70000"/>
+                  </a:srgbClr>
+                </a:solidFill>
+                <a:ea typeface="Microsoft GothicNeo"/>
+                <a:cs typeface="Microsoft GothicNeo"/>
+              </a:rPr>
+              <a:t> 이나 </a:t>
+            </a:r>
+            <a:r>
+              <a:rPr lang="ko-KR" altLang="en-US" dirty="0" err="1">
+                <a:solidFill>
+                  <a:srgbClr val="FFFFFF">
+                    <a:alpha val="70000"/>
+                  </a:srgbClr>
+                </a:solidFill>
+                <a:ea typeface="Microsoft GothicNeo"/>
+                <a:cs typeface="Microsoft GothicNeo"/>
+              </a:rPr>
+              <a:t>최대힙힙을</a:t>
+            </a:r>
+            <a:r>
+              <a:rPr lang="ko-KR" altLang="en-US" dirty="0">
+                <a:solidFill>
+                  <a:srgbClr val="FFFFFF">
+                    <a:alpha val="70000"/>
+                  </a:srgbClr>
+                </a:solidFill>
+                <a:ea typeface="Microsoft GothicNeo"/>
+                <a:cs typeface="Microsoft GothicNeo"/>
+              </a:rPr>
+              <a:t> 이용해 이분탐색을 한다.</a:t>
+            </a:r>
+          </a:p>
+          <a:p>
+            <a:pPr marL="0" indent="0">
+              <a:buNone/>
+            </a:pPr>
+            <a:r>
+              <a:rPr lang="ko-KR" altLang="en-US" dirty="0">
+                <a:solidFill>
+                  <a:srgbClr val="FFFFFF">
+                    <a:alpha val="70000"/>
+                  </a:srgbClr>
+                </a:solidFill>
+                <a:ea typeface="Microsoft GothicNeo"/>
+                <a:cs typeface="Microsoft GothicNeo"/>
+              </a:rPr>
+              <a:t>=&gt; 때문에 데이터의 량의 탐색에 쓰인다.</a:t>
+            </a:r>
+          </a:p>
+        </p:txBody>
+      </p:sp>
+    </p:spTree>
+    <p:extLst>
+      <p:ext uri="{BB962C8B-B14F-4D97-AF65-F5344CB8AC3E}">
+        <p14:creationId xmlns:p14="http://schemas.microsoft.com/office/powerpoint/2010/main" val="1611843895"/>
+      </p:ext>
+    </p:extLst>
+  </p:cSld>
+  <p:clrMapOvr>
+    <a:masterClrMapping/>
+  </p:clrMapOvr>
+</p:sld>
+</file>
+
 <file path=ppt/slides/slide5.xml><?xml version="1.0" encoding="utf-8"?>
 <p:sld xmlns:a="http://schemas.openxmlformats.org/drawingml/2006/main" xmlns:r="http://schemas.openxmlformats.org/officeDocument/2006/relationships" xmlns:p="http://schemas.openxmlformats.org/presentationml/2006/main">
   <p:cSld>
@@ -34130,6 +34496,1959 @@
     <p:extLst>
       <p:ext uri="{BB962C8B-B14F-4D97-AF65-F5344CB8AC3E}">
         <p14:creationId xmlns:p14="http://schemas.microsoft.com/office/powerpoint/2010/main" val="3868318990"/>
+      </p:ext>
+    </p:extLst>
+  </p:cSld>
+  <p:clrMapOvr>
+    <a:masterClrMapping/>
+  </p:clrMapOvr>
+</p:sld>
+</file>
+
+<file path=ppt/slides/slide50.xml><?xml version="1.0" encoding="utf-8"?>
+<p:sld xmlns:a="http://schemas.openxmlformats.org/drawingml/2006/main" xmlns:r="http://schemas.openxmlformats.org/officeDocument/2006/relationships" xmlns:p="http://schemas.openxmlformats.org/presentationml/2006/main">
+  <p:cSld>
+    <p:spTree>
+      <p:nvGrpSpPr>
+        <p:cNvPr id="1" name=""/>
+        <p:cNvGrpSpPr/>
+        <p:nvPr/>
+      </p:nvGrpSpPr>
+      <p:grpSpPr>
+        <a:xfrm>
+          <a:off x="0" y="0"/>
+          <a:ext cx="0" cy="0"/>
+          <a:chOff x="0" y="0"/>
+          <a:chExt cx="0" cy="0"/>
+        </a:xfrm>
+      </p:grpSpPr>
+      <p:sp>
+        <p:nvSpPr>
+          <p:cNvPr id="2" name="제목 1">
+            <a:extLst>
+              <a:ext uri="{FF2B5EF4-FFF2-40B4-BE49-F238E27FC236}">
+                <a16:creationId xmlns:a16="http://schemas.microsoft.com/office/drawing/2014/main" id="{36C5168E-17FC-A1C5-D4F5-28C656C347E7}"/>
+              </a:ext>
+            </a:extLst>
+          </p:cNvPr>
+          <p:cNvSpPr>
+            <a:spLocks noGrp="1"/>
+          </p:cNvSpPr>
+          <p:nvPr>
+            <p:ph type="title"/>
+          </p:nvPr>
+        </p:nvSpPr>
+        <p:spPr/>
+        <p:txBody>
+          <a:bodyPr/>
+          <a:lstStyle/>
+          <a:p>
+            <a:r>
+              <a:rPr lang="ko-KR" altLang="en-US" dirty="0">
+                <a:ea typeface="Microsoft GothicNeo"/>
+                <a:cs typeface="Microsoft GothicNeo"/>
+              </a:rPr>
+              <a:t>&lt; </a:t>
+            </a:r>
+            <a:r>
+              <a:rPr lang="ko-KR" altLang="en-US" dirty="0" err="1">
+                <a:ea typeface="Microsoft GothicNeo"/>
+                <a:cs typeface="Microsoft GothicNeo"/>
+              </a:rPr>
+              <a:t>Algorithm</a:t>
+            </a:r>
+            <a:r>
+              <a:rPr lang="ko-KR" altLang="en-US" dirty="0">
+                <a:ea typeface="Microsoft GothicNeo"/>
+                <a:cs typeface="Microsoft GothicNeo"/>
+              </a:rPr>
+              <a:t> 헤더파일 &gt;</a:t>
+            </a:r>
+            <a:endParaRPr lang="ko-KR" altLang="en-US" dirty="0"/>
+          </a:p>
+        </p:txBody>
+      </p:sp>
+      <p:sp>
+        <p:nvSpPr>
+          <p:cNvPr id="3" name="내용 개체 틀 2">
+            <a:extLst>
+              <a:ext uri="{FF2B5EF4-FFF2-40B4-BE49-F238E27FC236}">
+                <a16:creationId xmlns:a16="http://schemas.microsoft.com/office/drawing/2014/main" id="{85CA71FB-092F-1DE9-8C33-CBB054D55FDC}"/>
+              </a:ext>
+            </a:extLst>
+          </p:cNvPr>
+          <p:cNvSpPr>
+            <a:spLocks noGrp="1"/>
+          </p:cNvSpPr>
+          <p:nvPr>
+            <p:ph idx="1"/>
+          </p:nvPr>
+        </p:nvSpPr>
+        <p:spPr/>
+        <p:txBody>
+          <a:bodyPr lIns="109728" tIns="109728" rIns="109728" bIns="91440" anchor="t"/>
+          <a:lstStyle/>
+          <a:p>
+            <a:r>
+              <a:rPr lang="ko-KR" altLang="en-US" b="1" dirty="0">
+                <a:solidFill>
+                  <a:schemeClr val="accent2">
+                    <a:lumMod val="75000"/>
+                  </a:schemeClr>
+                </a:solidFill>
+                <a:ea typeface="Microsoft GothicNeo"/>
+                <a:cs typeface="Microsoft GothicNeo"/>
+              </a:rPr>
+              <a:t>코딩테스트에서 매우 효과적으로 사용될 헤더파일이다.</a:t>
+            </a:r>
+          </a:p>
+          <a:p>
+            <a:r>
+              <a:rPr lang="ko-KR" altLang="en-US" dirty="0">
+                <a:solidFill>
+                  <a:srgbClr val="FFFFFF">
+                    <a:alpha val="70000"/>
+                  </a:srgbClr>
+                </a:solidFill>
+                <a:ea typeface="Microsoft GothicNeo"/>
+                <a:cs typeface="Microsoft GothicNeo"/>
+              </a:rPr>
+              <a:t>컨테이너의 어댑터는 입출력에 관련이 있었다고 한다면</a:t>
+            </a:r>
+            <a:endParaRPr lang="ko-KR" dirty="0"/>
+          </a:p>
+          <a:p>
+            <a:pPr marL="0" indent="0">
+              <a:buNone/>
+            </a:pPr>
+            <a:r>
+              <a:rPr lang="ko-KR" altLang="en-US" dirty="0">
+                <a:solidFill>
+                  <a:srgbClr val="FFFFFF">
+                    <a:alpha val="70000"/>
+                  </a:srgbClr>
+                </a:solidFill>
+                <a:ea typeface="Microsoft GothicNeo"/>
+                <a:cs typeface="Microsoft GothicNeo"/>
+              </a:rPr>
+              <a:t>컨테이너의 알고리즘을 담당하는 헤더파일이다.</a:t>
+            </a:r>
+          </a:p>
+          <a:p>
+            <a:pPr>
+              <a:buFont typeface="Arial"/>
+            </a:pPr>
+            <a:r>
+              <a:rPr lang="ko-KR" dirty="0">
+                <a:solidFill>
+                  <a:srgbClr val="FFFFFF">
+                    <a:alpha val="70000"/>
+                  </a:srgbClr>
+                </a:solidFill>
+                <a:ea typeface="+mn-lt"/>
+                <a:cs typeface="+mn-lt"/>
+              </a:rPr>
+              <a:t>변경 알고리즘과 </a:t>
+            </a:r>
+            <a:r>
+              <a:rPr lang="ko-KR" altLang="en-US" err="1">
+                <a:solidFill>
+                  <a:srgbClr val="FFFFFF">
+                    <a:alpha val="70000"/>
+                  </a:srgbClr>
+                </a:solidFill>
+                <a:ea typeface="+mn-lt"/>
+                <a:cs typeface="+mn-lt"/>
+              </a:rPr>
+              <a:t>비변경</a:t>
+            </a:r>
+            <a:r>
+              <a:rPr lang="ko-KR" altLang="en-US" dirty="0">
+                <a:solidFill>
+                  <a:srgbClr val="FFFFFF">
+                    <a:alpha val="70000"/>
+                  </a:srgbClr>
+                </a:solidFill>
+                <a:ea typeface="+mn-lt"/>
+                <a:cs typeface="+mn-lt"/>
+              </a:rPr>
+              <a:t> 알고리즘이 </a:t>
+            </a:r>
+            <a:r>
+              <a:rPr lang="ko-KR" dirty="0">
+                <a:solidFill>
+                  <a:srgbClr val="FFFFFF">
+                    <a:alpha val="70000"/>
+                  </a:srgbClr>
+                </a:solidFill>
+                <a:ea typeface="+mn-lt"/>
+                <a:cs typeface="+mn-lt"/>
+              </a:rPr>
+              <a:t>존재한다</a:t>
+            </a:r>
+            <a:r>
+              <a:rPr lang="en-US" altLang="ko-KR" dirty="0">
+                <a:solidFill>
+                  <a:srgbClr val="FFFFFF">
+                    <a:alpha val="70000"/>
+                  </a:srgbClr>
+                </a:solidFill>
+                <a:ea typeface="+mn-lt"/>
+                <a:cs typeface="+mn-lt"/>
+              </a:rPr>
+              <a:t>.</a:t>
+            </a:r>
+            <a:r>
+              <a:rPr lang="ko-KR" altLang="en-US" dirty="0">
+                <a:solidFill>
+                  <a:srgbClr val="FFFFFF">
+                    <a:alpha val="70000"/>
+                  </a:srgbClr>
+                </a:solidFill>
+                <a:ea typeface="+mn-lt"/>
+                <a:cs typeface="+mn-lt"/>
+              </a:rPr>
+              <a:t> </a:t>
+            </a:r>
+          </a:p>
+          <a:p>
+            <a:pPr marL="0" indent="0">
+              <a:buNone/>
+            </a:pPr>
+            <a:r>
+              <a:rPr lang="ko-KR" altLang="en-US" dirty="0">
+                <a:solidFill>
+                  <a:srgbClr val="FFFFFF">
+                    <a:alpha val="70000"/>
+                  </a:srgbClr>
+                </a:solidFill>
+                <a:ea typeface="Microsoft GothicNeo"/>
+                <a:cs typeface="Microsoft GothicNeo"/>
+              </a:rPr>
+              <a:t>변경 알고리즘 : 컨테이너의 요소를 바꾸는 알고리즘</a:t>
+            </a:r>
+          </a:p>
+          <a:p>
+            <a:pPr marL="0" indent="0">
+              <a:buNone/>
+            </a:pPr>
+            <a:r>
+              <a:rPr lang="ko-KR" altLang="en-US" dirty="0" err="1">
+                <a:solidFill>
+                  <a:srgbClr val="FFFFFF">
+                    <a:alpha val="70000"/>
+                  </a:srgbClr>
+                </a:solidFill>
+                <a:ea typeface="Microsoft GothicNeo"/>
+                <a:cs typeface="Microsoft GothicNeo"/>
+              </a:rPr>
+              <a:t>비변경</a:t>
+            </a:r>
+            <a:r>
+              <a:rPr lang="ko-KR" altLang="en-US" dirty="0">
+                <a:solidFill>
+                  <a:srgbClr val="FFFFFF">
+                    <a:alpha val="70000"/>
+                  </a:srgbClr>
+                </a:solidFill>
+                <a:ea typeface="Microsoft GothicNeo"/>
+                <a:cs typeface="Microsoft GothicNeo"/>
+              </a:rPr>
+              <a:t> 알고리즘 : 컨테이너의 요소는 변경하지 않는 알고리즘 </a:t>
+            </a:r>
+          </a:p>
+        </p:txBody>
+      </p:sp>
+    </p:spTree>
+    <p:extLst>
+      <p:ext uri="{BB962C8B-B14F-4D97-AF65-F5344CB8AC3E}">
+        <p14:creationId xmlns:p14="http://schemas.microsoft.com/office/powerpoint/2010/main" val="1369555356"/>
+      </p:ext>
+    </p:extLst>
+  </p:cSld>
+  <p:clrMapOvr>
+    <a:masterClrMapping/>
+  </p:clrMapOvr>
+</p:sld>
+</file>
+
+<file path=ppt/slides/slide51.xml><?xml version="1.0" encoding="utf-8"?>
+<p:sld xmlns:a="http://schemas.openxmlformats.org/drawingml/2006/main" xmlns:r="http://schemas.openxmlformats.org/officeDocument/2006/relationships" xmlns:p="http://schemas.openxmlformats.org/presentationml/2006/main">
+  <p:cSld>
+    <p:spTree>
+      <p:nvGrpSpPr>
+        <p:cNvPr id="1" name=""/>
+        <p:cNvGrpSpPr/>
+        <p:nvPr/>
+      </p:nvGrpSpPr>
+      <p:grpSpPr>
+        <a:xfrm>
+          <a:off x="0" y="0"/>
+          <a:ext cx="0" cy="0"/>
+          <a:chOff x="0" y="0"/>
+          <a:chExt cx="0" cy="0"/>
+        </a:xfrm>
+      </p:grpSpPr>
+      <p:sp>
+        <p:nvSpPr>
+          <p:cNvPr id="2" name="제목 1">
+            <a:extLst>
+              <a:ext uri="{FF2B5EF4-FFF2-40B4-BE49-F238E27FC236}">
+                <a16:creationId xmlns:a16="http://schemas.microsoft.com/office/drawing/2014/main" id="{A53C1D64-2840-B79F-34C6-AFF2AB253AE4}"/>
+              </a:ext>
+            </a:extLst>
+          </p:cNvPr>
+          <p:cNvSpPr>
+            <a:spLocks noGrp="1"/>
+          </p:cNvSpPr>
+          <p:nvPr>
+            <p:ph type="title"/>
+          </p:nvPr>
+        </p:nvSpPr>
+        <p:spPr/>
+        <p:txBody>
+          <a:bodyPr/>
+          <a:lstStyle/>
+          <a:p>
+            <a:r>
+              <a:rPr lang="ko-KR" altLang="en-US" dirty="0">
+                <a:ea typeface="Microsoft GothicNeo"/>
+                <a:cs typeface="Microsoft GothicNeo"/>
+              </a:rPr>
+              <a:t>&lt; </a:t>
+            </a:r>
+            <a:r>
+              <a:rPr lang="ko-KR" altLang="en-US" dirty="0" err="1">
+                <a:ea typeface="Microsoft GothicNeo"/>
+                <a:cs typeface="Microsoft GothicNeo"/>
+              </a:rPr>
+              <a:t>비변경</a:t>
+            </a:r>
+            <a:r>
+              <a:rPr lang="ko-KR" altLang="en-US" dirty="0">
+                <a:ea typeface="Microsoft GothicNeo"/>
+                <a:cs typeface="Microsoft GothicNeo"/>
+              </a:rPr>
+              <a:t> 알고리즘 &gt;</a:t>
+            </a:r>
+            <a:br>
+              <a:rPr lang="ko-KR" altLang="en-US" dirty="0">
+                <a:ea typeface="Microsoft GothicNeo"/>
+                <a:cs typeface="Microsoft GothicNeo"/>
+              </a:rPr>
+            </a:br>
+            <a:r>
+              <a:rPr lang="ko-KR" altLang="en-US" sz="3200" dirty="0">
+                <a:solidFill>
+                  <a:srgbClr val="00B050"/>
+                </a:solidFill>
+                <a:ea typeface="Microsoft GothicNeo"/>
+                <a:cs typeface="Microsoft GothicNeo"/>
+              </a:rPr>
+              <a:t>     계수 알고리즘</a:t>
+            </a:r>
+            <a:endParaRPr lang="ko-KR" altLang="en-US" sz="3200" b="0">
+              <a:solidFill>
+                <a:srgbClr val="00B050"/>
+              </a:solidFill>
+              <a:ea typeface="Microsoft GothicNeo"/>
+              <a:cs typeface="Microsoft GothicNeo"/>
+            </a:endParaRPr>
+          </a:p>
+        </p:txBody>
+      </p:sp>
+      <p:sp>
+        <p:nvSpPr>
+          <p:cNvPr id="3" name="내용 개체 틀 2">
+            <a:extLst>
+              <a:ext uri="{FF2B5EF4-FFF2-40B4-BE49-F238E27FC236}">
+                <a16:creationId xmlns:a16="http://schemas.microsoft.com/office/drawing/2014/main" id="{B5A564F5-BF18-FD52-BD70-E11959A81EE9}"/>
+              </a:ext>
+            </a:extLst>
+          </p:cNvPr>
+          <p:cNvSpPr>
+            <a:spLocks noGrp="1"/>
+          </p:cNvSpPr>
+          <p:nvPr>
+            <p:ph idx="1"/>
+          </p:nvPr>
+        </p:nvSpPr>
+        <p:spPr/>
+        <p:txBody>
+          <a:bodyPr lIns="109728" tIns="109728" rIns="109728" bIns="91440" anchor="t"/>
+          <a:lstStyle/>
+          <a:p>
+            <a:r>
+              <a:rPr lang="ko-KR" altLang="en-US" b="1" err="1">
+                <a:solidFill>
+                  <a:schemeClr val="accent2">
+                    <a:lumMod val="75000"/>
+                  </a:schemeClr>
+                </a:solidFill>
+                <a:ea typeface="Microsoft GothicNeo"/>
+                <a:cs typeface="Microsoft GothicNeo"/>
+              </a:rPr>
+              <a:t>Count</a:t>
+            </a:r>
+            <a:r>
+              <a:rPr lang="ko-KR" altLang="en-US" b="1" dirty="0">
+                <a:solidFill>
+                  <a:schemeClr val="accent2">
+                    <a:lumMod val="75000"/>
+                  </a:schemeClr>
+                </a:solidFill>
+                <a:ea typeface="Microsoft GothicNeo"/>
+                <a:cs typeface="Microsoft GothicNeo"/>
+              </a:rPr>
+              <a:t>(</a:t>
+            </a:r>
+            <a:r>
+              <a:rPr lang="ko-KR" altLang="en-US" b="1" err="1">
+                <a:solidFill>
+                  <a:schemeClr val="accent2">
+                    <a:lumMod val="75000"/>
+                  </a:schemeClr>
+                </a:solidFill>
+                <a:ea typeface="Microsoft GothicNeo"/>
+                <a:cs typeface="Microsoft GothicNeo"/>
+              </a:rPr>
+              <a:t>v.begin</a:t>
+            </a:r>
+            <a:r>
+              <a:rPr lang="ko-KR" altLang="en-US" b="1" dirty="0">
+                <a:solidFill>
+                  <a:schemeClr val="accent2">
+                    <a:lumMod val="75000"/>
+                  </a:schemeClr>
+                </a:solidFill>
+                <a:ea typeface="Microsoft GothicNeo"/>
+                <a:cs typeface="Microsoft GothicNeo"/>
+              </a:rPr>
+              <a:t>(), </a:t>
+            </a:r>
+            <a:r>
+              <a:rPr lang="ko-KR" altLang="en-US" b="1" err="1">
+                <a:solidFill>
+                  <a:schemeClr val="accent2">
+                    <a:lumMod val="75000"/>
+                  </a:schemeClr>
+                </a:solidFill>
+                <a:ea typeface="Microsoft GothicNeo"/>
+                <a:cs typeface="Microsoft GothicNeo"/>
+              </a:rPr>
+              <a:t>v.end</a:t>
+            </a:r>
+            <a:r>
+              <a:rPr lang="ko-KR" altLang="en-US" b="1" dirty="0">
+                <a:solidFill>
+                  <a:schemeClr val="accent2">
+                    <a:lumMod val="75000"/>
+                  </a:schemeClr>
+                </a:solidFill>
+                <a:ea typeface="Microsoft GothicNeo"/>
+                <a:cs typeface="Microsoft GothicNeo"/>
+              </a:rPr>
+              <a:t>(), </a:t>
+            </a:r>
+            <a:r>
+              <a:rPr lang="ko-KR" altLang="en-US" b="1" err="1">
+                <a:solidFill>
+                  <a:schemeClr val="accent2">
+                    <a:lumMod val="75000"/>
+                  </a:schemeClr>
+                </a:solidFill>
+                <a:ea typeface="Microsoft GothicNeo"/>
+                <a:cs typeface="Microsoft GothicNeo"/>
+              </a:rPr>
+              <a:t>find_val</a:t>
+            </a:r>
+            <a:r>
+              <a:rPr lang="ko-KR" altLang="en-US" b="1" dirty="0">
+                <a:solidFill>
+                  <a:schemeClr val="accent2">
+                    <a:lumMod val="75000"/>
+                  </a:schemeClr>
+                </a:solidFill>
+                <a:ea typeface="Microsoft GothicNeo"/>
+                <a:cs typeface="Microsoft GothicNeo"/>
+              </a:rPr>
+              <a:t>); </a:t>
+            </a:r>
+            <a:endParaRPr lang="ko-KR">
+              <a:solidFill>
+                <a:schemeClr val="accent2">
+                  <a:lumMod val="75000"/>
+                </a:schemeClr>
+              </a:solidFill>
+            </a:endParaRPr>
+          </a:p>
+          <a:p>
+            <a:r>
+              <a:rPr lang="ko-KR" altLang="en-US" dirty="0">
+                <a:solidFill>
+                  <a:srgbClr val="FFFFFF">
+                    <a:alpha val="70000"/>
+                  </a:srgbClr>
+                </a:solidFill>
+                <a:ea typeface="Microsoft GothicNeo"/>
+                <a:cs typeface="Microsoft GothicNeo"/>
+              </a:rPr>
+              <a:t>// </a:t>
+            </a:r>
+            <a:r>
+              <a:rPr lang="ko-KR" altLang="en-US" dirty="0" err="1">
+                <a:solidFill>
+                  <a:srgbClr val="FFFFFF">
+                    <a:alpha val="70000"/>
+                  </a:srgbClr>
+                </a:solidFill>
+                <a:ea typeface="Microsoft GothicNeo"/>
+                <a:cs typeface="Microsoft GothicNeo"/>
+              </a:rPr>
+              <a:t>v컨테이너의</a:t>
+            </a:r>
+            <a:r>
+              <a:rPr lang="ko-KR" altLang="en-US" dirty="0">
+                <a:solidFill>
+                  <a:srgbClr val="FFFFFF">
+                    <a:alpha val="70000"/>
+                  </a:srgbClr>
+                </a:solidFill>
+                <a:ea typeface="Microsoft GothicNeo"/>
+                <a:cs typeface="Microsoft GothicNeo"/>
+              </a:rPr>
+              <a:t> 범위 에서 </a:t>
+            </a:r>
+            <a:r>
+              <a:rPr lang="ko-KR" altLang="en-US" dirty="0" err="1">
+                <a:solidFill>
+                  <a:srgbClr val="FFFFFF">
+                    <a:alpha val="70000"/>
+                  </a:srgbClr>
+                </a:solidFill>
+                <a:ea typeface="Microsoft GothicNeo"/>
+                <a:cs typeface="Microsoft GothicNeo"/>
+              </a:rPr>
+              <a:t>val값을</a:t>
+            </a:r>
+            <a:r>
+              <a:rPr lang="ko-KR" altLang="en-US" dirty="0">
+                <a:solidFill>
+                  <a:srgbClr val="FFFFFF">
+                    <a:alpha val="70000"/>
+                  </a:srgbClr>
+                </a:solidFill>
+                <a:ea typeface="Microsoft GothicNeo"/>
+                <a:cs typeface="Microsoft GothicNeo"/>
+              </a:rPr>
+              <a:t> 갖는 요소 개수를 반환해준다.</a:t>
+            </a:r>
+            <a:endParaRPr lang="ko-KR"/>
+          </a:p>
+          <a:p>
+            <a:r>
+              <a:rPr lang="ko-KR" b="1" dirty="0" err="1">
+                <a:solidFill>
+                  <a:schemeClr val="accent2">
+                    <a:lumMod val="75000"/>
+                  </a:schemeClr>
+                </a:solidFill>
+                <a:ea typeface="+mn-lt"/>
+                <a:cs typeface="+mn-lt"/>
+              </a:rPr>
+              <a:t>Count</a:t>
+            </a:r>
+            <a:r>
+              <a:rPr lang="en-US" altLang="ko-KR" b="1" dirty="0">
+                <a:solidFill>
+                  <a:schemeClr val="accent2">
+                    <a:lumMod val="75000"/>
+                  </a:schemeClr>
+                </a:solidFill>
+                <a:ea typeface="+mn-lt"/>
+                <a:cs typeface="+mn-lt"/>
+              </a:rPr>
+              <a:t>_if(</a:t>
+            </a:r>
+            <a:r>
+              <a:rPr lang="ko-KR" b="1" dirty="0" err="1">
+                <a:solidFill>
+                  <a:schemeClr val="accent2">
+                    <a:lumMod val="75000"/>
+                  </a:schemeClr>
+                </a:solidFill>
+                <a:ea typeface="+mn-lt"/>
+                <a:cs typeface="+mn-lt"/>
+              </a:rPr>
+              <a:t>v.begin</a:t>
+            </a:r>
+            <a:r>
+              <a:rPr lang="ko-KR" b="1" dirty="0">
+                <a:solidFill>
+                  <a:schemeClr val="accent2">
+                    <a:lumMod val="75000"/>
+                  </a:schemeClr>
+                </a:solidFill>
+                <a:ea typeface="+mn-lt"/>
+                <a:cs typeface="+mn-lt"/>
+              </a:rPr>
+              <a:t>(), </a:t>
+            </a:r>
+            <a:r>
+              <a:rPr lang="ko-KR" b="1" dirty="0" err="1">
+                <a:solidFill>
+                  <a:schemeClr val="accent2">
+                    <a:lumMod val="75000"/>
+                  </a:schemeClr>
+                </a:solidFill>
+                <a:ea typeface="+mn-lt"/>
+                <a:cs typeface="+mn-lt"/>
+              </a:rPr>
+              <a:t>v.end</a:t>
+            </a:r>
+            <a:r>
+              <a:rPr lang="ko-KR" b="1" dirty="0">
+                <a:solidFill>
+                  <a:schemeClr val="accent2">
+                    <a:lumMod val="75000"/>
+                  </a:schemeClr>
+                </a:solidFill>
+                <a:ea typeface="+mn-lt"/>
+                <a:cs typeface="+mn-lt"/>
+              </a:rPr>
+              <a:t>(),</a:t>
+            </a:r>
+            <a:r>
+              <a:rPr lang="ko-KR" altLang="en-US" b="1" dirty="0">
+                <a:solidFill>
+                  <a:schemeClr val="accent2">
+                    <a:lumMod val="75000"/>
+                  </a:schemeClr>
+                </a:solidFill>
+                <a:ea typeface="+mn-lt"/>
+                <a:cs typeface="+mn-lt"/>
+              </a:rPr>
+              <a:t> </a:t>
+            </a:r>
+            <a:r>
+              <a:rPr lang="ko-KR" altLang="en-US" b="1" dirty="0" err="1">
+                <a:solidFill>
+                  <a:schemeClr val="accent2">
+                    <a:lumMod val="75000"/>
+                  </a:schemeClr>
+                </a:solidFill>
+                <a:ea typeface="+mn-lt"/>
+                <a:cs typeface="+mn-lt"/>
+              </a:rPr>
+              <a:t>함수명</a:t>
+            </a:r>
+            <a:r>
+              <a:rPr lang="ko-KR" altLang="en-US" b="1" dirty="0">
+                <a:solidFill>
+                  <a:schemeClr val="accent2">
+                    <a:lumMod val="75000"/>
+                  </a:schemeClr>
+                </a:solidFill>
+                <a:ea typeface="+mn-lt"/>
+                <a:cs typeface="+mn-lt"/>
+              </a:rPr>
+              <a:t>(</a:t>
+            </a:r>
+            <a:r>
+              <a:rPr lang="ko-KR" altLang="en-US" b="1" dirty="0" err="1">
+                <a:solidFill>
+                  <a:schemeClr val="accent2">
+                    <a:lumMod val="75000"/>
+                  </a:schemeClr>
+                </a:solidFill>
+                <a:ea typeface="+mn-lt"/>
+                <a:cs typeface="+mn-lt"/>
+              </a:rPr>
+              <a:t>함수포인터</a:t>
+            </a:r>
+            <a:r>
+              <a:rPr lang="ko-KR" altLang="en-US" b="1" dirty="0">
+                <a:solidFill>
+                  <a:schemeClr val="accent2">
+                    <a:lumMod val="75000"/>
+                  </a:schemeClr>
+                </a:solidFill>
+                <a:ea typeface="+mn-lt"/>
+                <a:cs typeface="+mn-lt"/>
+              </a:rPr>
+              <a:t>) </a:t>
+            </a:r>
+            <a:r>
+              <a:rPr lang="en-US" altLang="ko-KR" b="1" dirty="0">
+                <a:solidFill>
+                  <a:schemeClr val="accent2">
+                    <a:lumMod val="75000"/>
+                  </a:schemeClr>
+                </a:solidFill>
+                <a:ea typeface="+mn-lt"/>
+                <a:cs typeface="+mn-lt"/>
+              </a:rPr>
+              <a:t>);</a:t>
+            </a:r>
+          </a:p>
+          <a:p>
+            <a:r>
+              <a:rPr lang="en-US" altLang="ko-KR" dirty="0">
+                <a:solidFill>
+                  <a:srgbClr val="FFFFFF">
+                    <a:alpha val="70000"/>
+                  </a:srgbClr>
+                </a:solidFill>
+                <a:ea typeface="Microsoft GothicNeo"/>
+                <a:cs typeface="Microsoft GothicNeo"/>
+              </a:rPr>
+              <a:t>// </a:t>
+            </a:r>
+            <a:r>
+              <a:rPr lang="en-US" altLang="ko-KR" dirty="0" err="1">
+                <a:solidFill>
+                  <a:srgbClr val="FFFFFF">
+                    <a:alpha val="70000"/>
+                  </a:srgbClr>
+                </a:solidFill>
+                <a:ea typeface="Microsoft GothicNeo"/>
+                <a:cs typeface="Microsoft GothicNeo"/>
+              </a:rPr>
+              <a:t>함수의</a:t>
+            </a:r>
+            <a:r>
+              <a:rPr lang="en-US" altLang="ko-KR" dirty="0">
+                <a:solidFill>
+                  <a:srgbClr val="FFFFFF">
+                    <a:alpha val="70000"/>
+                  </a:srgbClr>
+                </a:solidFill>
+                <a:ea typeface="Microsoft GothicNeo"/>
+                <a:cs typeface="Microsoft GothicNeo"/>
+              </a:rPr>
+              <a:t> </a:t>
+            </a:r>
+            <a:r>
+              <a:rPr lang="en-US" altLang="ko-KR" dirty="0" err="1">
+                <a:solidFill>
+                  <a:srgbClr val="FFFFFF">
+                    <a:alpha val="70000"/>
+                  </a:srgbClr>
+                </a:solidFill>
+                <a:ea typeface="Microsoft GothicNeo"/>
+                <a:cs typeface="Microsoft GothicNeo"/>
+              </a:rPr>
+              <a:t>조건에서</a:t>
+            </a:r>
+            <a:r>
+              <a:rPr lang="en-US" altLang="ko-KR" dirty="0">
+                <a:solidFill>
+                  <a:srgbClr val="FFFFFF">
+                    <a:alpha val="70000"/>
+                  </a:srgbClr>
+                </a:solidFill>
+                <a:ea typeface="Microsoft GothicNeo"/>
+                <a:cs typeface="Microsoft GothicNeo"/>
+              </a:rPr>
+              <a:t> </a:t>
+            </a:r>
+            <a:r>
+              <a:rPr lang="en-US" altLang="ko-KR" dirty="0" err="1">
+                <a:solidFill>
+                  <a:srgbClr val="FFFFFF">
+                    <a:alpha val="70000"/>
+                  </a:srgbClr>
+                </a:solidFill>
+                <a:ea typeface="Microsoft GothicNeo"/>
+                <a:cs typeface="Microsoft GothicNeo"/>
+              </a:rPr>
+              <a:t>bool을</a:t>
+            </a:r>
+            <a:r>
+              <a:rPr lang="en-US" altLang="ko-KR" dirty="0">
+                <a:solidFill>
+                  <a:srgbClr val="FFFFFF">
+                    <a:alpha val="70000"/>
+                  </a:srgbClr>
+                </a:solidFill>
+                <a:ea typeface="Microsoft GothicNeo"/>
+                <a:cs typeface="Microsoft GothicNeo"/>
+              </a:rPr>
+              <a:t> </a:t>
+            </a:r>
+            <a:r>
+              <a:rPr lang="en-US" altLang="ko-KR" dirty="0" err="1">
+                <a:solidFill>
+                  <a:srgbClr val="FFFFFF">
+                    <a:alpha val="70000"/>
+                  </a:srgbClr>
+                </a:solidFill>
+                <a:ea typeface="Microsoft GothicNeo"/>
+                <a:cs typeface="Microsoft GothicNeo"/>
+              </a:rPr>
+              <a:t>반환하는</a:t>
+            </a:r>
+            <a:r>
+              <a:rPr lang="en-US" altLang="ko-KR" dirty="0">
+                <a:solidFill>
+                  <a:srgbClr val="FFFFFF">
+                    <a:alpha val="70000"/>
+                  </a:srgbClr>
+                </a:solidFill>
+                <a:ea typeface="Microsoft GothicNeo"/>
+                <a:cs typeface="Microsoft GothicNeo"/>
+              </a:rPr>
+              <a:t> </a:t>
+            </a:r>
+            <a:r>
+              <a:rPr lang="en-US" altLang="ko-KR" dirty="0" err="1">
+                <a:solidFill>
+                  <a:srgbClr val="FFFFFF">
+                    <a:alpha val="70000"/>
+                  </a:srgbClr>
+                </a:solidFill>
+                <a:ea typeface="Microsoft GothicNeo"/>
+                <a:cs typeface="Microsoft GothicNeo"/>
+              </a:rPr>
+              <a:t>함수를</a:t>
+            </a:r>
+            <a:r>
+              <a:rPr lang="en-US" altLang="ko-KR" dirty="0">
+                <a:solidFill>
+                  <a:srgbClr val="FFFFFF">
+                    <a:alpha val="70000"/>
+                  </a:srgbClr>
+                </a:solidFill>
+                <a:ea typeface="Microsoft GothicNeo"/>
+                <a:cs typeface="Microsoft GothicNeo"/>
+              </a:rPr>
+              <a:t> </a:t>
+            </a:r>
+            <a:r>
+              <a:rPr lang="en-US" altLang="ko-KR" dirty="0" err="1">
+                <a:solidFill>
+                  <a:srgbClr val="FFFFFF">
+                    <a:alpha val="70000"/>
+                  </a:srgbClr>
+                </a:solidFill>
+                <a:ea typeface="Microsoft GothicNeo"/>
+                <a:cs typeface="Microsoft GothicNeo"/>
+              </a:rPr>
+              <a:t>작성하여</a:t>
+            </a:r>
+            <a:r>
+              <a:rPr lang="en-US" altLang="ko-KR" dirty="0">
+                <a:solidFill>
+                  <a:srgbClr val="FFFFFF">
+                    <a:alpha val="70000"/>
+                  </a:srgbClr>
+                </a:solidFill>
+                <a:ea typeface="Microsoft GothicNeo"/>
+                <a:cs typeface="Microsoft GothicNeo"/>
+              </a:rPr>
+              <a:t> </a:t>
+            </a:r>
+            <a:r>
+              <a:rPr lang="en-US" altLang="ko-KR" dirty="0" err="1">
+                <a:solidFill>
+                  <a:srgbClr val="FFFFFF">
+                    <a:alpha val="70000"/>
+                  </a:srgbClr>
+                </a:solidFill>
+                <a:ea typeface="Microsoft GothicNeo"/>
+                <a:cs typeface="Microsoft GothicNeo"/>
+              </a:rPr>
+              <a:t>함수명을</a:t>
+            </a:r>
+            <a:r>
+              <a:rPr lang="en-US" altLang="ko-KR" dirty="0">
+                <a:solidFill>
+                  <a:srgbClr val="FFFFFF">
+                    <a:alpha val="70000"/>
+                  </a:srgbClr>
+                </a:solidFill>
+                <a:ea typeface="Microsoft GothicNeo"/>
+                <a:cs typeface="Microsoft GothicNeo"/>
+              </a:rPr>
+              <a:t> </a:t>
+            </a:r>
+            <a:r>
+              <a:rPr lang="en-US" altLang="ko-KR" dirty="0" err="1">
+                <a:solidFill>
+                  <a:srgbClr val="FFFFFF">
+                    <a:alpha val="70000"/>
+                  </a:srgbClr>
+                </a:solidFill>
+                <a:ea typeface="Microsoft GothicNeo"/>
+                <a:cs typeface="Microsoft GothicNeo"/>
+              </a:rPr>
+              <a:t>적어준다</a:t>
+            </a:r>
+            <a:r>
+              <a:rPr lang="en-US" altLang="ko-KR" dirty="0">
+                <a:solidFill>
+                  <a:srgbClr val="FFFFFF">
+                    <a:alpha val="70000"/>
+                  </a:srgbClr>
+                </a:solidFill>
+                <a:ea typeface="Microsoft GothicNeo"/>
+                <a:cs typeface="Microsoft GothicNeo"/>
+              </a:rPr>
+              <a:t>.</a:t>
+            </a:r>
+          </a:p>
+          <a:p>
+            <a:pPr marL="0" indent="0">
+              <a:buNone/>
+            </a:pPr>
+            <a:r>
+              <a:rPr lang="en-US" altLang="ko-KR" dirty="0">
+                <a:solidFill>
+                  <a:srgbClr val="FFFFFF">
+                    <a:alpha val="70000"/>
+                  </a:srgbClr>
+                </a:solidFill>
+                <a:ea typeface="Microsoft GothicNeo"/>
+                <a:cs typeface="Microsoft GothicNeo"/>
+              </a:rPr>
+              <a:t>위 </a:t>
+            </a:r>
+            <a:r>
+              <a:rPr lang="en-US" altLang="ko-KR" dirty="0" err="1">
+                <a:solidFill>
+                  <a:srgbClr val="FFFFFF">
+                    <a:alpha val="70000"/>
+                  </a:srgbClr>
+                </a:solidFill>
+                <a:ea typeface="Microsoft GothicNeo"/>
+                <a:cs typeface="Microsoft GothicNeo"/>
+              </a:rPr>
+              <a:t>함수에서</a:t>
+            </a:r>
+            <a:r>
+              <a:rPr lang="en-US" altLang="ko-KR" dirty="0">
+                <a:solidFill>
+                  <a:srgbClr val="FFFFFF">
+                    <a:alpha val="70000"/>
+                  </a:srgbClr>
+                </a:solidFill>
+                <a:ea typeface="Microsoft GothicNeo"/>
+                <a:cs typeface="Microsoft GothicNeo"/>
+              </a:rPr>
+              <a:t> </a:t>
+            </a:r>
+            <a:r>
+              <a:rPr lang="en-US" altLang="ko-KR" dirty="0" err="1">
+                <a:solidFill>
+                  <a:srgbClr val="FFFFFF">
+                    <a:alpha val="70000"/>
+                  </a:srgbClr>
+                </a:solidFill>
+                <a:ea typeface="Microsoft GothicNeo"/>
+                <a:cs typeface="Microsoft GothicNeo"/>
+              </a:rPr>
+              <a:t>반환하는</a:t>
+            </a:r>
+            <a:r>
+              <a:rPr lang="en-US" altLang="ko-KR" dirty="0">
+                <a:solidFill>
+                  <a:srgbClr val="FFFFFF">
+                    <a:alpha val="70000"/>
+                  </a:srgbClr>
+                </a:solidFill>
+                <a:ea typeface="Microsoft GothicNeo"/>
+                <a:cs typeface="Microsoft GothicNeo"/>
+              </a:rPr>
+              <a:t> bool </a:t>
+            </a:r>
+            <a:r>
+              <a:rPr lang="en-US" altLang="ko-KR" dirty="0" err="1">
+                <a:solidFill>
+                  <a:srgbClr val="FFFFFF">
+                    <a:alpha val="70000"/>
+                  </a:srgbClr>
+                </a:solidFill>
+                <a:ea typeface="Microsoft GothicNeo"/>
+                <a:cs typeface="Microsoft GothicNeo"/>
+              </a:rPr>
+              <a:t>값에</a:t>
+            </a:r>
+            <a:r>
+              <a:rPr lang="en-US" altLang="ko-KR" dirty="0">
+                <a:solidFill>
+                  <a:srgbClr val="FFFFFF">
+                    <a:alpha val="70000"/>
+                  </a:srgbClr>
+                </a:solidFill>
+                <a:ea typeface="Microsoft GothicNeo"/>
+                <a:cs typeface="Microsoft GothicNeo"/>
+              </a:rPr>
+              <a:t> </a:t>
+            </a:r>
+            <a:r>
+              <a:rPr lang="en-US" altLang="ko-KR" dirty="0" err="1">
+                <a:solidFill>
+                  <a:srgbClr val="FFFFFF">
+                    <a:alpha val="70000"/>
+                  </a:srgbClr>
+                </a:solidFill>
+                <a:ea typeface="Microsoft GothicNeo"/>
+                <a:cs typeface="Microsoft GothicNeo"/>
+              </a:rPr>
+              <a:t>참이</a:t>
+            </a:r>
+            <a:r>
+              <a:rPr lang="en-US" altLang="ko-KR" dirty="0">
+                <a:solidFill>
+                  <a:srgbClr val="FFFFFF">
+                    <a:alpha val="70000"/>
+                  </a:srgbClr>
+                </a:solidFill>
+                <a:ea typeface="Microsoft GothicNeo"/>
+                <a:cs typeface="Microsoft GothicNeo"/>
+              </a:rPr>
+              <a:t> </a:t>
+            </a:r>
+            <a:r>
+              <a:rPr lang="en-US" altLang="ko-KR" dirty="0" err="1">
+                <a:solidFill>
+                  <a:srgbClr val="FFFFFF">
+                    <a:alpha val="70000"/>
+                  </a:srgbClr>
+                </a:solidFill>
+                <a:ea typeface="Microsoft GothicNeo"/>
+                <a:cs typeface="Microsoft GothicNeo"/>
+              </a:rPr>
+              <a:t>되는</a:t>
+            </a:r>
+            <a:r>
+              <a:rPr lang="en-US" altLang="ko-KR" dirty="0">
+                <a:solidFill>
+                  <a:srgbClr val="FFFFFF">
+                    <a:alpha val="70000"/>
+                  </a:srgbClr>
+                </a:solidFill>
+                <a:ea typeface="Microsoft GothicNeo"/>
+                <a:cs typeface="Microsoft GothicNeo"/>
+              </a:rPr>
+              <a:t> </a:t>
+            </a:r>
+            <a:r>
+              <a:rPr lang="en-US" altLang="ko-KR" dirty="0" err="1">
+                <a:solidFill>
+                  <a:srgbClr val="FFFFFF">
+                    <a:alpha val="70000"/>
+                  </a:srgbClr>
+                </a:solidFill>
+                <a:ea typeface="Microsoft GothicNeo"/>
+                <a:cs typeface="Microsoft GothicNeo"/>
+              </a:rPr>
+              <a:t>값을</a:t>
+            </a:r>
+            <a:r>
+              <a:rPr lang="en-US" altLang="ko-KR" dirty="0">
+                <a:solidFill>
+                  <a:srgbClr val="FFFFFF">
+                    <a:alpha val="70000"/>
+                  </a:srgbClr>
+                </a:solidFill>
+                <a:ea typeface="Microsoft GothicNeo"/>
+                <a:cs typeface="Microsoft GothicNeo"/>
+              </a:rPr>
+              <a:t> </a:t>
+            </a:r>
+            <a:r>
+              <a:rPr lang="en-US" altLang="ko-KR" dirty="0" err="1">
+                <a:solidFill>
+                  <a:srgbClr val="FFFFFF">
+                    <a:alpha val="70000"/>
+                  </a:srgbClr>
+                </a:solidFill>
+                <a:ea typeface="Microsoft GothicNeo"/>
+                <a:cs typeface="Microsoft GothicNeo"/>
+              </a:rPr>
+              <a:t>count해준다</a:t>
+            </a:r>
+            <a:r>
+              <a:rPr lang="en-US" altLang="ko-KR" dirty="0">
+                <a:solidFill>
+                  <a:srgbClr val="FFFFFF">
+                    <a:alpha val="70000"/>
+                  </a:srgbClr>
+                </a:solidFill>
+                <a:ea typeface="Microsoft GothicNeo"/>
+                <a:cs typeface="Microsoft GothicNeo"/>
+              </a:rPr>
+              <a:t>.</a:t>
+            </a:r>
+          </a:p>
+        </p:txBody>
+      </p:sp>
+    </p:spTree>
+    <p:extLst>
+      <p:ext uri="{BB962C8B-B14F-4D97-AF65-F5344CB8AC3E}">
+        <p14:creationId xmlns:p14="http://schemas.microsoft.com/office/powerpoint/2010/main" val="1308167515"/>
+      </p:ext>
+    </p:extLst>
+  </p:cSld>
+  <p:clrMapOvr>
+    <a:masterClrMapping/>
+  </p:clrMapOvr>
+</p:sld>
+</file>
+
+<file path=ppt/slides/slide52.xml><?xml version="1.0" encoding="utf-8"?>
+<p:sld xmlns:a="http://schemas.openxmlformats.org/drawingml/2006/main" xmlns:r="http://schemas.openxmlformats.org/officeDocument/2006/relationships" xmlns:p="http://schemas.openxmlformats.org/presentationml/2006/main">
+  <p:cSld>
+    <p:spTree>
+      <p:nvGrpSpPr>
+        <p:cNvPr id="1" name=""/>
+        <p:cNvGrpSpPr/>
+        <p:nvPr/>
+      </p:nvGrpSpPr>
+      <p:grpSpPr>
+        <a:xfrm>
+          <a:off x="0" y="0"/>
+          <a:ext cx="0" cy="0"/>
+          <a:chOff x="0" y="0"/>
+          <a:chExt cx="0" cy="0"/>
+        </a:xfrm>
+      </p:grpSpPr>
+      <p:sp>
+        <p:nvSpPr>
+          <p:cNvPr id="2" name="제목 1">
+            <a:extLst>
+              <a:ext uri="{FF2B5EF4-FFF2-40B4-BE49-F238E27FC236}">
+                <a16:creationId xmlns:a16="http://schemas.microsoft.com/office/drawing/2014/main" id="{BA230570-4509-2346-F23F-858BF6A28867}"/>
+              </a:ext>
+            </a:extLst>
+          </p:cNvPr>
+          <p:cNvSpPr>
+            <a:spLocks noGrp="1"/>
+          </p:cNvSpPr>
+          <p:nvPr>
+            <p:ph type="title"/>
+          </p:nvPr>
+        </p:nvSpPr>
+        <p:spPr/>
+        <p:txBody>
+          <a:bodyPr/>
+          <a:lstStyle/>
+          <a:p>
+            <a:r>
+              <a:rPr lang="ko-KR" dirty="0">
+                <a:ea typeface="+mj-lt"/>
+                <a:cs typeface="+mj-lt"/>
+              </a:rPr>
+              <a:t>&lt; </a:t>
+            </a:r>
+            <a:r>
+              <a:rPr lang="ko-KR" err="1">
+                <a:ea typeface="+mj-lt"/>
+                <a:cs typeface="+mj-lt"/>
+              </a:rPr>
+              <a:t>비변경</a:t>
+            </a:r>
+            <a:r>
+              <a:rPr lang="ko-KR" dirty="0">
+                <a:ea typeface="+mj-lt"/>
+                <a:cs typeface="+mj-lt"/>
+              </a:rPr>
+              <a:t> 알고리즘 &gt;</a:t>
+            </a:r>
+            <a:br>
+              <a:rPr lang="ko-KR" dirty="0">
+                <a:ea typeface="+mj-lt"/>
+                <a:cs typeface="+mj-lt"/>
+              </a:rPr>
+            </a:br>
+            <a:r>
+              <a:rPr lang="ko-KR" dirty="0">
+                <a:ea typeface="+mj-lt"/>
+                <a:cs typeface="+mj-lt"/>
+              </a:rPr>
+              <a:t>     </a:t>
+            </a:r>
+            <a:r>
+              <a:rPr lang="ko-KR" dirty="0">
+                <a:solidFill>
+                  <a:srgbClr val="00B050"/>
+                </a:solidFill>
+                <a:ea typeface="+mj-lt"/>
+                <a:cs typeface="+mj-lt"/>
+              </a:rPr>
+              <a:t>탐색 알고리즘</a:t>
+            </a:r>
+            <a:endParaRPr lang="ko-KR" dirty="0">
+              <a:solidFill>
+                <a:srgbClr val="00B050"/>
+              </a:solidFill>
+            </a:endParaRPr>
+          </a:p>
+        </p:txBody>
+      </p:sp>
+      <p:sp>
+        <p:nvSpPr>
+          <p:cNvPr id="3" name="내용 개체 틀 2">
+            <a:extLst>
+              <a:ext uri="{FF2B5EF4-FFF2-40B4-BE49-F238E27FC236}">
+                <a16:creationId xmlns:a16="http://schemas.microsoft.com/office/drawing/2014/main" id="{35DD58E1-F00E-E21E-0290-98C03095FA67}"/>
+              </a:ext>
+            </a:extLst>
+          </p:cNvPr>
+          <p:cNvSpPr>
+            <a:spLocks noGrp="1"/>
+          </p:cNvSpPr>
+          <p:nvPr>
+            <p:ph idx="1"/>
+          </p:nvPr>
+        </p:nvSpPr>
+        <p:spPr/>
+        <p:txBody>
+          <a:bodyPr lIns="109728" tIns="109728" rIns="109728" bIns="91440" anchor="t"/>
+          <a:lstStyle/>
+          <a:p>
+            <a:r>
+              <a:rPr lang="ko-KR" altLang="en-US" err="1">
+                <a:solidFill>
+                  <a:srgbClr val="FFFFFF">
+                    <a:alpha val="70000"/>
+                  </a:srgbClr>
+                </a:solidFill>
+                <a:ea typeface="+mn-lt"/>
+                <a:cs typeface="+mn-lt"/>
+              </a:rPr>
+              <a:t>Search</a:t>
+            </a:r>
+            <a:r>
+              <a:rPr lang="ko-KR" altLang="en-US" dirty="0">
+                <a:solidFill>
+                  <a:srgbClr val="FFFFFF">
+                    <a:alpha val="70000"/>
+                  </a:srgbClr>
+                </a:solidFill>
+                <a:ea typeface="+mn-lt"/>
+                <a:cs typeface="+mn-lt"/>
+              </a:rPr>
+              <a:t>() // </a:t>
+            </a:r>
+            <a:r>
+              <a:rPr lang="ko-KR" sz="1800" b="1" dirty="0">
+                <a:solidFill>
+                  <a:schemeClr val="bg1">
+                    <a:lumMod val="50000"/>
+                    <a:lumOff val="50000"/>
+                  </a:schemeClr>
+                </a:solidFill>
+                <a:latin typeface="Segoe UI"/>
+                <a:ea typeface="+mn-lt"/>
+                <a:cs typeface="Segoe UI"/>
+              </a:rPr>
+              <a:t>대상 범위 내에서 </a:t>
+            </a:r>
+            <a:r>
+              <a:rPr lang="ko-KR" altLang="en-US" sz="1800" b="1" dirty="0">
+                <a:solidFill>
+                  <a:schemeClr val="bg1">
+                    <a:lumMod val="50000"/>
+                    <a:lumOff val="50000"/>
+                  </a:schemeClr>
+                </a:solidFill>
+                <a:latin typeface="Segoe UI"/>
+                <a:ea typeface="+mn-lt"/>
+                <a:cs typeface="Segoe UI"/>
+              </a:rPr>
+              <a:t>지정된</a:t>
+            </a:r>
+            <a:r>
+              <a:rPr lang="ko-KR" sz="1800" b="1" dirty="0">
+                <a:solidFill>
+                  <a:schemeClr val="bg1">
+                    <a:lumMod val="50000"/>
+                    <a:lumOff val="50000"/>
+                  </a:schemeClr>
+                </a:solidFill>
+                <a:latin typeface="Segoe UI"/>
+                <a:ea typeface="+mn-lt"/>
+                <a:cs typeface="Segoe UI"/>
+              </a:rPr>
+              <a:t> 시퀀스의 요소와 동일한 첫 번째 시퀀스를 검색합니다.</a:t>
+            </a:r>
+          </a:p>
+          <a:p>
+            <a:r>
+              <a:rPr lang="en-US" altLang="ko-KR" sz="1800" b="1" err="1">
+                <a:solidFill>
+                  <a:schemeClr val="bg1">
+                    <a:lumMod val="50000"/>
+                    <a:lumOff val="50000"/>
+                  </a:schemeClr>
+                </a:solidFill>
+                <a:latin typeface="Segoe UI"/>
+                <a:ea typeface="+mn-lt"/>
+                <a:cs typeface="Segoe UI"/>
+              </a:rPr>
+              <a:t>Search_n</a:t>
+            </a:r>
+            <a:r>
+              <a:rPr lang="en-US" altLang="ko-KR" sz="1800" b="1" dirty="0">
+                <a:solidFill>
+                  <a:schemeClr val="bg1">
+                    <a:lumMod val="50000"/>
+                    <a:lumOff val="50000"/>
+                  </a:schemeClr>
+                </a:solidFill>
+                <a:latin typeface="Segoe UI"/>
+                <a:ea typeface="+mn-lt"/>
+                <a:cs typeface="Segoe UI"/>
+              </a:rPr>
+              <a:t>() // </a:t>
+            </a:r>
+            <a:r>
+              <a:rPr lang="en-US" sz="1800" b="1" err="1">
+                <a:solidFill>
+                  <a:schemeClr val="bg1">
+                    <a:lumMod val="50000"/>
+                    <a:lumOff val="50000"/>
+                  </a:schemeClr>
+                </a:solidFill>
+                <a:latin typeface="Segoe UI"/>
+                <a:ea typeface="+mn-lt"/>
+                <a:cs typeface="Segoe UI"/>
+              </a:rPr>
+              <a:t>범위에서</a:t>
+            </a:r>
+            <a:r>
+              <a:rPr lang="en-US" sz="1800" b="1" dirty="0">
+                <a:solidFill>
+                  <a:schemeClr val="bg1">
+                    <a:lumMod val="50000"/>
+                    <a:lumOff val="50000"/>
+                  </a:schemeClr>
+                </a:solidFill>
+                <a:latin typeface="Segoe UI"/>
+                <a:ea typeface="+mn-lt"/>
+                <a:cs typeface="Segoe UI"/>
+              </a:rPr>
+              <a:t> </a:t>
+            </a:r>
+            <a:r>
+              <a:rPr lang="en-US" sz="1800" b="1" err="1">
+                <a:solidFill>
+                  <a:schemeClr val="bg1">
+                    <a:lumMod val="50000"/>
+                    <a:lumOff val="50000"/>
+                  </a:schemeClr>
+                </a:solidFill>
+                <a:latin typeface="Segoe UI"/>
+                <a:ea typeface="+mn-lt"/>
+                <a:cs typeface="Segoe UI"/>
+              </a:rPr>
+              <a:t>특정</a:t>
+            </a:r>
+            <a:r>
+              <a:rPr lang="en-US" sz="1800" b="1" dirty="0">
+                <a:solidFill>
+                  <a:schemeClr val="bg1">
+                    <a:lumMod val="50000"/>
+                    <a:lumOff val="50000"/>
+                  </a:schemeClr>
+                </a:solidFill>
+                <a:latin typeface="Segoe UI"/>
+                <a:ea typeface="+mn-lt"/>
+                <a:cs typeface="Segoe UI"/>
+              </a:rPr>
+              <a:t> </a:t>
+            </a:r>
+            <a:r>
+              <a:rPr lang="en-US" sz="1800" b="1" err="1">
+                <a:solidFill>
+                  <a:schemeClr val="bg1">
+                    <a:lumMod val="50000"/>
+                    <a:lumOff val="50000"/>
+                  </a:schemeClr>
+                </a:solidFill>
+                <a:latin typeface="Segoe UI"/>
+                <a:ea typeface="+mn-lt"/>
+                <a:cs typeface="Segoe UI"/>
+              </a:rPr>
+              <a:t>값의</a:t>
+            </a:r>
+            <a:r>
+              <a:rPr lang="en-US" sz="1800" b="1" dirty="0">
+                <a:solidFill>
+                  <a:schemeClr val="bg1">
+                    <a:lumMod val="50000"/>
+                    <a:lumOff val="50000"/>
+                  </a:schemeClr>
+                </a:solidFill>
+                <a:latin typeface="Segoe UI"/>
+                <a:ea typeface="+mn-lt"/>
+                <a:cs typeface="Segoe UI"/>
+              </a:rPr>
+              <a:t> </a:t>
+            </a:r>
+            <a:r>
+              <a:rPr lang="en-US" sz="1800" b="1" err="1">
+                <a:solidFill>
+                  <a:schemeClr val="bg1">
+                    <a:lumMod val="50000"/>
+                    <a:lumOff val="50000"/>
+                  </a:schemeClr>
+                </a:solidFill>
+                <a:latin typeface="Segoe UI"/>
+                <a:ea typeface="+mn-lt"/>
+                <a:cs typeface="Segoe UI"/>
+              </a:rPr>
+              <a:t>요소가</a:t>
+            </a:r>
+            <a:r>
+              <a:rPr lang="en-US" sz="1800" b="1" dirty="0">
+                <a:solidFill>
+                  <a:schemeClr val="bg1">
+                    <a:lumMod val="50000"/>
+                    <a:lumOff val="50000"/>
+                  </a:schemeClr>
+                </a:solidFill>
+                <a:latin typeface="Segoe UI"/>
+                <a:ea typeface="+mn-lt"/>
+                <a:cs typeface="Segoe UI"/>
+              </a:rPr>
+              <a:t> </a:t>
+            </a:r>
+            <a:r>
+              <a:rPr lang="en-US" sz="1800" b="1" err="1">
+                <a:solidFill>
+                  <a:schemeClr val="bg1">
+                    <a:lumMod val="50000"/>
+                    <a:lumOff val="50000"/>
+                  </a:schemeClr>
+                </a:solidFill>
+                <a:latin typeface="Segoe UI"/>
+                <a:ea typeface="+mn-lt"/>
+                <a:cs typeface="Segoe UI"/>
+              </a:rPr>
+              <a:t>지정된</a:t>
+            </a:r>
+            <a:r>
+              <a:rPr lang="en-US" sz="1800" b="1" dirty="0">
+                <a:solidFill>
+                  <a:schemeClr val="bg1">
+                    <a:lumMod val="50000"/>
+                    <a:lumOff val="50000"/>
+                  </a:schemeClr>
+                </a:solidFill>
+                <a:latin typeface="Segoe UI"/>
+                <a:ea typeface="+mn-lt"/>
+                <a:cs typeface="Segoe UI"/>
+              </a:rPr>
+              <a:t> </a:t>
+            </a:r>
+            <a:r>
+              <a:rPr lang="en-US" sz="1800" b="1" err="1">
+                <a:solidFill>
+                  <a:schemeClr val="bg1">
+                    <a:lumMod val="50000"/>
+                    <a:lumOff val="50000"/>
+                  </a:schemeClr>
+                </a:solidFill>
+                <a:latin typeface="Segoe UI"/>
+                <a:ea typeface="+mn-lt"/>
+                <a:cs typeface="Segoe UI"/>
+              </a:rPr>
+              <a:t>수만큼</a:t>
+            </a:r>
+            <a:r>
+              <a:rPr lang="en-US" sz="1800" b="1" dirty="0">
+                <a:solidFill>
+                  <a:schemeClr val="bg1">
+                    <a:lumMod val="50000"/>
+                    <a:lumOff val="50000"/>
+                  </a:schemeClr>
+                </a:solidFill>
+                <a:latin typeface="Segoe UI"/>
+                <a:ea typeface="+mn-lt"/>
+                <a:cs typeface="Segoe UI"/>
+              </a:rPr>
+              <a:t> </a:t>
+            </a:r>
+            <a:r>
+              <a:rPr lang="en-US" sz="1800" b="1" err="1">
+                <a:solidFill>
+                  <a:schemeClr val="bg1">
+                    <a:lumMod val="50000"/>
+                    <a:lumOff val="50000"/>
+                  </a:schemeClr>
+                </a:solidFill>
+                <a:latin typeface="Segoe UI"/>
+                <a:ea typeface="+mn-lt"/>
+                <a:cs typeface="Segoe UI"/>
+              </a:rPr>
+              <a:t>있거나</a:t>
+            </a:r>
+            <a:r>
+              <a:rPr lang="en-US" sz="1800" b="1" dirty="0">
+                <a:solidFill>
+                  <a:schemeClr val="bg1">
+                    <a:lumMod val="50000"/>
+                    <a:lumOff val="50000"/>
+                  </a:schemeClr>
+                </a:solidFill>
+                <a:latin typeface="Segoe UI"/>
+                <a:ea typeface="+mn-lt"/>
+                <a:cs typeface="Segoe UI"/>
+              </a:rPr>
+              <a:t> </a:t>
+            </a:r>
+            <a:r>
+              <a:rPr lang="en-US" sz="1800" b="1" err="1">
+                <a:solidFill>
+                  <a:schemeClr val="bg1">
+                    <a:lumMod val="50000"/>
+                    <a:lumOff val="50000"/>
+                  </a:schemeClr>
+                </a:solidFill>
+                <a:latin typeface="Segoe UI"/>
+                <a:ea typeface="+mn-lt"/>
+                <a:cs typeface="Segoe UI"/>
+              </a:rPr>
+              <a:t>이진</a:t>
+            </a:r>
+            <a:r>
+              <a:rPr lang="en-US" sz="1800" b="1" dirty="0">
+                <a:solidFill>
+                  <a:schemeClr val="bg1">
+                    <a:lumMod val="50000"/>
+                    <a:lumOff val="50000"/>
+                  </a:schemeClr>
+                </a:solidFill>
+                <a:latin typeface="Segoe UI"/>
+                <a:ea typeface="+mn-lt"/>
+                <a:cs typeface="Segoe UI"/>
+              </a:rPr>
+              <a:t> </a:t>
+            </a:r>
+            <a:r>
+              <a:rPr lang="en-US" sz="1800" b="1" err="1">
+                <a:solidFill>
+                  <a:schemeClr val="bg1">
+                    <a:lumMod val="50000"/>
+                    <a:lumOff val="50000"/>
+                  </a:schemeClr>
+                </a:solidFill>
+                <a:latin typeface="Segoe UI"/>
+                <a:ea typeface="+mn-lt"/>
+                <a:cs typeface="Segoe UI"/>
+              </a:rPr>
+              <a:t>조건자가</a:t>
+            </a:r>
+            <a:r>
+              <a:rPr lang="en-US" sz="1800" b="1" dirty="0">
+                <a:solidFill>
+                  <a:schemeClr val="bg1">
+                    <a:lumMod val="50000"/>
+                    <a:lumOff val="50000"/>
+                  </a:schemeClr>
+                </a:solidFill>
+                <a:latin typeface="Segoe UI"/>
+                <a:ea typeface="+mn-lt"/>
+                <a:cs typeface="Segoe UI"/>
+              </a:rPr>
+              <a:t> </a:t>
+            </a:r>
+            <a:r>
+              <a:rPr lang="en-US" sz="1800" b="1" err="1">
+                <a:solidFill>
+                  <a:schemeClr val="bg1">
+                    <a:lumMod val="50000"/>
+                    <a:lumOff val="50000"/>
+                  </a:schemeClr>
+                </a:solidFill>
+                <a:latin typeface="Segoe UI"/>
+                <a:ea typeface="+mn-lt"/>
+                <a:cs typeface="Segoe UI"/>
+              </a:rPr>
+              <a:t>지정한</a:t>
+            </a:r>
+            <a:r>
+              <a:rPr lang="en-US" sz="1800" b="1" dirty="0">
+                <a:solidFill>
+                  <a:schemeClr val="bg1">
+                    <a:lumMod val="50000"/>
+                    <a:lumOff val="50000"/>
+                  </a:schemeClr>
+                </a:solidFill>
+                <a:latin typeface="Segoe UI"/>
+                <a:ea typeface="+mn-lt"/>
+                <a:cs typeface="Segoe UI"/>
+              </a:rPr>
+              <a:t> </a:t>
+            </a:r>
+            <a:r>
+              <a:rPr lang="en-US" sz="1800" b="1" err="1">
+                <a:solidFill>
+                  <a:schemeClr val="bg1">
+                    <a:lumMod val="50000"/>
+                    <a:lumOff val="50000"/>
+                  </a:schemeClr>
+                </a:solidFill>
+                <a:latin typeface="Segoe UI"/>
+                <a:ea typeface="+mn-lt"/>
+                <a:cs typeface="Segoe UI"/>
+              </a:rPr>
+              <a:t>해당</a:t>
+            </a:r>
+            <a:r>
+              <a:rPr lang="en-US" sz="1800" b="1" dirty="0">
+                <a:solidFill>
+                  <a:schemeClr val="bg1">
+                    <a:lumMod val="50000"/>
+                    <a:lumOff val="50000"/>
+                  </a:schemeClr>
+                </a:solidFill>
+                <a:latin typeface="Segoe UI"/>
+                <a:ea typeface="+mn-lt"/>
+                <a:cs typeface="Segoe UI"/>
+              </a:rPr>
+              <a:t> </a:t>
+            </a:r>
+            <a:r>
+              <a:rPr lang="en-US" sz="1800" b="1" err="1">
+                <a:solidFill>
+                  <a:schemeClr val="bg1">
+                    <a:lumMod val="50000"/>
+                    <a:lumOff val="50000"/>
+                  </a:schemeClr>
+                </a:solidFill>
+                <a:latin typeface="Segoe UI"/>
+                <a:ea typeface="+mn-lt"/>
+                <a:cs typeface="Segoe UI"/>
+              </a:rPr>
+              <a:t>값과</a:t>
+            </a:r>
+            <a:r>
+              <a:rPr lang="en-US" sz="1800" b="1" dirty="0">
+                <a:solidFill>
+                  <a:schemeClr val="bg1">
+                    <a:lumMod val="50000"/>
+                    <a:lumOff val="50000"/>
+                  </a:schemeClr>
+                </a:solidFill>
+                <a:latin typeface="Segoe UI"/>
+                <a:ea typeface="+mn-lt"/>
+                <a:cs typeface="Segoe UI"/>
+              </a:rPr>
+              <a:t> </a:t>
+            </a:r>
+            <a:r>
+              <a:rPr lang="en-US" sz="1800" b="1" err="1">
+                <a:solidFill>
+                  <a:schemeClr val="bg1">
+                    <a:lumMod val="50000"/>
+                    <a:lumOff val="50000"/>
+                  </a:schemeClr>
+                </a:solidFill>
+                <a:latin typeface="Segoe UI"/>
+                <a:ea typeface="+mn-lt"/>
+                <a:cs typeface="Segoe UI"/>
+              </a:rPr>
+              <a:t>관련이</a:t>
+            </a:r>
+            <a:r>
+              <a:rPr lang="en-US" sz="1800" b="1" dirty="0">
+                <a:solidFill>
+                  <a:schemeClr val="bg1">
+                    <a:lumMod val="50000"/>
+                    <a:lumOff val="50000"/>
+                  </a:schemeClr>
+                </a:solidFill>
+                <a:latin typeface="Segoe UI"/>
+                <a:ea typeface="+mn-lt"/>
+                <a:cs typeface="Segoe UI"/>
+              </a:rPr>
+              <a:t> </a:t>
+            </a:r>
+            <a:r>
+              <a:rPr lang="en-US" sz="1800" b="1" err="1">
+                <a:solidFill>
+                  <a:schemeClr val="bg1">
+                    <a:lumMod val="50000"/>
+                    <a:lumOff val="50000"/>
+                  </a:schemeClr>
+                </a:solidFill>
+                <a:latin typeface="Segoe UI"/>
+                <a:ea typeface="+mn-lt"/>
+                <a:cs typeface="Segoe UI"/>
+              </a:rPr>
+              <a:t>있는</a:t>
+            </a:r>
+            <a:r>
+              <a:rPr lang="en-US" sz="1800" b="1" dirty="0">
+                <a:solidFill>
+                  <a:schemeClr val="bg1">
+                    <a:lumMod val="50000"/>
+                    <a:lumOff val="50000"/>
+                  </a:schemeClr>
+                </a:solidFill>
+                <a:latin typeface="Segoe UI"/>
+                <a:ea typeface="+mn-lt"/>
+                <a:cs typeface="Segoe UI"/>
+              </a:rPr>
+              <a:t> 첫 </a:t>
+            </a:r>
+            <a:r>
+              <a:rPr lang="en-US" sz="1800" b="1" err="1">
+                <a:solidFill>
+                  <a:schemeClr val="bg1">
+                    <a:lumMod val="50000"/>
+                    <a:lumOff val="50000"/>
+                  </a:schemeClr>
+                </a:solidFill>
+                <a:latin typeface="Segoe UI"/>
+                <a:ea typeface="+mn-lt"/>
+                <a:cs typeface="Segoe UI"/>
+              </a:rPr>
+              <a:t>번째</a:t>
+            </a:r>
+            <a:r>
+              <a:rPr lang="en-US" sz="1800" b="1" dirty="0">
+                <a:solidFill>
+                  <a:schemeClr val="bg1">
+                    <a:lumMod val="50000"/>
+                    <a:lumOff val="50000"/>
+                  </a:schemeClr>
+                </a:solidFill>
+                <a:latin typeface="Segoe UI"/>
+                <a:ea typeface="+mn-lt"/>
+                <a:cs typeface="Segoe UI"/>
+              </a:rPr>
+              <a:t> </a:t>
+            </a:r>
+            <a:r>
+              <a:rPr lang="en-US" sz="1800" b="1" err="1">
+                <a:solidFill>
+                  <a:schemeClr val="bg1">
+                    <a:lumMod val="50000"/>
+                    <a:lumOff val="50000"/>
+                  </a:schemeClr>
+                </a:solidFill>
+                <a:latin typeface="Segoe UI"/>
+                <a:ea typeface="+mn-lt"/>
+                <a:cs typeface="Segoe UI"/>
+              </a:rPr>
+              <a:t>하위</a:t>
+            </a:r>
+            <a:r>
+              <a:rPr lang="en-US" sz="1800" b="1" dirty="0">
+                <a:solidFill>
+                  <a:schemeClr val="bg1">
+                    <a:lumMod val="50000"/>
+                    <a:lumOff val="50000"/>
+                  </a:schemeClr>
+                </a:solidFill>
+                <a:latin typeface="Segoe UI"/>
+                <a:ea typeface="+mn-lt"/>
+                <a:cs typeface="Segoe UI"/>
+              </a:rPr>
+              <a:t> </a:t>
+            </a:r>
+            <a:r>
+              <a:rPr lang="en-US" sz="1800" b="1" err="1">
+                <a:solidFill>
+                  <a:schemeClr val="bg1">
+                    <a:lumMod val="50000"/>
+                    <a:lumOff val="50000"/>
+                  </a:schemeClr>
+                </a:solidFill>
+                <a:latin typeface="Segoe UI"/>
+                <a:ea typeface="+mn-lt"/>
+                <a:cs typeface="Segoe UI"/>
+              </a:rPr>
+              <a:t>시퀀스를</a:t>
+            </a:r>
+            <a:r>
+              <a:rPr lang="en-US" sz="1800" b="1" dirty="0">
+                <a:solidFill>
+                  <a:schemeClr val="bg1">
+                    <a:lumMod val="50000"/>
+                    <a:lumOff val="50000"/>
+                  </a:schemeClr>
+                </a:solidFill>
+                <a:latin typeface="Segoe UI"/>
+                <a:ea typeface="+mn-lt"/>
+                <a:cs typeface="Segoe UI"/>
+              </a:rPr>
+              <a:t> </a:t>
+            </a:r>
+            <a:r>
+              <a:rPr lang="en-US" sz="1800" b="1" err="1">
+                <a:solidFill>
+                  <a:schemeClr val="bg1">
+                    <a:lumMod val="50000"/>
+                    <a:lumOff val="50000"/>
+                  </a:schemeClr>
+                </a:solidFill>
+                <a:latin typeface="Segoe UI"/>
+                <a:ea typeface="+mn-lt"/>
+                <a:cs typeface="Segoe UI"/>
+              </a:rPr>
+              <a:t>검색합니다</a:t>
+            </a:r>
+            <a:r>
+              <a:rPr lang="en-US" sz="1800" b="1" dirty="0">
+                <a:solidFill>
+                  <a:schemeClr val="bg1">
+                    <a:lumMod val="50000"/>
+                    <a:lumOff val="50000"/>
+                  </a:schemeClr>
+                </a:solidFill>
+                <a:latin typeface="Segoe UI"/>
+                <a:ea typeface="+mn-lt"/>
+                <a:cs typeface="Segoe UI"/>
+              </a:rPr>
+              <a:t>.</a:t>
+            </a:r>
+            <a:endParaRPr lang="ko-KR" sz="1800" b="1" dirty="0">
+              <a:solidFill>
+                <a:schemeClr val="bg1">
+                  <a:lumMod val="50000"/>
+                  <a:lumOff val="50000"/>
+                </a:schemeClr>
+              </a:solidFill>
+              <a:latin typeface="Segoe UI"/>
+              <a:ea typeface="+mn-lt"/>
+              <a:cs typeface="Segoe UI"/>
+            </a:endParaRPr>
+          </a:p>
+        </p:txBody>
+      </p:sp>
+    </p:spTree>
+    <p:extLst>
+      <p:ext uri="{BB962C8B-B14F-4D97-AF65-F5344CB8AC3E}">
+        <p14:creationId xmlns:p14="http://schemas.microsoft.com/office/powerpoint/2010/main" val="2672842801"/>
+      </p:ext>
+    </p:extLst>
+  </p:cSld>
+  <p:clrMapOvr>
+    <a:masterClrMapping/>
+  </p:clrMapOvr>
+</p:sld>
+</file>
+
+<file path=ppt/slides/slide53.xml><?xml version="1.0" encoding="utf-8"?>
+<p:sld xmlns:a="http://schemas.openxmlformats.org/drawingml/2006/main" xmlns:r="http://schemas.openxmlformats.org/officeDocument/2006/relationships" xmlns:p="http://schemas.openxmlformats.org/presentationml/2006/main">
+  <p:cSld>
+    <p:spTree>
+      <p:nvGrpSpPr>
+        <p:cNvPr id="1" name=""/>
+        <p:cNvGrpSpPr/>
+        <p:nvPr/>
+      </p:nvGrpSpPr>
+      <p:grpSpPr>
+        <a:xfrm>
+          <a:off x="0" y="0"/>
+          <a:ext cx="0" cy="0"/>
+          <a:chOff x="0" y="0"/>
+          <a:chExt cx="0" cy="0"/>
+        </a:xfrm>
+      </p:grpSpPr>
+      <p:sp>
+        <p:nvSpPr>
+          <p:cNvPr id="2" name="제목 1">
+            <a:extLst>
+              <a:ext uri="{FF2B5EF4-FFF2-40B4-BE49-F238E27FC236}">
+                <a16:creationId xmlns:a16="http://schemas.microsoft.com/office/drawing/2014/main" id="{1138F0AA-7041-93D4-4934-CE9FDAED261D}"/>
+              </a:ext>
+            </a:extLst>
+          </p:cNvPr>
+          <p:cNvSpPr>
+            <a:spLocks noGrp="1"/>
+          </p:cNvSpPr>
+          <p:nvPr>
+            <p:ph type="title"/>
+          </p:nvPr>
+        </p:nvSpPr>
+        <p:spPr/>
+        <p:txBody>
+          <a:bodyPr/>
+          <a:lstStyle/>
+          <a:p>
+            <a:r>
+              <a:rPr lang="ko-KR" altLang="en-US" dirty="0" err="1">
+                <a:ea typeface="Microsoft GothicNeo"/>
+                <a:cs typeface="Microsoft GothicNeo"/>
+              </a:rPr>
+              <a:t>Algorithm</a:t>
+            </a:r>
+            <a:r>
+              <a:rPr lang="ko-KR" altLang="en-US" dirty="0">
+                <a:ea typeface="Microsoft GothicNeo"/>
+                <a:cs typeface="Microsoft GothicNeo"/>
+              </a:rPr>
+              <a:t> 헤더 설명링크</a:t>
+            </a:r>
+          </a:p>
+        </p:txBody>
+      </p:sp>
+      <p:sp>
+        <p:nvSpPr>
+          <p:cNvPr id="3" name="내용 개체 틀 2">
+            <a:extLst>
+              <a:ext uri="{FF2B5EF4-FFF2-40B4-BE49-F238E27FC236}">
+                <a16:creationId xmlns:a16="http://schemas.microsoft.com/office/drawing/2014/main" id="{9BF36904-01D0-630E-724B-8BC4AFD2DE08}"/>
+              </a:ext>
+            </a:extLst>
+          </p:cNvPr>
+          <p:cNvSpPr>
+            <a:spLocks noGrp="1"/>
+          </p:cNvSpPr>
+          <p:nvPr>
+            <p:ph idx="1"/>
+          </p:nvPr>
+        </p:nvSpPr>
+        <p:spPr/>
+        <p:txBody>
+          <a:bodyPr lIns="109728" tIns="109728" rIns="109728" bIns="91440" anchor="t"/>
+          <a:lstStyle/>
+          <a:p>
+            <a:r>
+              <a:rPr lang="en-US" altLang="ko-KR" dirty="0">
+                <a:latin typeface="Arial"/>
+                <a:cs typeface="Arial"/>
+                <a:hlinkClick r:id="rId2"/>
+              </a:rPr>
+              <a:t>MS</a:t>
+            </a:r>
+            <a:r>
+              <a:rPr lang="ko-KR" dirty="0">
+                <a:latin typeface="Arial"/>
+                <a:cs typeface="Arial"/>
+                <a:hlinkClick r:id="rId2"/>
+              </a:rPr>
+              <a:t>의 algorithm 헤더 설명링크</a:t>
+            </a:r>
+            <a:endParaRPr lang="ko-KR">
+              <a:latin typeface="Malgun Gothic"/>
+              <a:ea typeface="Malgun Gothic"/>
+            </a:endParaRPr>
+          </a:p>
+          <a:p>
+            <a:endParaRPr lang="ko-KR" dirty="0">
+              <a:solidFill>
+                <a:srgbClr val="FFFFFF">
+                  <a:alpha val="70000"/>
+                </a:srgbClr>
+              </a:solidFill>
+              <a:latin typeface="Arial"/>
+              <a:cs typeface="Arial"/>
+            </a:endParaRPr>
+          </a:p>
+        </p:txBody>
+      </p:sp>
+    </p:spTree>
+    <p:extLst>
+      <p:ext uri="{BB962C8B-B14F-4D97-AF65-F5344CB8AC3E}">
+        <p14:creationId xmlns:p14="http://schemas.microsoft.com/office/powerpoint/2010/main" val="2637663317"/>
       </p:ext>
     </p:extLst>
   </p:cSld>

</xml_diff>